<commit_message>
feat: Made some good head way with Chapter 2 (final stretch)
</commit_message>
<xml_diff>
--- a/Báo cáo/Diagram/System architecture.pptx
+++ b/Báo cáo/Diagram/System architecture.pptx
@@ -106,6 +106,11 @@
       </a:defRPr>
     </a:lvl9pPr>
   </p:defaultTextStyle>
+  <p:extLst>
+    <p:ext uri="{EFAFB233-063F-42B5-8137-9DF3F51BA10A}">
+      <p15:sldGuideLst xmlns:p15="http://schemas.microsoft.com/office/powerpoint/2012/main"/>
+    </p:ext>
+  </p:extLst>
 </p:presentation>
 </file>
 
@@ -258,7 +263,7 @@
           <a:p>
             <a:fld id="{7DFF92C5-6146-4B60-B7D1-75DB42B1D625}" type="datetimeFigureOut">
               <a:rPr lang="vi-VN" smtClean="0"/>
-              <a:t>26/11/2025</a:t>
+              <a:t>28/11/2025</a:t>
             </a:fld>
             <a:endParaRPr lang="vi-VN"/>
           </a:p>
@@ -458,7 +463,7 @@
           <a:p>
             <a:fld id="{7DFF92C5-6146-4B60-B7D1-75DB42B1D625}" type="datetimeFigureOut">
               <a:rPr lang="vi-VN" smtClean="0"/>
-              <a:t>26/11/2025</a:t>
+              <a:t>28/11/2025</a:t>
             </a:fld>
             <a:endParaRPr lang="vi-VN"/>
           </a:p>
@@ -668,7 +673,7 @@
           <a:p>
             <a:fld id="{7DFF92C5-6146-4B60-B7D1-75DB42B1D625}" type="datetimeFigureOut">
               <a:rPr lang="vi-VN" smtClean="0"/>
-              <a:t>26/11/2025</a:t>
+              <a:t>28/11/2025</a:t>
             </a:fld>
             <a:endParaRPr lang="vi-VN"/>
           </a:p>
@@ -868,7 +873,7 @@
           <a:p>
             <a:fld id="{7DFF92C5-6146-4B60-B7D1-75DB42B1D625}" type="datetimeFigureOut">
               <a:rPr lang="vi-VN" smtClean="0"/>
-              <a:t>26/11/2025</a:t>
+              <a:t>28/11/2025</a:t>
             </a:fld>
             <a:endParaRPr lang="vi-VN"/>
           </a:p>
@@ -1144,7 +1149,7 @@
           <a:p>
             <a:fld id="{7DFF92C5-6146-4B60-B7D1-75DB42B1D625}" type="datetimeFigureOut">
               <a:rPr lang="vi-VN" smtClean="0"/>
-              <a:t>26/11/2025</a:t>
+              <a:t>28/11/2025</a:t>
             </a:fld>
             <a:endParaRPr lang="vi-VN"/>
           </a:p>
@@ -1412,7 +1417,7 @@
           <a:p>
             <a:fld id="{7DFF92C5-6146-4B60-B7D1-75DB42B1D625}" type="datetimeFigureOut">
               <a:rPr lang="vi-VN" smtClean="0"/>
-              <a:t>26/11/2025</a:t>
+              <a:t>28/11/2025</a:t>
             </a:fld>
             <a:endParaRPr lang="vi-VN"/>
           </a:p>
@@ -1827,7 +1832,7 @@
           <a:p>
             <a:fld id="{7DFF92C5-6146-4B60-B7D1-75DB42B1D625}" type="datetimeFigureOut">
               <a:rPr lang="vi-VN" smtClean="0"/>
-              <a:t>26/11/2025</a:t>
+              <a:t>28/11/2025</a:t>
             </a:fld>
             <a:endParaRPr lang="vi-VN"/>
           </a:p>
@@ -1969,7 +1974,7 @@
           <a:p>
             <a:fld id="{7DFF92C5-6146-4B60-B7D1-75DB42B1D625}" type="datetimeFigureOut">
               <a:rPr lang="vi-VN" smtClean="0"/>
-              <a:t>26/11/2025</a:t>
+              <a:t>28/11/2025</a:t>
             </a:fld>
             <a:endParaRPr lang="vi-VN"/>
           </a:p>
@@ -2082,7 +2087,7 @@
           <a:p>
             <a:fld id="{7DFF92C5-6146-4B60-B7D1-75DB42B1D625}" type="datetimeFigureOut">
               <a:rPr lang="vi-VN" smtClean="0"/>
-              <a:t>26/11/2025</a:t>
+              <a:t>28/11/2025</a:t>
             </a:fld>
             <a:endParaRPr lang="vi-VN"/>
           </a:p>
@@ -2395,7 +2400,7 @@
           <a:p>
             <a:fld id="{7DFF92C5-6146-4B60-B7D1-75DB42B1D625}" type="datetimeFigureOut">
               <a:rPr lang="vi-VN" smtClean="0"/>
-              <a:t>26/11/2025</a:t>
+              <a:t>28/11/2025</a:t>
             </a:fld>
             <a:endParaRPr lang="vi-VN"/>
           </a:p>
@@ -2684,7 +2689,7 @@
           <a:p>
             <a:fld id="{7DFF92C5-6146-4B60-B7D1-75DB42B1D625}" type="datetimeFigureOut">
               <a:rPr lang="vi-VN" smtClean="0"/>
-              <a:t>26/11/2025</a:t>
+              <a:t>28/11/2025</a:t>
             </a:fld>
             <a:endParaRPr lang="vi-VN"/>
           </a:p>
@@ -2927,7 +2932,7 @@
           <a:p>
             <a:fld id="{7DFF92C5-6146-4B60-B7D1-75DB42B1D625}" type="datetimeFigureOut">
               <a:rPr lang="vi-VN" smtClean="0"/>
-              <a:t>26/11/2025</a:t>
+              <a:t>28/11/2025</a:t>
             </a:fld>
             <a:endParaRPr lang="vi-VN"/>
           </a:p>
@@ -3418,53 +3423,12 @@
           <a:chExt cx="0" cy="0"/>
         </a:xfrm>
       </p:grpSpPr>
-      <p:cxnSp>
-        <p:nvCxnSpPr>
-          <p:cNvPr id="91" name="Straight Connector 90">
-            <a:extLst>
-              <a:ext uri="{FF2B5EF4-FFF2-40B4-BE49-F238E27FC236}">
-                <a16:creationId xmlns:a16="http://schemas.microsoft.com/office/drawing/2014/main" id="{59F15CE6-8246-7B9C-8525-BD51E40338DA}"/>
-              </a:ext>
-            </a:extLst>
-          </p:cNvPr>
-          <p:cNvCxnSpPr/>
-          <p:nvPr/>
-        </p:nvCxnSpPr>
-        <p:spPr>
-          <a:xfrm>
-            <a:off x="10896600" y="1316517"/>
-            <a:ext cx="0" cy="2452303"/>
-          </a:xfrm>
-          <a:prstGeom prst="line">
-            <a:avLst/>
-          </a:prstGeom>
-          <a:ln w="38100">
-            <a:solidFill>
-              <a:srgbClr val="FF0000"/>
-            </a:solidFill>
-          </a:ln>
-        </p:spPr>
-        <p:style>
-          <a:lnRef idx="2">
-            <a:schemeClr val="accent1"/>
-          </a:lnRef>
-          <a:fillRef idx="0">
-            <a:schemeClr val="accent1"/>
-          </a:fillRef>
-          <a:effectRef idx="1">
-            <a:schemeClr val="accent1"/>
-          </a:effectRef>
-          <a:fontRef idx="minor">
-            <a:schemeClr val="tx1"/>
-          </a:fontRef>
-        </p:style>
-      </p:cxnSp>
       <p:grpSp>
         <p:nvGrpSpPr>
-          <p:cNvPr id="120" name="Group 119">
-            <a:extLst>
-              <a:ext uri="{FF2B5EF4-FFF2-40B4-BE49-F238E27FC236}">
-                <a16:creationId xmlns:a16="http://schemas.microsoft.com/office/drawing/2014/main" id="{7A2E06FF-7B3A-3908-A205-6308EB09E493}"/>
+          <p:cNvPr id="8" name="Group 7">
+            <a:extLst>
+              <a:ext uri="{FF2B5EF4-FFF2-40B4-BE49-F238E27FC236}">
+                <a16:creationId xmlns:a16="http://schemas.microsoft.com/office/drawing/2014/main" id="{29FDD7A9-64E9-1163-A419-DC70FE370441}"/>
               </a:ext>
             </a:extLst>
           </p:cNvPr>
@@ -3473,18 +3437,105 @@
         </p:nvGrpSpPr>
         <p:grpSpPr>
           <a:xfrm>
-            <a:off x="643337" y="522310"/>
-            <a:ext cx="8004576" cy="5342445"/>
-            <a:chOff x="481412" y="484210"/>
-            <a:chExt cx="8004576" cy="5342445"/>
+            <a:off x="1577334" y="522310"/>
+            <a:ext cx="652735" cy="919418"/>
+            <a:chOff x="4566965" y="1611165"/>
+            <a:chExt cx="652735" cy="919418"/>
+          </a:xfrm>
+        </p:grpSpPr>
+        <p:pic>
+          <p:nvPicPr>
+            <p:cNvPr id="5" name="Picture 4">
+              <a:extLst>
+                <a:ext uri="{FF2B5EF4-FFF2-40B4-BE49-F238E27FC236}">
+                  <a16:creationId xmlns:a16="http://schemas.microsoft.com/office/drawing/2014/main" id="{06C8CB4E-4A27-62EF-D1DE-DA98B4B6B69D}"/>
+                </a:ext>
+              </a:extLst>
+            </p:cNvPr>
+            <p:cNvPicPr>
+              <a:picLocks noChangeAspect="1"/>
+            </p:cNvPicPr>
+            <p:nvPr/>
+          </p:nvPicPr>
+          <p:blipFill>
+            <a:blip r:embed="rId2"/>
+            <a:stretch>
+              <a:fillRect/>
+            </a:stretch>
+          </p:blipFill>
+          <p:spPr>
+            <a:xfrm>
+              <a:off x="4566965" y="1611165"/>
+              <a:ext cx="652735" cy="665502"/>
+            </a:xfrm>
+            <a:prstGeom prst="rect">
+              <a:avLst/>
+            </a:prstGeom>
+          </p:spPr>
+        </p:pic>
+        <p:sp>
+          <p:nvSpPr>
+            <p:cNvPr id="7" name="TextBox 6">
+              <a:extLst>
+                <a:ext uri="{FF2B5EF4-FFF2-40B4-BE49-F238E27FC236}">
+                  <a16:creationId xmlns:a16="http://schemas.microsoft.com/office/drawing/2014/main" id="{364E44BD-6DB7-84F9-D289-D9B4EE09158C}"/>
+                </a:ext>
+              </a:extLst>
+            </p:cNvPr>
+            <p:cNvSpPr txBox="1"/>
+            <p:nvPr/>
+          </p:nvSpPr>
+          <p:spPr>
+            <a:xfrm>
+              <a:off x="4659970" y="2276667"/>
+              <a:ext cx="466724" cy="253916"/>
+            </a:xfrm>
+            <a:prstGeom prst="rect">
+              <a:avLst/>
+            </a:prstGeom>
+            <a:noFill/>
+          </p:spPr>
+          <p:txBody>
+            <a:bodyPr wrap="square" rtlCol="0">
+              <a:spAutoFit/>
+            </a:bodyPr>
+            <a:lstStyle/>
+            <a:p>
+              <a:r>
+                <a:rPr lang="en-US" sz="1050" dirty="0"/>
+                <a:t>User</a:t>
+              </a:r>
+              <a:endParaRPr lang="en-US" dirty="0"/>
+            </a:p>
+          </p:txBody>
+        </p:sp>
+      </p:grpSp>
+      <p:grpSp>
+        <p:nvGrpSpPr>
+          <p:cNvPr id="25" name="Group 24">
+            <a:extLst>
+              <a:ext uri="{FF2B5EF4-FFF2-40B4-BE49-F238E27FC236}">
+                <a16:creationId xmlns:a16="http://schemas.microsoft.com/office/drawing/2014/main" id="{261C8242-6733-C3DE-C477-3F36319833AF}"/>
+              </a:ext>
+            </a:extLst>
+          </p:cNvPr>
+          <p:cNvGrpSpPr/>
+          <p:nvPr/>
+        </p:nvGrpSpPr>
+        <p:grpSpPr>
+          <a:xfrm>
+            <a:off x="1263672" y="1921941"/>
+            <a:ext cx="1269022" cy="1380963"/>
+            <a:chOff x="3112478" y="2386733"/>
+            <a:chExt cx="1269022" cy="1380963"/>
           </a:xfrm>
         </p:grpSpPr>
         <p:grpSp>
           <p:nvGrpSpPr>
-            <p:cNvPr id="8" name="Group 7">
+            <p:cNvPr id="18" name="Group 17">
               <a:extLst>
                 <a:ext uri="{FF2B5EF4-FFF2-40B4-BE49-F238E27FC236}">
-                  <a16:creationId xmlns:a16="http://schemas.microsoft.com/office/drawing/2014/main" id="{29FDD7A9-64E9-1163-A419-DC70FE370441}"/>
+                  <a16:creationId xmlns:a16="http://schemas.microsoft.com/office/drawing/2014/main" id="{52C10680-1538-1CB8-B9EC-D23D2FF60509}"/>
                 </a:ext>
               </a:extLst>
             </p:cNvPr>
@@ -3493,18 +3544,18 @@
           </p:nvGrpSpPr>
           <p:grpSpPr>
             <a:xfrm>
-              <a:off x="1415409" y="484210"/>
-              <a:ext cx="652735" cy="919418"/>
-              <a:chOff x="4566965" y="1611165"/>
-              <a:chExt cx="652735" cy="919418"/>
+              <a:off x="3229783" y="2641233"/>
+              <a:ext cx="1027648" cy="889283"/>
+              <a:chOff x="1048558" y="2206342"/>
+              <a:chExt cx="1695976" cy="1356908"/>
             </a:xfrm>
           </p:grpSpPr>
           <p:pic>
             <p:nvPicPr>
-              <p:cNvPr id="5" name="Picture 4">
+              <p:cNvPr id="14" name="Picture 13">
                 <a:extLst>
                   <a:ext uri="{FF2B5EF4-FFF2-40B4-BE49-F238E27FC236}">
-                    <a16:creationId xmlns:a16="http://schemas.microsoft.com/office/drawing/2014/main" id="{06C8CB4E-4A27-62EF-D1DE-DA98B4B6B69D}"/>
+                    <a16:creationId xmlns:a16="http://schemas.microsoft.com/office/drawing/2014/main" id="{839CC9D0-E34C-42F2-F5EA-54FC2F14CB03}"/>
                   </a:ext>
                 </a:extLst>
               </p:cNvPr>
@@ -3514,15 +3565,341 @@
               <p:nvPr/>
             </p:nvPicPr>
             <p:blipFill>
-              <a:blip r:embed="rId2"/>
+              <a:blip r:embed="rId3"/>
               <a:stretch>
                 <a:fillRect/>
               </a:stretch>
             </p:blipFill>
             <p:spPr>
               <a:xfrm>
-                <a:off x="4566965" y="1611165"/>
-                <a:ext cx="652735" cy="665502"/>
+                <a:off x="1426940" y="2291761"/>
+                <a:ext cx="920163" cy="1262271"/>
+              </a:xfrm>
+              <a:prstGeom prst="rect">
+                <a:avLst/>
+              </a:prstGeom>
+            </p:spPr>
+          </p:pic>
+          <p:pic>
+            <p:nvPicPr>
+              <p:cNvPr id="16" name="Picture 15" descr="A green robot with two eyes&#10;&#10;AI-generated content may be incorrect.">
+                <a:extLst>
+                  <a:ext uri="{FF2B5EF4-FFF2-40B4-BE49-F238E27FC236}">
+                    <a16:creationId xmlns:a16="http://schemas.microsoft.com/office/drawing/2014/main" id="{174ACFAA-19A2-B0CB-4027-32A151848EA1}"/>
+                  </a:ext>
+                </a:extLst>
+              </p:cNvPr>
+              <p:cNvPicPr>
+                <a:picLocks noChangeAspect="1"/>
+              </p:cNvPicPr>
+              <p:nvPr/>
+            </p:nvPicPr>
+            <p:blipFill>
+              <a:blip r:embed="rId4">
+                <a:extLst>
+                  <a:ext uri="{28A0092B-C50C-407E-A947-70E740481C1C}">
+                    <a14:useLocalDpi xmlns:a14="http://schemas.microsoft.com/office/drawing/2010/main" val="0"/>
+                  </a:ext>
+                </a:extLst>
+              </a:blip>
+              <a:stretch>
+                <a:fillRect/>
+              </a:stretch>
+            </p:blipFill>
+            <p:spPr>
+              <a:xfrm>
+                <a:off x="1048558" y="2206342"/>
+                <a:ext cx="1695976" cy="1356908"/>
+              </a:xfrm>
+              <a:prstGeom prst="rect">
+                <a:avLst/>
+              </a:prstGeom>
+            </p:spPr>
+          </p:pic>
+        </p:grpSp>
+        <p:sp>
+          <p:nvSpPr>
+            <p:cNvPr id="20" name="TextBox 19">
+              <a:extLst>
+                <a:ext uri="{FF2B5EF4-FFF2-40B4-BE49-F238E27FC236}">
+                  <a16:creationId xmlns:a16="http://schemas.microsoft.com/office/drawing/2014/main" id="{D57991F5-A122-79B4-9AAF-6977408F362E}"/>
+                </a:ext>
+              </a:extLst>
+            </p:cNvPr>
+            <p:cNvSpPr txBox="1"/>
+            <p:nvPr/>
+          </p:nvSpPr>
+          <p:spPr>
+            <a:xfrm>
+              <a:off x="3184686" y="3513780"/>
+              <a:ext cx="1129895" cy="253916"/>
+            </a:xfrm>
+            <a:prstGeom prst="rect">
+              <a:avLst/>
+            </a:prstGeom>
+            <a:noFill/>
+          </p:spPr>
+          <p:txBody>
+            <a:bodyPr wrap="square" rtlCol="0">
+              <a:spAutoFit/>
+            </a:bodyPr>
+            <a:lstStyle/>
+            <a:p>
+              <a:r>
+                <a:rPr lang="en-US" sz="1050" dirty="0"/>
+                <a:t>Android devices</a:t>
+              </a:r>
+              <a:endParaRPr lang="en-US" dirty="0"/>
+            </a:p>
+          </p:txBody>
+        </p:sp>
+        <p:sp>
+          <p:nvSpPr>
+            <p:cNvPr id="21" name="TextBox 20">
+              <a:extLst>
+                <a:ext uri="{FF2B5EF4-FFF2-40B4-BE49-F238E27FC236}">
+                  <a16:creationId xmlns:a16="http://schemas.microsoft.com/office/drawing/2014/main" id="{68C2B08B-8AA8-9462-8E2E-5650D5E4F1C8}"/>
+                </a:ext>
+              </a:extLst>
+            </p:cNvPr>
+            <p:cNvSpPr txBox="1"/>
+            <p:nvPr/>
+          </p:nvSpPr>
+          <p:spPr>
+            <a:xfrm>
+              <a:off x="3122004" y="2386733"/>
+              <a:ext cx="1259496" cy="292388"/>
+            </a:xfrm>
+            <a:prstGeom prst="rect">
+              <a:avLst/>
+            </a:prstGeom>
+            <a:noFill/>
+          </p:spPr>
+          <p:txBody>
+            <a:bodyPr wrap="square" rtlCol="0">
+              <a:spAutoFit/>
+            </a:bodyPr>
+            <a:lstStyle/>
+            <a:p>
+              <a:r>
+                <a:rPr lang="en-US" sz="1300" b="1" dirty="0">
+                  <a:solidFill>
+                    <a:srgbClr val="F39D03"/>
+                  </a:solidFill>
+                </a:rPr>
+                <a:t>Mobile Device</a:t>
+              </a:r>
+            </a:p>
+          </p:txBody>
+        </p:sp>
+        <p:sp>
+          <p:nvSpPr>
+            <p:cNvPr id="24" name="Rectangle 23">
+              <a:extLst>
+                <a:ext uri="{FF2B5EF4-FFF2-40B4-BE49-F238E27FC236}">
+                  <a16:creationId xmlns:a16="http://schemas.microsoft.com/office/drawing/2014/main" id="{2FF2C56E-26D0-47B6-8BA2-67145CF16800}"/>
+                </a:ext>
+              </a:extLst>
+            </p:cNvPr>
+            <p:cNvSpPr/>
+            <p:nvPr/>
+          </p:nvSpPr>
+          <p:spPr>
+            <a:xfrm>
+              <a:off x="3112478" y="2386733"/>
+              <a:ext cx="1259497" cy="1380963"/>
+            </a:xfrm>
+            <a:prstGeom prst="rect">
+              <a:avLst/>
+            </a:prstGeom>
+            <a:noFill/>
+            <a:ln w="28575">
+              <a:solidFill>
+                <a:srgbClr val="EEB500"/>
+              </a:solidFill>
+            </a:ln>
+          </p:spPr>
+          <p:style>
+            <a:lnRef idx="2">
+              <a:schemeClr val="accent1">
+                <a:shade val="15000"/>
+              </a:schemeClr>
+            </a:lnRef>
+            <a:fillRef idx="1">
+              <a:schemeClr val="accent1"/>
+            </a:fillRef>
+            <a:effectRef idx="0">
+              <a:schemeClr val="accent1"/>
+            </a:effectRef>
+            <a:fontRef idx="minor">
+              <a:schemeClr val="lt1"/>
+            </a:fontRef>
+          </p:style>
+          <p:txBody>
+            <a:bodyPr rtlCol="0" anchor="ctr"/>
+            <a:lstStyle/>
+            <a:p>
+              <a:pPr algn="ctr"/>
+              <a:endParaRPr lang="vi-VN"/>
+            </a:p>
+          </p:txBody>
+        </p:sp>
+      </p:grpSp>
+      <p:grpSp>
+        <p:nvGrpSpPr>
+          <p:cNvPr id="47" name="Group 46">
+            <a:extLst>
+              <a:ext uri="{FF2B5EF4-FFF2-40B4-BE49-F238E27FC236}">
+                <a16:creationId xmlns:a16="http://schemas.microsoft.com/office/drawing/2014/main" id="{1A8B0600-9F80-0798-7C42-F5453A92E7B5}"/>
+              </a:ext>
+            </a:extLst>
+          </p:cNvPr>
+          <p:cNvGrpSpPr/>
+          <p:nvPr/>
+        </p:nvGrpSpPr>
+        <p:grpSpPr>
+          <a:xfrm>
+            <a:off x="643337" y="4169304"/>
+            <a:ext cx="2510433" cy="1695451"/>
+            <a:chOff x="2385417" y="4314825"/>
+            <a:chExt cx="2510433" cy="1695451"/>
+          </a:xfrm>
+        </p:grpSpPr>
+        <p:sp>
+          <p:nvSpPr>
+            <p:cNvPr id="40" name="TextBox 39">
+              <a:extLst>
+                <a:ext uri="{FF2B5EF4-FFF2-40B4-BE49-F238E27FC236}">
+                  <a16:creationId xmlns:a16="http://schemas.microsoft.com/office/drawing/2014/main" id="{E5618004-EFC1-B0BD-3D5D-EF02B8779358}"/>
+                </a:ext>
+              </a:extLst>
+            </p:cNvPr>
+            <p:cNvSpPr txBox="1"/>
+            <p:nvPr/>
+          </p:nvSpPr>
+          <p:spPr>
+            <a:xfrm>
+              <a:off x="2642959" y="4387306"/>
+              <a:ext cx="2002446" cy="292388"/>
+            </a:xfrm>
+            <a:prstGeom prst="rect">
+              <a:avLst/>
+            </a:prstGeom>
+            <a:noFill/>
+          </p:spPr>
+          <p:txBody>
+            <a:bodyPr wrap="square" rtlCol="0">
+              <a:spAutoFit/>
+            </a:bodyPr>
+            <a:lstStyle/>
+            <a:p>
+              <a:r>
+                <a:rPr lang="en-US" sz="1300" b="1" dirty="0">
+                  <a:solidFill>
+                    <a:srgbClr val="F39D03"/>
+                  </a:solidFill>
+                </a:rPr>
+                <a:t>Local Data Management</a:t>
+              </a:r>
+            </a:p>
+          </p:txBody>
+        </p:sp>
+        <p:sp>
+          <p:nvSpPr>
+            <p:cNvPr id="41" name="Rectangle 40">
+              <a:extLst>
+                <a:ext uri="{FF2B5EF4-FFF2-40B4-BE49-F238E27FC236}">
+                  <a16:creationId xmlns:a16="http://schemas.microsoft.com/office/drawing/2014/main" id="{50B81595-800E-A0B2-9EB7-114C95566B76}"/>
+                </a:ext>
+              </a:extLst>
+            </p:cNvPr>
+            <p:cNvSpPr/>
+            <p:nvPr/>
+          </p:nvSpPr>
+          <p:spPr>
+            <a:xfrm>
+              <a:off x="2385417" y="4314825"/>
+              <a:ext cx="2510433" cy="1695451"/>
+            </a:xfrm>
+            <a:prstGeom prst="rect">
+              <a:avLst/>
+            </a:prstGeom>
+            <a:noFill/>
+            <a:ln w="28575">
+              <a:solidFill>
+                <a:srgbClr val="EEB500"/>
+              </a:solidFill>
+            </a:ln>
+          </p:spPr>
+          <p:style>
+            <a:lnRef idx="2">
+              <a:schemeClr val="accent1">
+                <a:shade val="15000"/>
+              </a:schemeClr>
+            </a:lnRef>
+            <a:fillRef idx="1">
+              <a:schemeClr val="accent1"/>
+            </a:fillRef>
+            <a:effectRef idx="0">
+              <a:schemeClr val="accent1"/>
+            </a:effectRef>
+            <a:fontRef idx="minor">
+              <a:schemeClr val="lt1"/>
+            </a:fontRef>
+          </p:style>
+          <p:txBody>
+            <a:bodyPr rtlCol="0" anchor="ctr"/>
+            <a:lstStyle/>
+            <a:p>
+              <a:pPr algn="ctr"/>
+              <a:endParaRPr lang="vi-VN"/>
+            </a:p>
+          </p:txBody>
+        </p:sp>
+        <p:grpSp>
+          <p:nvGrpSpPr>
+            <p:cNvPr id="45" name="Group 44">
+              <a:extLst>
+                <a:ext uri="{FF2B5EF4-FFF2-40B4-BE49-F238E27FC236}">
+                  <a16:creationId xmlns:a16="http://schemas.microsoft.com/office/drawing/2014/main" id="{76739B33-4B8C-E985-90EE-9C40A6E2ED8F}"/>
+                </a:ext>
+              </a:extLst>
+            </p:cNvPr>
+            <p:cNvGrpSpPr/>
+            <p:nvPr/>
+          </p:nvGrpSpPr>
+          <p:grpSpPr>
+            <a:xfrm>
+              <a:off x="2542999" y="4829950"/>
+              <a:ext cx="897897" cy="988067"/>
+              <a:chOff x="2542999" y="4829950"/>
+              <a:chExt cx="897897" cy="988067"/>
+            </a:xfrm>
+          </p:grpSpPr>
+          <p:pic>
+            <p:nvPicPr>
+              <p:cNvPr id="34" name="Picture 33">
+                <a:extLst>
+                  <a:ext uri="{FF2B5EF4-FFF2-40B4-BE49-F238E27FC236}">
+                    <a16:creationId xmlns:a16="http://schemas.microsoft.com/office/drawing/2014/main" id="{D377FD82-D83D-0996-8C91-F25E8DBF4F3A}"/>
+                  </a:ext>
+                </a:extLst>
+              </p:cNvPr>
+              <p:cNvPicPr>
+                <a:picLocks noChangeAspect="1"/>
+              </p:cNvPicPr>
+              <p:nvPr/>
+            </p:nvPicPr>
+            <p:blipFill>
+              <a:blip r:embed="rId5"/>
+              <a:stretch>
+                <a:fillRect/>
+              </a:stretch>
+            </p:blipFill>
+            <p:spPr>
+              <a:xfrm>
+                <a:off x="2725923" y="4913588"/>
+                <a:ext cx="514806" cy="650514"/>
               </a:xfrm>
               <a:prstGeom prst="rect">
                 <a:avLst/>
@@ -3531,10 +3908,10 @@
           </p:pic>
           <p:sp>
             <p:nvSpPr>
-              <p:cNvPr id="7" name="TextBox 6">
+              <p:cNvPr id="38" name="TextBox 37">
                 <a:extLst>
                   <a:ext uri="{FF2B5EF4-FFF2-40B4-BE49-F238E27FC236}">
-                    <a16:creationId xmlns:a16="http://schemas.microsoft.com/office/drawing/2014/main" id="{364E44BD-6DB7-84F9-D289-D9B4EE09158C}"/>
+                    <a16:creationId xmlns:a16="http://schemas.microsoft.com/office/drawing/2014/main" id="{B200876F-2A09-0938-1852-96AF5A229B92}"/>
                   </a:ext>
                 </a:extLst>
               </p:cNvPr>
@@ -3543,8 +3920,8 @@
             </p:nvSpPr>
             <p:spPr>
               <a:xfrm>
-                <a:off x="4659970" y="2276667"/>
-                <a:ext cx="466724" cy="253916"/>
+                <a:off x="2582905" y="5535527"/>
+                <a:ext cx="857991" cy="253916"/>
               </a:xfrm>
               <a:prstGeom prst="rect">
                 <a:avLst/>
@@ -3558,152 +3935,10 @@
               <a:lstStyle/>
               <a:p>
                 <a:r>
-                  <a:rPr lang="en-US" sz="1050" dirty="0"/>
-                  <a:t>User</a:t>
-                </a:r>
-                <a:endParaRPr lang="en-US" dirty="0"/>
-              </a:p>
-            </p:txBody>
-          </p:sp>
-        </p:grpSp>
-        <p:grpSp>
-          <p:nvGrpSpPr>
-            <p:cNvPr id="25" name="Group 24">
-              <a:extLst>
-                <a:ext uri="{FF2B5EF4-FFF2-40B4-BE49-F238E27FC236}">
-                  <a16:creationId xmlns:a16="http://schemas.microsoft.com/office/drawing/2014/main" id="{261C8242-6733-C3DE-C477-3F36319833AF}"/>
-                </a:ext>
-              </a:extLst>
-            </p:cNvPr>
-            <p:cNvGrpSpPr/>
-            <p:nvPr/>
-          </p:nvGrpSpPr>
-          <p:grpSpPr>
-            <a:xfrm>
-              <a:off x="1101747" y="1883841"/>
-              <a:ext cx="1269022" cy="1380963"/>
-              <a:chOff x="3112478" y="2386733"/>
-              <a:chExt cx="1269022" cy="1380963"/>
-            </a:xfrm>
-          </p:grpSpPr>
-          <p:grpSp>
-            <p:nvGrpSpPr>
-              <p:cNvPr id="18" name="Group 17">
-                <a:extLst>
-                  <a:ext uri="{FF2B5EF4-FFF2-40B4-BE49-F238E27FC236}">
-                    <a16:creationId xmlns:a16="http://schemas.microsoft.com/office/drawing/2014/main" id="{52C10680-1538-1CB8-B9EC-D23D2FF60509}"/>
-                  </a:ext>
-                </a:extLst>
-              </p:cNvPr>
-              <p:cNvGrpSpPr/>
-              <p:nvPr/>
-            </p:nvGrpSpPr>
-            <p:grpSpPr>
-              <a:xfrm>
-                <a:off x="3229783" y="2641233"/>
-                <a:ext cx="1027648" cy="889283"/>
-                <a:chOff x="1048558" y="2206342"/>
-                <a:chExt cx="1695976" cy="1356908"/>
-              </a:xfrm>
-            </p:grpSpPr>
-            <p:pic>
-              <p:nvPicPr>
-                <p:cNvPr id="14" name="Picture 13">
-                  <a:extLst>
-                    <a:ext uri="{FF2B5EF4-FFF2-40B4-BE49-F238E27FC236}">
-                      <a16:creationId xmlns:a16="http://schemas.microsoft.com/office/drawing/2014/main" id="{839CC9D0-E34C-42F2-F5EA-54FC2F14CB03}"/>
-                    </a:ext>
-                  </a:extLst>
-                </p:cNvPr>
-                <p:cNvPicPr>
-                  <a:picLocks noChangeAspect="1"/>
-                </p:cNvPicPr>
-                <p:nvPr/>
-              </p:nvPicPr>
-              <p:blipFill>
-                <a:blip r:embed="rId3"/>
-                <a:stretch>
-                  <a:fillRect/>
-                </a:stretch>
-              </p:blipFill>
-              <p:spPr>
-                <a:xfrm>
-                  <a:off x="1426940" y="2291761"/>
-                  <a:ext cx="920163" cy="1262271"/>
-                </a:xfrm>
-                <a:prstGeom prst="rect">
-                  <a:avLst/>
-                </a:prstGeom>
-              </p:spPr>
-            </p:pic>
-            <p:pic>
-              <p:nvPicPr>
-                <p:cNvPr id="16" name="Picture 15" descr="A green robot with two eyes&#10;&#10;AI-generated content may be incorrect.">
-                  <a:extLst>
-                    <a:ext uri="{FF2B5EF4-FFF2-40B4-BE49-F238E27FC236}">
-                      <a16:creationId xmlns:a16="http://schemas.microsoft.com/office/drawing/2014/main" id="{174ACFAA-19A2-B0CB-4027-32A151848EA1}"/>
-                    </a:ext>
-                  </a:extLst>
-                </p:cNvPr>
-                <p:cNvPicPr>
-                  <a:picLocks noChangeAspect="1"/>
-                </p:cNvPicPr>
-                <p:nvPr/>
-              </p:nvPicPr>
-              <p:blipFill>
-                <a:blip r:embed="rId4">
-                  <a:extLst>
-                    <a:ext uri="{28A0092B-C50C-407E-A947-70E740481C1C}">
-                      <a14:useLocalDpi xmlns:a14="http://schemas.microsoft.com/office/drawing/2010/main" val="0"/>
-                    </a:ext>
-                  </a:extLst>
-                </a:blip>
-                <a:stretch>
-                  <a:fillRect/>
-                </a:stretch>
-              </p:blipFill>
-              <p:spPr>
-                <a:xfrm>
-                  <a:off x="1048558" y="2206342"/>
-                  <a:ext cx="1695976" cy="1356908"/>
-                </a:xfrm>
-                <a:prstGeom prst="rect">
-                  <a:avLst/>
-                </a:prstGeom>
-              </p:spPr>
-            </p:pic>
-          </p:grpSp>
-          <p:sp>
-            <p:nvSpPr>
-              <p:cNvPr id="20" name="TextBox 19">
-                <a:extLst>
-                  <a:ext uri="{FF2B5EF4-FFF2-40B4-BE49-F238E27FC236}">
-                    <a16:creationId xmlns:a16="http://schemas.microsoft.com/office/drawing/2014/main" id="{D57991F5-A122-79B4-9AAF-6977408F362E}"/>
-                  </a:ext>
-                </a:extLst>
-              </p:cNvPr>
-              <p:cNvSpPr txBox="1"/>
-              <p:nvPr/>
-            </p:nvSpPr>
-            <p:spPr>
-              <a:xfrm>
-                <a:off x="3184686" y="3513780"/>
-                <a:ext cx="1129895" cy="253916"/>
-              </a:xfrm>
-              <a:prstGeom prst="rect">
-                <a:avLst/>
-              </a:prstGeom>
-              <a:noFill/>
-            </p:spPr>
-            <p:txBody>
-              <a:bodyPr wrap="square" rtlCol="0">
-                <a:spAutoFit/>
-              </a:bodyPr>
-              <a:lstStyle/>
-              <a:p>
-                <a:r>
-                  <a:rPr lang="en-US" sz="1050" dirty="0"/>
-                  <a:t>Android devices</a:t>
+                  <a:rPr lang="vi-VN" sz="1050" dirty="0">
+                    <a:latin typeface="Aptos (Body)"/>
+                  </a:rPr>
+                  <a:t>Structured</a:t>
                 </a:r>
                 <a:endParaRPr lang="en-US" dirty="0"/>
               </a:p>
@@ -3711,49 +3946,10 @@
           </p:sp>
           <p:sp>
             <p:nvSpPr>
-              <p:cNvPr id="21" name="TextBox 20">
+              <p:cNvPr id="42" name="Rectangle 41">
                 <a:extLst>
                   <a:ext uri="{FF2B5EF4-FFF2-40B4-BE49-F238E27FC236}">
-                    <a16:creationId xmlns:a16="http://schemas.microsoft.com/office/drawing/2014/main" id="{68C2B08B-8AA8-9462-8E2E-5650D5E4F1C8}"/>
-                  </a:ext>
-                </a:extLst>
-              </p:cNvPr>
-              <p:cNvSpPr txBox="1"/>
-              <p:nvPr/>
-            </p:nvSpPr>
-            <p:spPr>
-              <a:xfrm>
-                <a:off x="3122004" y="2386733"/>
-                <a:ext cx="1259496" cy="292388"/>
-              </a:xfrm>
-              <a:prstGeom prst="rect">
-                <a:avLst/>
-              </a:prstGeom>
-              <a:noFill/>
-            </p:spPr>
-            <p:txBody>
-              <a:bodyPr wrap="square" rtlCol="0">
-                <a:spAutoFit/>
-              </a:bodyPr>
-              <a:lstStyle/>
-              <a:p>
-                <a:r>
-                  <a:rPr lang="en-US" sz="1300" b="1" dirty="0">
-                    <a:solidFill>
-                      <a:srgbClr val="F39D03"/>
-                    </a:solidFill>
-                  </a:rPr>
-                  <a:t>Mobile Device</a:t>
-                </a:r>
-              </a:p>
-            </p:txBody>
-          </p:sp>
-          <p:sp>
-            <p:nvSpPr>
-              <p:cNvPr id="24" name="Rectangle 23">
-                <a:extLst>
-                  <a:ext uri="{FF2B5EF4-FFF2-40B4-BE49-F238E27FC236}">
-                    <a16:creationId xmlns:a16="http://schemas.microsoft.com/office/drawing/2014/main" id="{2FF2C56E-26D0-47B6-8BA2-67145CF16800}"/>
+                    <a16:creationId xmlns:a16="http://schemas.microsoft.com/office/drawing/2014/main" id="{FBBC51B7-1401-3B2D-DC74-AC24D5A28EF2}"/>
                   </a:ext>
                 </a:extLst>
               </p:cNvPr>
@@ -3762,17 +3958,21 @@
             </p:nvSpPr>
             <p:spPr>
               <a:xfrm>
-                <a:off x="3112478" y="2386733"/>
-                <a:ext cx="1259497" cy="1380963"/>
+                <a:off x="2542999" y="4829950"/>
+                <a:ext cx="857992" cy="988067"/>
               </a:xfrm>
               <a:prstGeom prst="rect">
                 <a:avLst/>
               </a:prstGeom>
               <a:noFill/>
-              <a:ln w="28575">
+              <a:ln>
                 <a:solidFill>
-                  <a:srgbClr val="EEB500"/>
+                  <a:schemeClr val="accent6">
+                    <a:lumMod val="60000"/>
+                    <a:lumOff val="40000"/>
+                  </a:schemeClr>
                 </a:solidFill>
+                <a:prstDash val="dash"/>
               </a:ln>
             </p:spPr>
             <p:style>
@@ -3803,10 +4003,10 @@
         </p:grpSp>
         <p:grpSp>
           <p:nvGrpSpPr>
-            <p:cNvPr id="47" name="Group 46">
+            <p:cNvPr id="46" name="Group 45">
               <a:extLst>
                 <a:ext uri="{FF2B5EF4-FFF2-40B4-BE49-F238E27FC236}">
-                  <a16:creationId xmlns:a16="http://schemas.microsoft.com/office/drawing/2014/main" id="{1A8B0600-9F80-0798-7C42-F5453A92E7B5}"/>
+                  <a16:creationId xmlns:a16="http://schemas.microsoft.com/office/drawing/2014/main" id="{6A62518D-7089-B796-2740-B8B5985A77B9}"/>
                 </a:ext>
               </a:extLst>
             </p:cNvPr>
@@ -3815,18 +4015,48 @@
           </p:nvGrpSpPr>
           <p:grpSpPr>
             <a:xfrm>
-              <a:off x="481412" y="4131204"/>
-              <a:ext cx="2510433" cy="1695451"/>
-              <a:chOff x="2385417" y="4314825"/>
-              <a:chExt cx="2510433" cy="1695451"/>
+              <a:off x="3822414" y="4791850"/>
+              <a:ext cx="945484" cy="1068455"/>
+              <a:chOff x="6506944" y="4875488"/>
+              <a:chExt cx="945484" cy="1068455"/>
             </a:xfrm>
           </p:grpSpPr>
+          <p:pic>
+            <p:nvPicPr>
+              <p:cNvPr id="36" name="Picture 35">
+                <a:extLst>
+                  <a:ext uri="{FF2B5EF4-FFF2-40B4-BE49-F238E27FC236}">
+                    <a16:creationId xmlns:a16="http://schemas.microsoft.com/office/drawing/2014/main" id="{3844B297-C2AE-ED99-68B1-262108627B66}"/>
+                  </a:ext>
+                </a:extLst>
+              </p:cNvPr>
+              <p:cNvPicPr>
+                <a:picLocks noChangeAspect="1"/>
+              </p:cNvPicPr>
+              <p:nvPr/>
+            </p:nvPicPr>
+            <p:blipFill>
+              <a:blip r:embed="rId6"/>
+              <a:stretch>
+                <a:fillRect/>
+              </a:stretch>
+            </p:blipFill>
+            <p:spPr>
+              <a:xfrm>
+                <a:off x="6690729" y="4951345"/>
+                <a:ext cx="558750" cy="619896"/>
+              </a:xfrm>
+              <a:prstGeom prst="rect">
+                <a:avLst/>
+              </a:prstGeom>
+            </p:spPr>
+          </p:pic>
           <p:sp>
             <p:nvSpPr>
-              <p:cNvPr id="40" name="TextBox 39">
+              <p:cNvPr id="39" name="TextBox 38">
                 <a:extLst>
                   <a:ext uri="{FF2B5EF4-FFF2-40B4-BE49-F238E27FC236}">
-                    <a16:creationId xmlns:a16="http://schemas.microsoft.com/office/drawing/2014/main" id="{E5618004-EFC1-B0BD-3D5D-EF02B8779358}"/>
+                    <a16:creationId xmlns:a16="http://schemas.microsoft.com/office/drawing/2014/main" id="{2F4F1D9D-0175-A630-DC05-8996828B06D9}"/>
                   </a:ext>
                 </a:extLst>
               </p:cNvPr>
@@ -3835,8 +4065,8 @@
             </p:nvSpPr>
             <p:spPr>
               <a:xfrm>
-                <a:off x="2642959" y="4387306"/>
-                <a:ext cx="2002446" cy="292388"/>
+                <a:off x="6550691" y="5526002"/>
+                <a:ext cx="857991" cy="415498"/>
               </a:xfrm>
               <a:prstGeom prst="rect">
                 <a:avLst/>
@@ -3849,23 +4079,23 @@
               </a:bodyPr>
               <a:lstStyle/>
               <a:p>
+                <a:pPr algn="ctr"/>
                 <a:r>
-                  <a:rPr lang="en-US" sz="1300" b="1" dirty="0">
-                    <a:solidFill>
-                      <a:srgbClr val="F39D03"/>
-                    </a:solidFill>
+                  <a:rPr lang="vi-VN" sz="1050" dirty="0">
+                    <a:latin typeface="Aptos (Body)"/>
                   </a:rPr>
-                  <a:t>Local Data Management</a:t>
+                  <a:t>Static information</a:t>
                 </a:r>
+                <a:endParaRPr lang="en-US" dirty="0"/>
               </a:p>
             </p:txBody>
           </p:sp>
           <p:sp>
             <p:nvSpPr>
-              <p:cNvPr id="41" name="Rectangle 40">
+              <p:cNvPr id="43" name="Rectangle 42">
                 <a:extLst>
                   <a:ext uri="{FF2B5EF4-FFF2-40B4-BE49-F238E27FC236}">
-                    <a16:creationId xmlns:a16="http://schemas.microsoft.com/office/drawing/2014/main" id="{50B81595-800E-A0B2-9EB7-114C95566B76}"/>
+                    <a16:creationId xmlns:a16="http://schemas.microsoft.com/office/drawing/2014/main" id="{7C614262-81E9-CD8E-C9E2-356DA1EDD71D}"/>
                   </a:ext>
                 </a:extLst>
               </p:cNvPr>
@@ -3874,606 +4104,21 @@
             </p:nvSpPr>
             <p:spPr>
               <a:xfrm>
-                <a:off x="2385417" y="4314825"/>
-                <a:ext cx="2510433" cy="1695451"/>
+                <a:off x="6506944" y="4875488"/>
+                <a:ext cx="945484" cy="1068455"/>
               </a:xfrm>
               <a:prstGeom prst="rect">
                 <a:avLst/>
               </a:prstGeom>
               <a:noFill/>
-              <a:ln w="28575">
+              <a:ln>
                 <a:solidFill>
-                  <a:srgbClr val="EEB500"/>
+                  <a:schemeClr val="accent6">
+                    <a:lumMod val="60000"/>
+                    <a:lumOff val="40000"/>
+                  </a:schemeClr>
                 </a:solidFill>
-              </a:ln>
-            </p:spPr>
-            <p:style>
-              <a:lnRef idx="2">
-                <a:schemeClr val="accent1">
-                  <a:shade val="15000"/>
-                </a:schemeClr>
-              </a:lnRef>
-              <a:fillRef idx="1">
-                <a:schemeClr val="accent1"/>
-              </a:fillRef>
-              <a:effectRef idx="0">
-                <a:schemeClr val="accent1"/>
-              </a:effectRef>
-              <a:fontRef idx="minor">
-                <a:schemeClr val="lt1"/>
-              </a:fontRef>
-            </p:style>
-            <p:txBody>
-              <a:bodyPr rtlCol="0" anchor="ctr"/>
-              <a:lstStyle/>
-              <a:p>
-                <a:pPr algn="ctr"/>
-                <a:endParaRPr lang="vi-VN"/>
-              </a:p>
-            </p:txBody>
-          </p:sp>
-          <p:grpSp>
-            <p:nvGrpSpPr>
-              <p:cNvPr id="45" name="Group 44">
-                <a:extLst>
-                  <a:ext uri="{FF2B5EF4-FFF2-40B4-BE49-F238E27FC236}">
-                    <a16:creationId xmlns:a16="http://schemas.microsoft.com/office/drawing/2014/main" id="{76739B33-4B8C-E985-90EE-9C40A6E2ED8F}"/>
-                  </a:ext>
-                </a:extLst>
-              </p:cNvPr>
-              <p:cNvGrpSpPr/>
-              <p:nvPr/>
-            </p:nvGrpSpPr>
-            <p:grpSpPr>
-              <a:xfrm>
-                <a:off x="2542999" y="4829950"/>
-                <a:ext cx="897897" cy="988067"/>
-                <a:chOff x="2542999" y="4829950"/>
-                <a:chExt cx="897897" cy="988067"/>
-              </a:xfrm>
-            </p:grpSpPr>
-            <p:pic>
-              <p:nvPicPr>
-                <p:cNvPr id="34" name="Picture 33">
-                  <a:extLst>
-                    <a:ext uri="{FF2B5EF4-FFF2-40B4-BE49-F238E27FC236}">
-                      <a16:creationId xmlns:a16="http://schemas.microsoft.com/office/drawing/2014/main" id="{D377FD82-D83D-0996-8C91-F25E8DBF4F3A}"/>
-                    </a:ext>
-                  </a:extLst>
-                </p:cNvPr>
-                <p:cNvPicPr>
-                  <a:picLocks noChangeAspect="1"/>
-                </p:cNvPicPr>
-                <p:nvPr/>
-              </p:nvPicPr>
-              <p:blipFill>
-                <a:blip r:embed="rId5"/>
-                <a:stretch>
-                  <a:fillRect/>
-                </a:stretch>
-              </p:blipFill>
-              <p:spPr>
-                <a:xfrm>
-                  <a:off x="2725923" y="4913588"/>
-                  <a:ext cx="514806" cy="650514"/>
-                </a:xfrm>
-                <a:prstGeom prst="rect">
-                  <a:avLst/>
-                </a:prstGeom>
-              </p:spPr>
-            </p:pic>
-            <p:sp>
-              <p:nvSpPr>
-                <p:cNvPr id="38" name="TextBox 37">
-                  <a:extLst>
-                    <a:ext uri="{FF2B5EF4-FFF2-40B4-BE49-F238E27FC236}">
-                      <a16:creationId xmlns:a16="http://schemas.microsoft.com/office/drawing/2014/main" id="{B200876F-2A09-0938-1852-96AF5A229B92}"/>
-                    </a:ext>
-                  </a:extLst>
-                </p:cNvPr>
-                <p:cNvSpPr txBox="1"/>
-                <p:nvPr/>
-              </p:nvSpPr>
-              <p:spPr>
-                <a:xfrm>
-                  <a:off x="2582905" y="5535527"/>
-                  <a:ext cx="857991" cy="253916"/>
-                </a:xfrm>
-                <a:prstGeom prst="rect">
-                  <a:avLst/>
-                </a:prstGeom>
-                <a:noFill/>
-              </p:spPr>
-              <p:txBody>
-                <a:bodyPr wrap="square" rtlCol="0">
-                  <a:spAutoFit/>
-                </a:bodyPr>
-                <a:lstStyle/>
-                <a:p>
-                  <a:r>
-                    <a:rPr lang="vi-VN" sz="1050" dirty="0">
-                      <a:latin typeface="Aptos (Body)"/>
-                    </a:rPr>
-                    <a:t>Structured</a:t>
-                  </a:r>
-                  <a:endParaRPr lang="en-US" dirty="0"/>
-                </a:p>
-              </p:txBody>
-            </p:sp>
-            <p:sp>
-              <p:nvSpPr>
-                <p:cNvPr id="42" name="Rectangle 41">
-                  <a:extLst>
-                    <a:ext uri="{FF2B5EF4-FFF2-40B4-BE49-F238E27FC236}">
-                      <a16:creationId xmlns:a16="http://schemas.microsoft.com/office/drawing/2014/main" id="{FBBC51B7-1401-3B2D-DC74-AC24D5A28EF2}"/>
-                    </a:ext>
-                  </a:extLst>
-                </p:cNvPr>
-                <p:cNvSpPr/>
-                <p:nvPr/>
-              </p:nvSpPr>
-              <p:spPr>
-                <a:xfrm>
-                  <a:off x="2542999" y="4829950"/>
-                  <a:ext cx="857992" cy="988067"/>
-                </a:xfrm>
-                <a:prstGeom prst="rect">
-                  <a:avLst/>
-                </a:prstGeom>
-                <a:noFill/>
-                <a:ln>
-                  <a:solidFill>
-                    <a:schemeClr val="accent6">
-                      <a:lumMod val="60000"/>
-                      <a:lumOff val="40000"/>
-                    </a:schemeClr>
-                  </a:solidFill>
-                  <a:prstDash val="dash"/>
-                </a:ln>
-              </p:spPr>
-              <p:style>
-                <a:lnRef idx="2">
-                  <a:schemeClr val="accent1">
-                    <a:shade val="15000"/>
-                  </a:schemeClr>
-                </a:lnRef>
-                <a:fillRef idx="1">
-                  <a:schemeClr val="accent1"/>
-                </a:fillRef>
-                <a:effectRef idx="0">
-                  <a:schemeClr val="accent1"/>
-                </a:effectRef>
-                <a:fontRef idx="minor">
-                  <a:schemeClr val="lt1"/>
-                </a:fontRef>
-              </p:style>
-              <p:txBody>
-                <a:bodyPr rtlCol="0" anchor="ctr"/>
-                <a:lstStyle/>
-                <a:p>
-                  <a:pPr algn="ctr"/>
-                  <a:endParaRPr lang="vi-VN"/>
-                </a:p>
-              </p:txBody>
-            </p:sp>
-          </p:grpSp>
-          <p:grpSp>
-            <p:nvGrpSpPr>
-              <p:cNvPr id="46" name="Group 45">
-                <a:extLst>
-                  <a:ext uri="{FF2B5EF4-FFF2-40B4-BE49-F238E27FC236}">
-                    <a16:creationId xmlns:a16="http://schemas.microsoft.com/office/drawing/2014/main" id="{6A62518D-7089-B796-2740-B8B5985A77B9}"/>
-                  </a:ext>
-                </a:extLst>
-              </p:cNvPr>
-              <p:cNvGrpSpPr/>
-              <p:nvPr/>
-            </p:nvGrpSpPr>
-            <p:grpSpPr>
-              <a:xfrm>
-                <a:off x="3822414" y="4791850"/>
-                <a:ext cx="945484" cy="1068455"/>
-                <a:chOff x="6506944" y="4875488"/>
-                <a:chExt cx="945484" cy="1068455"/>
-              </a:xfrm>
-            </p:grpSpPr>
-            <p:pic>
-              <p:nvPicPr>
-                <p:cNvPr id="36" name="Picture 35">
-                  <a:extLst>
-                    <a:ext uri="{FF2B5EF4-FFF2-40B4-BE49-F238E27FC236}">
-                      <a16:creationId xmlns:a16="http://schemas.microsoft.com/office/drawing/2014/main" id="{3844B297-C2AE-ED99-68B1-262108627B66}"/>
-                    </a:ext>
-                  </a:extLst>
-                </p:cNvPr>
-                <p:cNvPicPr>
-                  <a:picLocks noChangeAspect="1"/>
-                </p:cNvPicPr>
-                <p:nvPr/>
-              </p:nvPicPr>
-              <p:blipFill>
-                <a:blip r:embed="rId6"/>
-                <a:stretch>
-                  <a:fillRect/>
-                </a:stretch>
-              </p:blipFill>
-              <p:spPr>
-                <a:xfrm>
-                  <a:off x="6690729" y="4951345"/>
-                  <a:ext cx="558750" cy="619896"/>
-                </a:xfrm>
-                <a:prstGeom prst="rect">
-                  <a:avLst/>
-                </a:prstGeom>
-              </p:spPr>
-            </p:pic>
-            <p:sp>
-              <p:nvSpPr>
-                <p:cNvPr id="39" name="TextBox 38">
-                  <a:extLst>
-                    <a:ext uri="{FF2B5EF4-FFF2-40B4-BE49-F238E27FC236}">
-                      <a16:creationId xmlns:a16="http://schemas.microsoft.com/office/drawing/2014/main" id="{2F4F1D9D-0175-A630-DC05-8996828B06D9}"/>
-                    </a:ext>
-                  </a:extLst>
-                </p:cNvPr>
-                <p:cNvSpPr txBox="1"/>
-                <p:nvPr/>
-              </p:nvSpPr>
-              <p:spPr>
-                <a:xfrm>
-                  <a:off x="6550691" y="5526002"/>
-                  <a:ext cx="857991" cy="415498"/>
-                </a:xfrm>
-                <a:prstGeom prst="rect">
-                  <a:avLst/>
-                </a:prstGeom>
-                <a:noFill/>
-              </p:spPr>
-              <p:txBody>
-                <a:bodyPr wrap="square" rtlCol="0">
-                  <a:spAutoFit/>
-                </a:bodyPr>
-                <a:lstStyle/>
-                <a:p>
-                  <a:pPr algn="ctr"/>
-                  <a:r>
-                    <a:rPr lang="vi-VN" sz="1050" dirty="0">
-                      <a:latin typeface="Aptos (Body)"/>
-                    </a:rPr>
-                    <a:t>Static information</a:t>
-                  </a:r>
-                  <a:endParaRPr lang="en-US" dirty="0"/>
-                </a:p>
-              </p:txBody>
-            </p:sp>
-            <p:sp>
-              <p:nvSpPr>
-                <p:cNvPr id="43" name="Rectangle 42">
-                  <a:extLst>
-                    <a:ext uri="{FF2B5EF4-FFF2-40B4-BE49-F238E27FC236}">
-                      <a16:creationId xmlns:a16="http://schemas.microsoft.com/office/drawing/2014/main" id="{7C614262-81E9-CD8E-C9E2-356DA1EDD71D}"/>
-                    </a:ext>
-                  </a:extLst>
-                </p:cNvPr>
-                <p:cNvSpPr/>
-                <p:nvPr/>
-              </p:nvSpPr>
-              <p:spPr>
-                <a:xfrm>
-                  <a:off x="6506944" y="4875488"/>
-                  <a:ext cx="945484" cy="1068455"/>
-                </a:xfrm>
-                <a:prstGeom prst="rect">
-                  <a:avLst/>
-                </a:prstGeom>
-                <a:noFill/>
-                <a:ln>
-                  <a:solidFill>
-                    <a:schemeClr val="accent6">
-                      <a:lumMod val="60000"/>
-                      <a:lumOff val="40000"/>
-                    </a:schemeClr>
-                  </a:solidFill>
-                  <a:prstDash val="dash"/>
-                </a:ln>
-              </p:spPr>
-              <p:style>
-                <a:lnRef idx="2">
-                  <a:schemeClr val="accent1">
-                    <a:shade val="15000"/>
-                  </a:schemeClr>
-                </a:lnRef>
-                <a:fillRef idx="1">
-                  <a:schemeClr val="accent1"/>
-                </a:fillRef>
-                <a:effectRef idx="0">
-                  <a:schemeClr val="accent1"/>
-                </a:effectRef>
-                <a:fontRef idx="minor">
-                  <a:schemeClr val="lt1"/>
-                </a:fontRef>
-              </p:style>
-              <p:txBody>
-                <a:bodyPr rtlCol="0" anchor="ctr"/>
-                <a:lstStyle/>
-                <a:p>
-                  <a:pPr algn="ctr"/>
-                  <a:endParaRPr lang="vi-VN"/>
-                </a:p>
-              </p:txBody>
-            </p:sp>
-          </p:grpSp>
-        </p:grpSp>
-        <p:grpSp>
-          <p:nvGrpSpPr>
-            <p:cNvPr id="62" name="Group 61">
-              <a:extLst>
-                <a:ext uri="{FF2B5EF4-FFF2-40B4-BE49-F238E27FC236}">
-                  <a16:creationId xmlns:a16="http://schemas.microsoft.com/office/drawing/2014/main" id="{A6E43AF3-50B4-1418-9CB9-9E63E2B5D2D5}"/>
-                </a:ext>
-              </a:extLst>
-            </p:cNvPr>
-            <p:cNvGrpSpPr/>
-            <p:nvPr/>
-          </p:nvGrpSpPr>
-          <p:grpSpPr>
-            <a:xfrm>
-              <a:off x="3738795" y="1247733"/>
-              <a:ext cx="1852628" cy="2644238"/>
-              <a:chOff x="4462447" y="2146837"/>
-              <a:chExt cx="1852628" cy="2644238"/>
-            </a:xfrm>
-          </p:grpSpPr>
-          <p:grpSp>
-            <p:nvGrpSpPr>
-              <p:cNvPr id="59" name="Group 58">
-                <a:extLst>
-                  <a:ext uri="{FF2B5EF4-FFF2-40B4-BE49-F238E27FC236}">
-                    <a16:creationId xmlns:a16="http://schemas.microsoft.com/office/drawing/2014/main" id="{4C3E6F69-3BD9-1F8B-FBDF-E298E40C3569}"/>
-                  </a:ext>
-                </a:extLst>
-              </p:cNvPr>
-              <p:cNvGrpSpPr/>
-              <p:nvPr/>
-            </p:nvGrpSpPr>
-            <p:grpSpPr>
-              <a:xfrm>
-                <a:off x="4992039" y="3701185"/>
-                <a:ext cx="723839" cy="1021188"/>
-                <a:chOff x="11148915" y="4933043"/>
-                <a:chExt cx="723839" cy="1021188"/>
-              </a:xfrm>
-            </p:grpSpPr>
-            <p:pic>
-              <p:nvPicPr>
-                <p:cNvPr id="49" name="Picture 48" descr="A black background with a black square&#10;&#10;AI-generated content may be incorrect.">
-                  <a:extLst>
-                    <a:ext uri="{FF2B5EF4-FFF2-40B4-BE49-F238E27FC236}">
-                      <a16:creationId xmlns:a16="http://schemas.microsoft.com/office/drawing/2014/main" id="{B14AD9B1-63C8-4BB7-A2D7-D3CF52493E6D}"/>
-                    </a:ext>
-                  </a:extLst>
-                </p:cNvPr>
-                <p:cNvPicPr>
-                  <a:picLocks noChangeAspect="1"/>
-                </p:cNvPicPr>
-                <p:nvPr/>
-              </p:nvPicPr>
-              <p:blipFill>
-                <a:blip r:embed="rId7">
-                  <a:extLst>
-                    <a:ext uri="{28A0092B-C50C-407E-A947-70E740481C1C}">
-                      <a14:useLocalDpi xmlns:a14="http://schemas.microsoft.com/office/drawing/2010/main" val="0"/>
-                    </a:ext>
-                  </a:extLst>
-                </a:blip>
-                <a:stretch>
-                  <a:fillRect/>
-                </a:stretch>
-              </p:blipFill>
-              <p:spPr>
-                <a:xfrm>
-                  <a:off x="11184468" y="4933043"/>
-                  <a:ext cx="652735" cy="652735"/>
-                </a:xfrm>
-                <a:prstGeom prst="rect">
-                  <a:avLst/>
-                </a:prstGeom>
-              </p:spPr>
-            </p:pic>
-            <p:sp>
-              <p:nvSpPr>
-                <p:cNvPr id="56" name="TextBox 55">
-                  <a:extLst>
-                    <a:ext uri="{FF2B5EF4-FFF2-40B4-BE49-F238E27FC236}">
-                      <a16:creationId xmlns:a16="http://schemas.microsoft.com/office/drawing/2014/main" id="{88FDC792-52D9-E589-C92F-A5B8B6D575E5}"/>
-                    </a:ext>
-                  </a:extLst>
-                </p:cNvPr>
-                <p:cNvSpPr txBox="1"/>
-                <p:nvPr/>
-              </p:nvSpPr>
-              <p:spPr>
-                <a:xfrm>
-                  <a:off x="11148915" y="5538733"/>
-                  <a:ext cx="723839" cy="415498"/>
-                </a:xfrm>
-                <a:prstGeom prst="rect">
-                  <a:avLst/>
-                </a:prstGeom>
-                <a:noFill/>
-              </p:spPr>
-              <p:txBody>
-                <a:bodyPr wrap="square" rtlCol="0">
-                  <a:spAutoFit/>
-                </a:bodyPr>
-                <a:lstStyle/>
-                <a:p>
-                  <a:pPr algn="ctr"/>
-                  <a:r>
-                    <a:rPr lang="vi-VN" sz="1050" dirty="0">
-                      <a:latin typeface="Aptos (Body)"/>
-                    </a:rPr>
-                    <a:t>Wireless Network</a:t>
-                  </a:r>
-                  <a:endParaRPr lang="en-US" dirty="0"/>
-                </a:p>
-              </p:txBody>
-            </p:sp>
-          </p:grpSp>
-          <p:grpSp>
-            <p:nvGrpSpPr>
-              <p:cNvPr id="60" name="Group 59">
-                <a:extLst>
-                  <a:ext uri="{FF2B5EF4-FFF2-40B4-BE49-F238E27FC236}">
-                    <a16:creationId xmlns:a16="http://schemas.microsoft.com/office/drawing/2014/main" id="{119A33E5-FB34-6E4D-3BDE-9E16F5E45F7C}"/>
-                  </a:ext>
-                </a:extLst>
-              </p:cNvPr>
-              <p:cNvGrpSpPr/>
-              <p:nvPr/>
-            </p:nvGrpSpPr>
-            <p:grpSpPr>
-              <a:xfrm>
-                <a:off x="4969691" y="2502776"/>
-                <a:ext cx="723839" cy="1058170"/>
-                <a:chOff x="4768376" y="2547845"/>
-                <a:chExt cx="723838" cy="1046177"/>
-              </a:xfrm>
-            </p:grpSpPr>
-            <p:pic>
-              <p:nvPicPr>
-                <p:cNvPr id="55" name="Picture 54">
-                  <a:extLst>
-                    <a:ext uri="{FF2B5EF4-FFF2-40B4-BE49-F238E27FC236}">
-                      <a16:creationId xmlns:a16="http://schemas.microsoft.com/office/drawing/2014/main" id="{4862706B-BC3C-6B3D-ED4C-7C361DF9EDF4}"/>
-                    </a:ext>
-                  </a:extLst>
-                </p:cNvPr>
-                <p:cNvPicPr>
-                  <a:picLocks noChangeAspect="1"/>
-                </p:cNvPicPr>
-                <p:nvPr/>
-              </p:nvPicPr>
-              <p:blipFill>
-                <a:blip r:embed="rId8"/>
-                <a:stretch>
-                  <a:fillRect/>
-                </a:stretch>
-              </p:blipFill>
-              <p:spPr>
-                <a:xfrm>
-                  <a:off x="4790723" y="2547845"/>
-                  <a:ext cx="652735" cy="594597"/>
-                </a:xfrm>
-                <a:prstGeom prst="rect">
-                  <a:avLst/>
-                </a:prstGeom>
-              </p:spPr>
-            </p:pic>
-            <p:sp>
-              <p:nvSpPr>
-                <p:cNvPr id="57" name="TextBox 56">
-                  <a:extLst>
-                    <a:ext uri="{FF2B5EF4-FFF2-40B4-BE49-F238E27FC236}">
-                      <a16:creationId xmlns:a16="http://schemas.microsoft.com/office/drawing/2014/main" id="{A42A8C93-A77F-3585-A6AD-45DA816E1B94}"/>
-                    </a:ext>
-                  </a:extLst>
-                </p:cNvPr>
-                <p:cNvSpPr txBox="1"/>
-                <p:nvPr/>
-              </p:nvSpPr>
-              <p:spPr>
-                <a:xfrm>
-                  <a:off x="4768376" y="3178524"/>
-                  <a:ext cx="723838" cy="415498"/>
-                </a:xfrm>
-                <a:prstGeom prst="rect">
-                  <a:avLst/>
-                </a:prstGeom>
-                <a:noFill/>
-              </p:spPr>
-              <p:txBody>
-                <a:bodyPr wrap="square" rtlCol="0">
-                  <a:spAutoFit/>
-                </a:bodyPr>
-                <a:lstStyle/>
-                <a:p>
-                  <a:pPr algn="ctr"/>
-                  <a:r>
-                    <a:rPr lang="vi-VN" sz="1050" dirty="0">
-                      <a:latin typeface="Aptos (Body)"/>
-                    </a:rPr>
-                    <a:t>Cellular Network</a:t>
-                  </a:r>
-                  <a:endParaRPr lang="en-US" dirty="0"/>
-                </a:p>
-              </p:txBody>
-            </p:sp>
-          </p:grpSp>
-          <p:sp>
-            <p:nvSpPr>
-              <p:cNvPr id="58" name="TextBox 57">
-                <a:extLst>
-                  <a:ext uri="{FF2B5EF4-FFF2-40B4-BE49-F238E27FC236}">
-                    <a16:creationId xmlns:a16="http://schemas.microsoft.com/office/drawing/2014/main" id="{A63FBF66-6D97-F301-F6BF-973639A42E6F}"/>
-                  </a:ext>
-                </a:extLst>
-              </p:cNvPr>
-              <p:cNvSpPr txBox="1"/>
-              <p:nvPr/>
-            </p:nvSpPr>
-            <p:spPr>
-              <a:xfrm>
-                <a:off x="4462447" y="2146837"/>
-                <a:ext cx="1852628" cy="292388"/>
-              </a:xfrm>
-              <a:prstGeom prst="rect">
-                <a:avLst/>
-              </a:prstGeom>
-              <a:noFill/>
-            </p:spPr>
-            <p:txBody>
-              <a:bodyPr wrap="square" rtlCol="0">
-                <a:spAutoFit/>
-              </a:bodyPr>
-              <a:lstStyle/>
-              <a:p>
-                <a:r>
-                  <a:rPr lang="en-US" sz="1300" b="1" dirty="0">
-                    <a:solidFill>
-                      <a:srgbClr val="F39D03"/>
-                    </a:solidFill>
-                  </a:rPr>
-                  <a:t>Network Connectivity</a:t>
-                </a:r>
-              </a:p>
-            </p:txBody>
-          </p:sp>
-          <p:sp>
-            <p:nvSpPr>
-              <p:cNvPr id="61" name="Rectangle 60">
-                <a:extLst>
-                  <a:ext uri="{FF2B5EF4-FFF2-40B4-BE49-F238E27FC236}">
-                    <a16:creationId xmlns:a16="http://schemas.microsoft.com/office/drawing/2014/main" id="{87406CB9-8270-EEA7-E6ED-0F0431FCBF02}"/>
-                  </a:ext>
-                </a:extLst>
-              </p:cNvPr>
-              <p:cNvSpPr/>
-              <p:nvPr/>
-            </p:nvSpPr>
-            <p:spPr>
-              <a:xfrm>
-                <a:off x="4462447" y="2146837"/>
-                <a:ext cx="1785953" cy="2644238"/>
-              </a:xfrm>
-              <a:prstGeom prst="rect">
-                <a:avLst/>
-              </a:prstGeom>
-              <a:noFill/>
-              <a:ln w="28575">
-                <a:solidFill>
-                  <a:srgbClr val="EEB500"/>
-                </a:solidFill>
+                <a:prstDash val="dash"/>
               </a:ln>
             </p:spPr>
             <p:style>
@@ -4502,190 +4147,33 @@
             </p:txBody>
           </p:sp>
         </p:grpSp>
-        <p:cxnSp>
-          <p:nvCxnSpPr>
-            <p:cNvPr id="95" name="Straight Connector 94">
+      </p:grpSp>
+      <p:grpSp>
+        <p:nvGrpSpPr>
+          <p:cNvPr id="62" name="Group 61">
+            <a:extLst>
+              <a:ext uri="{FF2B5EF4-FFF2-40B4-BE49-F238E27FC236}">
+                <a16:creationId xmlns:a16="http://schemas.microsoft.com/office/drawing/2014/main" id="{A6E43AF3-50B4-1418-9CB9-9E63E2B5D2D5}"/>
+              </a:ext>
+            </a:extLst>
+          </p:cNvPr>
+          <p:cNvGrpSpPr/>
+          <p:nvPr/>
+        </p:nvGrpSpPr>
+        <p:grpSpPr>
+          <a:xfrm>
+            <a:off x="3900720" y="1285833"/>
+            <a:ext cx="1852628" cy="2644238"/>
+            <a:chOff x="4462447" y="2146837"/>
+            <a:chExt cx="1852628" cy="2644238"/>
+          </a:xfrm>
+        </p:grpSpPr>
+        <p:grpSp>
+          <p:nvGrpSpPr>
+            <p:cNvPr id="59" name="Group 58">
               <a:extLst>
                 <a:ext uri="{FF2B5EF4-FFF2-40B4-BE49-F238E27FC236}">
-                  <a16:creationId xmlns:a16="http://schemas.microsoft.com/office/drawing/2014/main" id="{974DC5DD-B7DE-7735-147C-5E71CF576D96}"/>
-                </a:ext>
-              </a:extLst>
-            </p:cNvPr>
-            <p:cNvCxnSpPr>
-              <a:stCxn id="7" idx="2"/>
-              <a:endCxn id="21" idx="0"/>
-            </p:cNvCxnSpPr>
-            <p:nvPr/>
-          </p:nvCxnSpPr>
-          <p:spPr>
-            <a:xfrm flipH="1">
-              <a:off x="1741021" y="1403628"/>
-              <a:ext cx="755" cy="480213"/>
-            </a:xfrm>
-            <a:prstGeom prst="line">
-              <a:avLst/>
-            </a:prstGeom>
-            <a:ln w="38100">
-              <a:solidFill>
-                <a:srgbClr val="FF0000"/>
-              </a:solidFill>
-            </a:ln>
-          </p:spPr>
-          <p:style>
-            <a:lnRef idx="2">
-              <a:schemeClr val="accent1"/>
-            </a:lnRef>
-            <a:fillRef idx="0">
-              <a:schemeClr val="accent1"/>
-            </a:fillRef>
-            <a:effectRef idx="1">
-              <a:schemeClr val="accent1"/>
-            </a:effectRef>
-            <a:fontRef idx="minor">
-              <a:schemeClr val="tx1"/>
-            </a:fontRef>
-          </p:style>
-        </p:cxnSp>
-        <p:cxnSp>
-          <p:nvCxnSpPr>
-            <p:cNvPr id="101" name="Straight Connector 100">
-              <a:extLst>
-                <a:ext uri="{FF2B5EF4-FFF2-40B4-BE49-F238E27FC236}">
-                  <a16:creationId xmlns:a16="http://schemas.microsoft.com/office/drawing/2014/main" id="{533CA55C-4070-37CC-C796-174724D8F817}"/>
-                </a:ext>
-              </a:extLst>
-            </p:cNvPr>
-            <p:cNvCxnSpPr>
-              <a:stCxn id="24" idx="2"/>
-              <a:endCxn id="41" idx="0"/>
-            </p:cNvCxnSpPr>
-            <p:nvPr/>
-          </p:nvCxnSpPr>
-          <p:spPr>
-            <a:xfrm>
-              <a:off x="1731496" y="3264804"/>
-              <a:ext cx="5133" cy="866400"/>
-            </a:xfrm>
-            <a:prstGeom prst="line">
-              <a:avLst/>
-            </a:prstGeom>
-            <a:ln w="38100">
-              <a:solidFill>
-                <a:srgbClr val="FF0000"/>
-              </a:solidFill>
-            </a:ln>
-          </p:spPr>
-          <p:style>
-            <a:lnRef idx="2">
-              <a:schemeClr val="accent1"/>
-            </a:lnRef>
-            <a:fillRef idx="0">
-              <a:schemeClr val="accent1"/>
-            </a:fillRef>
-            <a:effectRef idx="1">
-              <a:schemeClr val="accent1"/>
-            </a:effectRef>
-            <a:fontRef idx="minor">
-              <a:schemeClr val="tx1"/>
-            </a:fontRef>
-          </p:style>
-        </p:cxnSp>
-        <p:cxnSp>
-          <p:nvCxnSpPr>
-            <p:cNvPr id="103" name="Straight Connector 102">
-              <a:extLst>
-                <a:ext uri="{FF2B5EF4-FFF2-40B4-BE49-F238E27FC236}">
-                  <a16:creationId xmlns:a16="http://schemas.microsoft.com/office/drawing/2014/main" id="{0E7BB21C-83D9-74D1-ED8B-B091A1326CC9}"/>
-                </a:ext>
-              </a:extLst>
-            </p:cNvPr>
-            <p:cNvCxnSpPr>
-              <a:cxnSpLocks/>
-              <a:stCxn id="24" idx="3"/>
-              <a:endCxn id="61" idx="1"/>
-            </p:cNvCxnSpPr>
-            <p:nvPr/>
-          </p:nvCxnSpPr>
-          <p:spPr>
-            <a:xfrm flipV="1">
-              <a:off x="2361244" y="2569852"/>
-              <a:ext cx="1377551" cy="4471"/>
-            </a:xfrm>
-            <a:prstGeom prst="line">
-              <a:avLst/>
-            </a:prstGeom>
-            <a:ln w="38100">
-              <a:solidFill>
-                <a:srgbClr val="FF0000"/>
-              </a:solidFill>
-            </a:ln>
-          </p:spPr>
-          <p:style>
-            <a:lnRef idx="2">
-              <a:schemeClr val="accent1"/>
-            </a:lnRef>
-            <a:fillRef idx="0">
-              <a:schemeClr val="accent1"/>
-            </a:fillRef>
-            <a:effectRef idx="1">
-              <a:schemeClr val="accent1"/>
-            </a:effectRef>
-            <a:fontRef idx="minor">
-              <a:schemeClr val="tx1"/>
-            </a:fontRef>
-          </p:style>
-        </p:cxnSp>
-        <p:cxnSp>
-          <p:nvCxnSpPr>
-            <p:cNvPr id="107" name="Straight Connector 106">
-              <a:extLst>
-                <a:ext uri="{FF2B5EF4-FFF2-40B4-BE49-F238E27FC236}">
-                  <a16:creationId xmlns:a16="http://schemas.microsoft.com/office/drawing/2014/main" id="{94B4D3F6-2AE7-2A7E-BD22-AC4A6CD30390}"/>
-                </a:ext>
-              </a:extLst>
-            </p:cNvPr>
-            <p:cNvCxnSpPr>
-              <a:cxnSpLocks/>
-              <a:stCxn id="42" idx="3"/>
-              <a:endCxn id="43" idx="1"/>
-            </p:cNvCxnSpPr>
-            <p:nvPr/>
-          </p:nvCxnSpPr>
-          <p:spPr>
-            <a:xfrm>
-              <a:off x="1496986" y="5140363"/>
-              <a:ext cx="421423" cy="2094"/>
-            </a:xfrm>
-            <a:prstGeom prst="line">
-              <a:avLst/>
-            </a:prstGeom>
-            <a:ln w="38100">
-              <a:solidFill>
-                <a:srgbClr val="FF0000"/>
-              </a:solidFill>
-            </a:ln>
-          </p:spPr>
-          <p:style>
-            <a:lnRef idx="2">
-              <a:schemeClr val="accent1"/>
-            </a:lnRef>
-            <a:fillRef idx="0">
-              <a:schemeClr val="accent1"/>
-            </a:fillRef>
-            <a:effectRef idx="1">
-              <a:schemeClr val="accent1"/>
-            </a:effectRef>
-            <a:fontRef idx="minor">
-              <a:schemeClr val="tx1"/>
-            </a:fontRef>
-          </p:style>
-        </p:cxnSp>
-        <p:grpSp>
-          <p:nvGrpSpPr>
-            <p:cNvPr id="110" name="Group 109">
-              <a:extLst>
-                <a:ext uri="{FF2B5EF4-FFF2-40B4-BE49-F238E27FC236}">
-                  <a16:creationId xmlns:a16="http://schemas.microsoft.com/office/drawing/2014/main" id="{FF9B1C88-A857-35D1-FFC6-08A1C00EEFB0}"/>
+                  <a16:creationId xmlns:a16="http://schemas.microsoft.com/office/drawing/2014/main" id="{4C3E6F69-3BD9-1F8B-FBDF-E298E40C3569}"/>
                 </a:ext>
               </a:extLst>
             </p:cNvPr>
@@ -4694,72 +4182,54 @@
           </p:nvGrpSpPr>
           <p:grpSpPr>
             <a:xfrm>
-              <a:off x="6802163" y="492424"/>
-              <a:ext cx="1683825" cy="4162113"/>
-              <a:chOff x="8111445" y="1141869"/>
-              <a:chExt cx="1683825" cy="4162113"/>
+              <a:off x="4992039" y="3701185"/>
+              <a:ext cx="723839" cy="1021188"/>
+              <a:chOff x="11148915" y="4933043"/>
+              <a:chExt cx="723839" cy="1021188"/>
             </a:xfrm>
           </p:grpSpPr>
-          <p:sp>
-            <p:nvSpPr>
-              <p:cNvPr id="63" name="Rectangle 62">
+          <p:pic>
+            <p:nvPicPr>
+              <p:cNvPr id="49" name="Picture 48" descr="A black background with a black square&#10;&#10;AI-generated content may be incorrect.">
                 <a:extLst>
                   <a:ext uri="{FF2B5EF4-FFF2-40B4-BE49-F238E27FC236}">
-                    <a16:creationId xmlns:a16="http://schemas.microsoft.com/office/drawing/2014/main" id="{2B4EE253-D283-74B1-5F62-054CCEC6235E}"/>
+                    <a16:creationId xmlns:a16="http://schemas.microsoft.com/office/drawing/2014/main" id="{B14AD9B1-63C8-4BB7-A2D7-D3CF52493E6D}"/>
                   </a:ext>
                 </a:extLst>
               </p:cNvPr>
-              <p:cNvSpPr/>
+              <p:cNvPicPr>
+                <a:picLocks noChangeAspect="1"/>
+              </p:cNvPicPr>
               <p:nvPr/>
-            </p:nvSpPr>
+            </p:nvPicPr>
+            <p:blipFill>
+              <a:blip r:embed="rId7">
+                <a:extLst>
+                  <a:ext uri="{28A0092B-C50C-407E-A947-70E740481C1C}">
+                    <a14:useLocalDpi xmlns:a14="http://schemas.microsoft.com/office/drawing/2010/main" val="0"/>
+                  </a:ext>
+                </a:extLst>
+              </a:blip>
+              <a:stretch>
+                <a:fillRect/>
+              </a:stretch>
+            </p:blipFill>
             <p:spPr>
               <a:xfrm>
-                <a:off x="8111445" y="1141869"/>
-                <a:ext cx="1678694" cy="4162113"/>
+                <a:off x="11184468" y="4933043"/>
+                <a:ext cx="652735" cy="652735"/>
               </a:xfrm>
               <a:prstGeom prst="rect">
                 <a:avLst/>
               </a:prstGeom>
-              <a:noFill/>
-              <a:ln w="28575">
-                <a:solidFill>
-                  <a:srgbClr val="EEB500"/>
-                </a:solidFill>
-              </a:ln>
             </p:spPr>
-            <p:style>
-              <a:lnRef idx="2">
-                <a:schemeClr val="accent1">
-                  <a:shade val="15000"/>
-                </a:schemeClr>
-              </a:lnRef>
-              <a:fillRef idx="1">
-                <a:schemeClr val="accent1"/>
-              </a:fillRef>
-              <a:effectRef idx="0">
-                <a:schemeClr val="accent1"/>
-              </a:effectRef>
-              <a:fontRef idx="minor">
-                <a:schemeClr val="lt1"/>
-              </a:fontRef>
-            </p:style>
-            <p:txBody>
-              <a:bodyPr rtlCol="0" anchor="ctr"/>
-              <a:lstStyle/>
-              <a:p>
-                <a:r>
-                  <a:rPr lang="vi-VN" dirty="0"/>
-                  <a:t> (Hosted on Lightning.AI)  </a:t>
-                </a:r>
-              </a:p>
-            </p:txBody>
-          </p:sp>
+          </p:pic>
           <p:sp>
             <p:nvSpPr>
-              <p:cNvPr id="64" name="TextBox 63">
+              <p:cNvPr id="56" name="TextBox 55">
                 <a:extLst>
                   <a:ext uri="{FF2B5EF4-FFF2-40B4-BE49-F238E27FC236}">
-                    <a16:creationId xmlns:a16="http://schemas.microsoft.com/office/drawing/2014/main" id="{D9F5CD14-DAB4-1535-6258-FB583D30ACD1}"/>
+                    <a16:creationId xmlns:a16="http://schemas.microsoft.com/office/drawing/2014/main" id="{88FDC792-52D9-E589-C92F-A5B8B6D575E5}"/>
                   </a:ext>
                 </a:extLst>
               </p:cNvPr>
@@ -4768,8 +4238,8 @@
             </p:nvSpPr>
             <p:spPr>
               <a:xfrm>
-                <a:off x="8231132" y="1216745"/>
-                <a:ext cx="1476375" cy="292388"/>
+                <a:off x="11148915" y="5538733"/>
+                <a:ext cx="723839" cy="415498"/>
               </a:xfrm>
               <a:prstGeom prst="rect">
                 <a:avLst/>
@@ -4782,23 +4252,506 @@
               </a:bodyPr>
               <a:lstStyle/>
               <a:p>
+                <a:pPr algn="ctr"/>
                 <a:r>
-                  <a:rPr lang="en-US" sz="1300" b="1" dirty="0">
-                    <a:solidFill>
-                      <a:srgbClr val="F39D03"/>
-                    </a:solidFill>
+                  <a:rPr lang="vi-VN" sz="1050" dirty="0">
+                    <a:latin typeface="Aptos (Body)"/>
                   </a:rPr>
-                  <a:t>Remote AI server</a:t>
+                  <a:t>Wireless Network</a:t>
                 </a:r>
+                <a:endParaRPr lang="en-US" dirty="0"/>
               </a:p>
             </p:txBody>
           </p:sp>
+        </p:grpSp>
+        <p:grpSp>
+          <p:nvGrpSpPr>
+            <p:cNvPr id="60" name="Group 59">
+              <a:extLst>
+                <a:ext uri="{FF2B5EF4-FFF2-40B4-BE49-F238E27FC236}">
+                  <a16:creationId xmlns:a16="http://schemas.microsoft.com/office/drawing/2014/main" id="{119A33E5-FB34-6E4D-3BDE-9E16F5E45F7C}"/>
+                </a:ext>
+              </a:extLst>
+            </p:cNvPr>
+            <p:cNvGrpSpPr/>
+            <p:nvPr/>
+          </p:nvGrpSpPr>
+          <p:grpSpPr>
+            <a:xfrm>
+              <a:off x="4969691" y="2502776"/>
+              <a:ext cx="723839" cy="1058170"/>
+              <a:chOff x="4768376" y="2547845"/>
+              <a:chExt cx="723838" cy="1046177"/>
+            </a:xfrm>
+          </p:grpSpPr>
+          <p:pic>
+            <p:nvPicPr>
+              <p:cNvPr id="55" name="Picture 54">
+                <a:extLst>
+                  <a:ext uri="{FF2B5EF4-FFF2-40B4-BE49-F238E27FC236}">
+                    <a16:creationId xmlns:a16="http://schemas.microsoft.com/office/drawing/2014/main" id="{4862706B-BC3C-6B3D-ED4C-7C361DF9EDF4}"/>
+                  </a:ext>
+                </a:extLst>
+              </p:cNvPr>
+              <p:cNvPicPr>
+                <a:picLocks noChangeAspect="1"/>
+              </p:cNvPicPr>
+              <p:nvPr/>
+            </p:nvPicPr>
+            <p:blipFill>
+              <a:blip r:embed="rId8"/>
+              <a:stretch>
+                <a:fillRect/>
+              </a:stretch>
+            </p:blipFill>
+            <p:spPr>
+              <a:xfrm>
+                <a:off x="4790723" y="2547845"/>
+                <a:ext cx="652735" cy="594597"/>
+              </a:xfrm>
+              <a:prstGeom prst="rect">
+                <a:avLst/>
+              </a:prstGeom>
+            </p:spPr>
+          </p:pic>
+          <p:sp>
+            <p:nvSpPr>
+              <p:cNvPr id="57" name="TextBox 56">
+                <a:extLst>
+                  <a:ext uri="{FF2B5EF4-FFF2-40B4-BE49-F238E27FC236}">
+                    <a16:creationId xmlns:a16="http://schemas.microsoft.com/office/drawing/2014/main" id="{A42A8C93-A77F-3585-A6AD-45DA816E1B94}"/>
+                  </a:ext>
+                </a:extLst>
+              </p:cNvPr>
+              <p:cNvSpPr txBox="1"/>
+              <p:nvPr/>
+            </p:nvSpPr>
+            <p:spPr>
+              <a:xfrm>
+                <a:off x="4768376" y="3178524"/>
+                <a:ext cx="723838" cy="415498"/>
+              </a:xfrm>
+              <a:prstGeom prst="rect">
+                <a:avLst/>
+              </a:prstGeom>
+              <a:noFill/>
+            </p:spPr>
+            <p:txBody>
+              <a:bodyPr wrap="square" rtlCol="0">
+                <a:spAutoFit/>
+              </a:bodyPr>
+              <a:lstStyle/>
+              <a:p>
+                <a:pPr algn="ctr"/>
+                <a:r>
+                  <a:rPr lang="vi-VN" sz="1050" dirty="0">
+                    <a:latin typeface="Aptos (Body)"/>
+                  </a:rPr>
+                  <a:t>Cellular Network</a:t>
+                </a:r>
+                <a:endParaRPr lang="en-US" dirty="0"/>
+              </a:p>
+            </p:txBody>
+          </p:sp>
+        </p:grpSp>
+        <p:sp>
+          <p:nvSpPr>
+            <p:cNvPr id="58" name="TextBox 57">
+              <a:extLst>
+                <a:ext uri="{FF2B5EF4-FFF2-40B4-BE49-F238E27FC236}">
+                  <a16:creationId xmlns:a16="http://schemas.microsoft.com/office/drawing/2014/main" id="{A63FBF66-6D97-F301-F6BF-973639A42E6F}"/>
+                </a:ext>
+              </a:extLst>
+            </p:cNvPr>
+            <p:cNvSpPr txBox="1"/>
+            <p:nvPr/>
+          </p:nvSpPr>
+          <p:spPr>
+            <a:xfrm>
+              <a:off x="4462447" y="2146837"/>
+              <a:ext cx="1852628" cy="292388"/>
+            </a:xfrm>
+            <a:prstGeom prst="rect">
+              <a:avLst/>
+            </a:prstGeom>
+            <a:noFill/>
+          </p:spPr>
+          <p:txBody>
+            <a:bodyPr wrap="square" rtlCol="0">
+              <a:spAutoFit/>
+            </a:bodyPr>
+            <a:lstStyle/>
+            <a:p>
+              <a:r>
+                <a:rPr lang="en-US" sz="1300" b="1" dirty="0">
+                  <a:solidFill>
+                    <a:srgbClr val="F39D03"/>
+                  </a:solidFill>
+                </a:rPr>
+                <a:t>Network Connectivity</a:t>
+              </a:r>
+            </a:p>
+          </p:txBody>
+        </p:sp>
+        <p:sp>
+          <p:nvSpPr>
+            <p:cNvPr id="61" name="Rectangle 60">
+              <a:extLst>
+                <a:ext uri="{FF2B5EF4-FFF2-40B4-BE49-F238E27FC236}">
+                  <a16:creationId xmlns:a16="http://schemas.microsoft.com/office/drawing/2014/main" id="{87406CB9-8270-EEA7-E6ED-0F0431FCBF02}"/>
+                </a:ext>
+              </a:extLst>
+            </p:cNvPr>
+            <p:cNvSpPr/>
+            <p:nvPr/>
+          </p:nvSpPr>
+          <p:spPr>
+            <a:xfrm>
+              <a:off x="4462447" y="2146837"/>
+              <a:ext cx="1785953" cy="2644238"/>
+            </a:xfrm>
+            <a:prstGeom prst="rect">
+              <a:avLst/>
+            </a:prstGeom>
+            <a:noFill/>
+            <a:ln w="28575">
+              <a:solidFill>
+                <a:srgbClr val="EEB500"/>
+              </a:solidFill>
+            </a:ln>
+          </p:spPr>
+          <p:style>
+            <a:lnRef idx="2">
+              <a:schemeClr val="accent1">
+                <a:shade val="15000"/>
+              </a:schemeClr>
+            </a:lnRef>
+            <a:fillRef idx="1">
+              <a:schemeClr val="accent1"/>
+            </a:fillRef>
+            <a:effectRef idx="0">
+              <a:schemeClr val="accent1"/>
+            </a:effectRef>
+            <a:fontRef idx="minor">
+              <a:schemeClr val="lt1"/>
+            </a:fontRef>
+          </p:style>
+          <p:txBody>
+            <a:bodyPr rtlCol="0" anchor="ctr"/>
+            <a:lstStyle/>
+            <a:p>
+              <a:pPr algn="ctr"/>
+              <a:endParaRPr lang="vi-VN"/>
+            </a:p>
+          </p:txBody>
+        </p:sp>
+      </p:grpSp>
+      <p:cxnSp>
+        <p:nvCxnSpPr>
+          <p:cNvPr id="95" name="Straight Connector 94">
+            <a:extLst>
+              <a:ext uri="{FF2B5EF4-FFF2-40B4-BE49-F238E27FC236}">
+                <a16:creationId xmlns:a16="http://schemas.microsoft.com/office/drawing/2014/main" id="{974DC5DD-B7DE-7735-147C-5E71CF576D96}"/>
+              </a:ext>
+            </a:extLst>
+          </p:cNvPr>
+          <p:cNvCxnSpPr>
+            <a:stCxn id="7" idx="2"/>
+            <a:endCxn id="21" idx="0"/>
+          </p:cNvCxnSpPr>
+          <p:nvPr/>
+        </p:nvCxnSpPr>
+        <p:spPr>
+          <a:xfrm flipH="1">
+            <a:off x="1902946" y="1441728"/>
+            <a:ext cx="755" cy="480213"/>
+          </a:xfrm>
+          <a:prstGeom prst="line">
+            <a:avLst/>
+          </a:prstGeom>
+          <a:ln w="38100">
+            <a:solidFill>
+              <a:srgbClr val="FF0000"/>
+            </a:solidFill>
+          </a:ln>
+        </p:spPr>
+        <p:style>
+          <a:lnRef idx="2">
+            <a:schemeClr val="accent1"/>
+          </a:lnRef>
+          <a:fillRef idx="0">
+            <a:schemeClr val="accent1"/>
+          </a:fillRef>
+          <a:effectRef idx="1">
+            <a:schemeClr val="accent1"/>
+          </a:effectRef>
+          <a:fontRef idx="minor">
+            <a:schemeClr val="tx1"/>
+          </a:fontRef>
+        </p:style>
+      </p:cxnSp>
+      <p:cxnSp>
+        <p:nvCxnSpPr>
+          <p:cNvPr id="101" name="Straight Connector 100">
+            <a:extLst>
+              <a:ext uri="{FF2B5EF4-FFF2-40B4-BE49-F238E27FC236}">
+                <a16:creationId xmlns:a16="http://schemas.microsoft.com/office/drawing/2014/main" id="{533CA55C-4070-37CC-C796-174724D8F817}"/>
+              </a:ext>
+            </a:extLst>
+          </p:cNvPr>
+          <p:cNvCxnSpPr>
+            <a:stCxn id="24" idx="2"/>
+            <a:endCxn id="41" idx="0"/>
+          </p:cNvCxnSpPr>
+          <p:nvPr/>
+        </p:nvCxnSpPr>
+        <p:spPr>
+          <a:xfrm>
+            <a:off x="1893421" y="3302904"/>
+            <a:ext cx="5133" cy="866400"/>
+          </a:xfrm>
+          <a:prstGeom prst="line">
+            <a:avLst/>
+          </a:prstGeom>
+          <a:ln w="38100">
+            <a:solidFill>
+              <a:srgbClr val="FF0000"/>
+            </a:solidFill>
+          </a:ln>
+        </p:spPr>
+        <p:style>
+          <a:lnRef idx="2">
+            <a:schemeClr val="accent1"/>
+          </a:lnRef>
+          <a:fillRef idx="0">
+            <a:schemeClr val="accent1"/>
+          </a:fillRef>
+          <a:effectRef idx="1">
+            <a:schemeClr val="accent1"/>
+          </a:effectRef>
+          <a:fontRef idx="minor">
+            <a:schemeClr val="tx1"/>
+          </a:fontRef>
+        </p:style>
+      </p:cxnSp>
+      <p:cxnSp>
+        <p:nvCxnSpPr>
+          <p:cNvPr id="103" name="Straight Connector 102">
+            <a:extLst>
+              <a:ext uri="{FF2B5EF4-FFF2-40B4-BE49-F238E27FC236}">
+                <a16:creationId xmlns:a16="http://schemas.microsoft.com/office/drawing/2014/main" id="{0E7BB21C-83D9-74D1-ED8B-B091A1326CC9}"/>
+              </a:ext>
+            </a:extLst>
+          </p:cNvPr>
+          <p:cNvCxnSpPr>
+            <a:cxnSpLocks/>
+            <a:stCxn id="24" idx="3"/>
+            <a:endCxn id="61" idx="1"/>
+          </p:cNvCxnSpPr>
+          <p:nvPr/>
+        </p:nvCxnSpPr>
+        <p:spPr>
+          <a:xfrm flipV="1">
+            <a:off x="2523169" y="2607952"/>
+            <a:ext cx="1377551" cy="4471"/>
+          </a:xfrm>
+          <a:prstGeom prst="line">
+            <a:avLst/>
+          </a:prstGeom>
+          <a:ln w="38100">
+            <a:solidFill>
+              <a:srgbClr val="FF0000"/>
+            </a:solidFill>
+          </a:ln>
+        </p:spPr>
+        <p:style>
+          <a:lnRef idx="2">
+            <a:schemeClr val="accent1"/>
+          </a:lnRef>
+          <a:fillRef idx="0">
+            <a:schemeClr val="accent1"/>
+          </a:fillRef>
+          <a:effectRef idx="1">
+            <a:schemeClr val="accent1"/>
+          </a:effectRef>
+          <a:fontRef idx="minor">
+            <a:schemeClr val="tx1"/>
+          </a:fontRef>
+        </p:style>
+      </p:cxnSp>
+      <p:cxnSp>
+        <p:nvCxnSpPr>
+          <p:cNvPr id="107" name="Straight Connector 106">
+            <a:extLst>
+              <a:ext uri="{FF2B5EF4-FFF2-40B4-BE49-F238E27FC236}">
+                <a16:creationId xmlns:a16="http://schemas.microsoft.com/office/drawing/2014/main" id="{94B4D3F6-2AE7-2A7E-BD22-AC4A6CD30390}"/>
+              </a:ext>
+            </a:extLst>
+          </p:cNvPr>
+          <p:cNvCxnSpPr>
+            <a:cxnSpLocks/>
+            <a:stCxn id="42" idx="3"/>
+            <a:endCxn id="43" idx="1"/>
+          </p:cNvCxnSpPr>
+          <p:nvPr/>
+        </p:nvCxnSpPr>
+        <p:spPr>
+          <a:xfrm>
+            <a:off x="1658911" y="5178463"/>
+            <a:ext cx="421423" cy="2094"/>
+          </a:xfrm>
+          <a:prstGeom prst="line">
+            <a:avLst/>
+          </a:prstGeom>
+          <a:ln w="38100">
+            <a:solidFill>
+              <a:srgbClr val="FF0000"/>
+            </a:solidFill>
+          </a:ln>
+        </p:spPr>
+        <p:style>
+          <a:lnRef idx="2">
+            <a:schemeClr val="accent1"/>
+          </a:lnRef>
+          <a:fillRef idx="0">
+            <a:schemeClr val="accent1"/>
+          </a:fillRef>
+          <a:effectRef idx="1">
+            <a:schemeClr val="accent1"/>
+          </a:effectRef>
+          <a:fontRef idx="minor">
+            <a:schemeClr val="tx1"/>
+          </a:fontRef>
+        </p:style>
+      </p:cxnSp>
+      <p:cxnSp>
+        <p:nvCxnSpPr>
+          <p:cNvPr id="112" name="Straight Connector 111">
+            <a:extLst>
+              <a:ext uri="{FF2B5EF4-FFF2-40B4-BE49-F238E27FC236}">
+                <a16:creationId xmlns:a16="http://schemas.microsoft.com/office/drawing/2014/main" id="{2832DF1C-3DB4-0204-0F34-543E7173F539}"/>
+              </a:ext>
+            </a:extLst>
+          </p:cNvPr>
+          <p:cNvCxnSpPr>
+            <a:cxnSpLocks/>
+          </p:cNvCxnSpPr>
+          <p:nvPr/>
+        </p:nvCxnSpPr>
+        <p:spPr>
+          <a:xfrm>
+            <a:off x="5666353" y="3006732"/>
+            <a:ext cx="1277415" cy="0"/>
+          </a:xfrm>
+          <a:prstGeom prst="line">
+            <a:avLst/>
+          </a:prstGeom>
+          <a:ln w="38100">
+            <a:solidFill>
+              <a:srgbClr val="FF0000"/>
+            </a:solidFill>
+          </a:ln>
+        </p:spPr>
+        <p:style>
+          <a:lnRef idx="2">
+            <a:schemeClr val="accent1"/>
+          </a:lnRef>
+          <a:fillRef idx="0">
+            <a:schemeClr val="accent1"/>
+          </a:fillRef>
+          <a:effectRef idx="1">
+            <a:schemeClr val="accent1"/>
+          </a:effectRef>
+          <a:fontRef idx="minor">
+            <a:schemeClr val="tx1"/>
+          </a:fontRef>
+        </p:style>
+      </p:cxnSp>
+      <p:grpSp>
+        <p:nvGrpSpPr>
+          <p:cNvPr id="17" name="Group 16">
+            <a:extLst>
+              <a:ext uri="{FF2B5EF4-FFF2-40B4-BE49-F238E27FC236}">
+                <a16:creationId xmlns:a16="http://schemas.microsoft.com/office/drawing/2014/main" id="{F9DF59CB-AF5D-6C6A-7E46-0701027B22A8}"/>
+              </a:ext>
+            </a:extLst>
+          </p:cNvPr>
+          <p:cNvGrpSpPr/>
+          <p:nvPr/>
+        </p:nvGrpSpPr>
+        <p:grpSpPr>
+          <a:xfrm>
+            <a:off x="6740317" y="477982"/>
+            <a:ext cx="4230069" cy="4724397"/>
+            <a:chOff x="6934793" y="284482"/>
+            <a:chExt cx="4230069" cy="4724397"/>
+          </a:xfrm>
+        </p:grpSpPr>
+        <p:sp>
+          <p:nvSpPr>
+            <p:cNvPr id="3" name="TextBox 2">
+              <a:extLst>
+                <a:ext uri="{FF2B5EF4-FFF2-40B4-BE49-F238E27FC236}">
+                  <a16:creationId xmlns:a16="http://schemas.microsoft.com/office/drawing/2014/main" id="{408470FF-CD04-94F3-BAE2-A6F52E7E2557}"/>
+                </a:ext>
+              </a:extLst>
+            </p:cNvPr>
+            <p:cNvSpPr txBox="1"/>
+            <p:nvPr/>
+          </p:nvSpPr>
+          <p:spPr>
+            <a:xfrm>
+              <a:off x="8118426" y="338651"/>
+              <a:ext cx="1873156" cy="292388"/>
+            </a:xfrm>
+            <a:prstGeom prst="rect">
+              <a:avLst/>
+            </a:prstGeom>
+            <a:noFill/>
+          </p:spPr>
+          <p:txBody>
+            <a:bodyPr wrap="square" rtlCol="0">
+              <a:spAutoFit/>
+            </a:bodyPr>
+            <a:lstStyle/>
+            <a:p>
+              <a:r>
+                <a:rPr lang="en-US" sz="1300" b="1" dirty="0">
+                  <a:solidFill>
+                    <a:srgbClr val="F39D03"/>
+                  </a:solidFill>
+                </a:rPr>
+                <a:t>Remote Infrastructure</a:t>
+              </a:r>
+            </a:p>
+          </p:txBody>
+        </p:sp>
+        <p:grpSp>
+          <p:nvGrpSpPr>
+            <p:cNvPr id="15" name="Group 14">
+              <a:extLst>
+                <a:ext uri="{FF2B5EF4-FFF2-40B4-BE49-F238E27FC236}">
+                  <a16:creationId xmlns:a16="http://schemas.microsoft.com/office/drawing/2014/main" id="{1396C777-6070-F9CE-49F9-22B110918BB9}"/>
+                </a:ext>
+              </a:extLst>
+            </p:cNvPr>
+            <p:cNvGrpSpPr/>
+            <p:nvPr/>
+          </p:nvGrpSpPr>
+          <p:grpSpPr>
+            <a:xfrm>
+              <a:off x="7158261" y="698179"/>
+              <a:ext cx="3770067" cy="4162113"/>
+              <a:chOff x="7115957" y="814698"/>
+              <a:chExt cx="3770067" cy="4162113"/>
+            </a:xfrm>
+          </p:grpSpPr>
           <p:grpSp>
             <p:nvGrpSpPr>
-              <p:cNvPr id="78" name="Group 77">
+              <p:cNvPr id="12" name="Group 11">
                 <a:extLst>
                   <a:ext uri="{FF2B5EF4-FFF2-40B4-BE49-F238E27FC236}">
-                    <a16:creationId xmlns:a16="http://schemas.microsoft.com/office/drawing/2014/main" id="{E0CBD325-5B84-414B-5B5F-E1955A17CAD2}"/>
+                    <a16:creationId xmlns:a16="http://schemas.microsoft.com/office/drawing/2014/main" id="{3C273511-3FE0-D02D-44F8-0241A12E0AB9}"/>
                   </a:ext>
                 </a:extLst>
               </p:cNvPr>
@@ -4807,18 +4760,111 @@
             </p:nvGrpSpPr>
             <p:grpSpPr>
               <a:xfrm>
-                <a:off x="8360217" y="1682186"/>
-                <a:ext cx="1209200" cy="1237047"/>
-                <a:chOff x="7968679" y="4751054"/>
-                <a:chExt cx="1209200" cy="1237047"/>
+                <a:off x="9055004" y="814698"/>
+                <a:ext cx="1831020" cy="4162113"/>
+                <a:chOff x="6934794" y="530524"/>
+                <a:chExt cx="1831020" cy="4162113"/>
               </a:xfrm>
             </p:grpSpPr>
+            <p:sp>
+              <p:nvSpPr>
+                <p:cNvPr id="63" name="Rectangle 62">
+                  <a:extLst>
+                    <a:ext uri="{FF2B5EF4-FFF2-40B4-BE49-F238E27FC236}">
+                      <a16:creationId xmlns:a16="http://schemas.microsoft.com/office/drawing/2014/main" id="{2B4EE253-D283-74B1-5F62-054CCEC6235E}"/>
+                    </a:ext>
+                  </a:extLst>
+                </p:cNvPr>
+                <p:cNvSpPr/>
+                <p:nvPr/>
+              </p:nvSpPr>
+              <p:spPr>
+                <a:xfrm>
+                  <a:off x="6934794" y="530524"/>
+                  <a:ext cx="1831020" cy="4162113"/>
+                </a:xfrm>
+                <a:prstGeom prst="rect">
+                  <a:avLst/>
+                </a:prstGeom>
+                <a:noFill/>
+                <a:ln w="28575">
+                  <a:solidFill>
+                    <a:srgbClr val="EEB500"/>
+                  </a:solidFill>
+                </a:ln>
+              </p:spPr>
+              <p:style>
+                <a:lnRef idx="2">
+                  <a:schemeClr val="accent1">
+                    <a:shade val="15000"/>
+                  </a:schemeClr>
+                </a:lnRef>
+                <a:fillRef idx="1">
+                  <a:schemeClr val="accent1"/>
+                </a:fillRef>
+                <a:effectRef idx="0">
+                  <a:schemeClr val="accent1"/>
+                </a:effectRef>
+                <a:fontRef idx="minor">
+                  <a:schemeClr val="lt1"/>
+                </a:fontRef>
+              </p:style>
+              <p:txBody>
+                <a:bodyPr rtlCol="0" anchor="ctr"/>
+                <a:lstStyle/>
+                <a:p>
+                  <a:r>
+                    <a:rPr lang="vi-VN" dirty="0"/>
+                    <a:t> (Hosted on Lightning.AI)  </a:t>
+                  </a:r>
+                </a:p>
+              </p:txBody>
+            </p:sp>
+            <p:sp>
+              <p:nvSpPr>
+                <p:cNvPr id="64" name="TextBox 63">
+                  <a:extLst>
+                    <a:ext uri="{FF2B5EF4-FFF2-40B4-BE49-F238E27FC236}">
+                      <a16:creationId xmlns:a16="http://schemas.microsoft.com/office/drawing/2014/main" id="{D9F5CD14-DAB4-1535-6258-FB583D30ACD1}"/>
+                    </a:ext>
+                  </a:extLst>
+                </p:cNvPr>
+                <p:cNvSpPr txBox="1"/>
+                <p:nvPr/>
+              </p:nvSpPr>
+              <p:spPr>
+                <a:xfrm>
+                  <a:off x="7083775" y="605400"/>
+                  <a:ext cx="1476375" cy="292388"/>
+                </a:xfrm>
+                <a:prstGeom prst="rect">
+                  <a:avLst/>
+                </a:prstGeom>
+                <a:noFill/>
+              </p:spPr>
+              <p:txBody>
+                <a:bodyPr wrap="square" rtlCol="0">
+                  <a:spAutoFit/>
+                </a:bodyPr>
+                <a:lstStyle/>
+                <a:p>
+                  <a:r>
+                    <a:rPr lang="en-US" sz="1300" b="1" dirty="0">
+                      <a:solidFill>
+                        <a:srgbClr val="F39D03"/>
+                      </a:solidFill>
+                    </a:rPr>
+                    <a:t>Remote AI server</a:t>
+                  </a:r>
+                </a:p>
+              </p:txBody>
+            </p:sp>
             <p:grpSp>
               <p:nvGrpSpPr>
-                <p:cNvPr id="75" name="Group 74">
+                <p:cNvPr id="78" name="Group 77">
                   <a:extLst>
                     <a:ext uri="{FF2B5EF4-FFF2-40B4-BE49-F238E27FC236}">
-                      <a16:creationId xmlns:a16="http://schemas.microsoft.com/office/drawing/2014/main" id="{C5ABA5A5-D03D-83E9-6E80-35D80E96D7EB}"/>
+                      <a16:creationId xmlns:a16="http://schemas.microsoft.com/office/drawing/2014/main" id="{E0CBD325-5B84-414B-5B5F-E1955A17CAD2}"/>
                     </a:ext>
                   </a:extLst>
                 </p:cNvPr>
@@ -4827,18 +4873,185 @@
               </p:nvGrpSpPr>
               <p:grpSpPr>
                 <a:xfrm>
-                  <a:off x="7968679" y="4795440"/>
-                  <a:ext cx="1209200" cy="1180571"/>
-                  <a:chOff x="7968679" y="4795440"/>
-                  <a:chExt cx="1209200" cy="1180571"/>
+                  <a:off x="7212860" y="1070841"/>
+                  <a:ext cx="1209200" cy="1237047"/>
+                  <a:chOff x="7968679" y="4751054"/>
+                  <a:chExt cx="1209200" cy="1237047"/>
+                </a:xfrm>
+              </p:grpSpPr>
+              <p:grpSp>
+                <p:nvGrpSpPr>
+                  <p:cNvPr id="75" name="Group 74">
+                    <a:extLst>
+                      <a:ext uri="{FF2B5EF4-FFF2-40B4-BE49-F238E27FC236}">
+                        <a16:creationId xmlns:a16="http://schemas.microsoft.com/office/drawing/2014/main" id="{C5ABA5A5-D03D-83E9-6E80-35D80E96D7EB}"/>
+                      </a:ext>
+                    </a:extLst>
+                  </p:cNvPr>
+                  <p:cNvGrpSpPr/>
+                  <p:nvPr/>
+                </p:nvGrpSpPr>
+                <p:grpSpPr>
+                  <a:xfrm>
+                    <a:off x="7968679" y="4795440"/>
+                    <a:ext cx="1209200" cy="1180571"/>
+                    <a:chOff x="7968679" y="4795440"/>
+                    <a:chExt cx="1209200" cy="1180571"/>
+                  </a:xfrm>
+                </p:grpSpPr>
+                <p:sp>
+                  <p:nvSpPr>
+                    <p:cNvPr id="69" name="TextBox 68">
+                      <a:extLst>
+                        <a:ext uri="{FF2B5EF4-FFF2-40B4-BE49-F238E27FC236}">
+                          <a16:creationId xmlns:a16="http://schemas.microsoft.com/office/drawing/2014/main" id="{79ADC2F2-9585-1557-969B-50EF45B4BF44}"/>
+                        </a:ext>
+                      </a:extLst>
+                    </p:cNvPr>
+                    <p:cNvSpPr txBox="1"/>
+                    <p:nvPr/>
+                  </p:nvSpPr>
+                  <p:spPr>
+                    <a:xfrm>
+                      <a:off x="7968679" y="5560513"/>
+                      <a:ext cx="1209200" cy="415498"/>
+                    </a:xfrm>
+                    <a:prstGeom prst="rect">
+                      <a:avLst/>
+                    </a:prstGeom>
+                    <a:noFill/>
+                  </p:spPr>
+                  <p:txBody>
+                    <a:bodyPr wrap="square" rtlCol="0">
+                      <a:spAutoFit/>
+                    </a:bodyPr>
+                    <a:lstStyle/>
+                    <a:p>
+                      <a:pPr algn="ctr"/>
+                      <a:r>
+                        <a:rPr lang="vi-VN" sz="1050" dirty="0">
+                          <a:latin typeface="Aptos (Body)"/>
+                        </a:rPr>
+                        <a:t>FastAPI/LitServe Endpoint</a:t>
+                      </a:r>
+                      <a:endParaRPr lang="en-US" dirty="0"/>
+                    </a:p>
+                  </p:txBody>
+                </p:sp>
+                <p:pic>
+                  <p:nvPicPr>
+                    <p:cNvPr id="74" name="Picture 73">
+                      <a:extLst>
+                        <a:ext uri="{FF2B5EF4-FFF2-40B4-BE49-F238E27FC236}">
+                          <a16:creationId xmlns:a16="http://schemas.microsoft.com/office/drawing/2014/main" id="{22A46D75-68CE-A4D3-5313-2871356FC8B4}"/>
+                        </a:ext>
+                      </a:extLst>
+                    </p:cNvPr>
+                    <p:cNvPicPr>
+                      <a:picLocks noChangeAspect="1"/>
+                    </p:cNvPicPr>
+                    <p:nvPr/>
+                  </p:nvPicPr>
+                  <p:blipFill>
+                    <a:blip r:embed="rId9"/>
+                    <a:stretch>
+                      <a:fillRect/>
+                    </a:stretch>
+                  </p:blipFill>
+                  <p:spPr>
+                    <a:xfrm>
+                      <a:off x="8183815" y="4795440"/>
+                      <a:ext cx="778928" cy="771715"/>
+                    </a:xfrm>
+                    <a:prstGeom prst="rect">
+                      <a:avLst/>
+                    </a:prstGeom>
+                  </p:spPr>
+                </p:pic>
+              </p:grpSp>
+              <p:sp>
+                <p:nvSpPr>
+                  <p:cNvPr id="76" name="Rectangle 75">
+                    <a:extLst>
+                      <a:ext uri="{FF2B5EF4-FFF2-40B4-BE49-F238E27FC236}">
+                        <a16:creationId xmlns:a16="http://schemas.microsoft.com/office/drawing/2014/main" id="{D87D8592-AB4D-1636-AED3-E30C80E90EDB}"/>
+                      </a:ext>
+                    </a:extLst>
+                  </p:cNvPr>
+                  <p:cNvSpPr/>
+                  <p:nvPr/>
+                </p:nvSpPr>
+                <p:spPr>
+                  <a:xfrm>
+                    <a:off x="8007069" y="4751054"/>
+                    <a:ext cx="1132419" cy="1237047"/>
+                  </a:xfrm>
+                  <a:prstGeom prst="rect">
+                    <a:avLst/>
+                  </a:prstGeom>
+                  <a:noFill/>
+                  <a:ln>
+                    <a:solidFill>
+                      <a:schemeClr val="accent6">
+                        <a:lumMod val="60000"/>
+                        <a:lumOff val="40000"/>
+                      </a:schemeClr>
+                    </a:solidFill>
+                    <a:prstDash val="dash"/>
+                  </a:ln>
+                </p:spPr>
+                <p:style>
+                  <a:lnRef idx="2">
+                    <a:schemeClr val="accent1">
+                      <a:shade val="15000"/>
+                    </a:schemeClr>
+                  </a:lnRef>
+                  <a:fillRef idx="1">
+                    <a:schemeClr val="accent1"/>
+                  </a:fillRef>
+                  <a:effectRef idx="0">
+                    <a:schemeClr val="accent1"/>
+                  </a:effectRef>
+                  <a:fontRef idx="minor">
+                    <a:schemeClr val="lt1"/>
+                  </a:fontRef>
+                </p:style>
+                <p:txBody>
+                  <a:bodyPr rtlCol="0" anchor="ctr"/>
+                  <a:lstStyle/>
+                  <a:p>
+                    <a:pPr algn="ctr"/>
+                    <a:endParaRPr lang="vi-VN"/>
+                  </a:p>
+                </p:txBody>
+              </p:sp>
+            </p:grpSp>
+            <p:grpSp>
+              <p:nvGrpSpPr>
+                <p:cNvPr id="79" name="Group 78">
+                  <a:extLst>
+                    <a:ext uri="{FF2B5EF4-FFF2-40B4-BE49-F238E27FC236}">
+                      <a16:creationId xmlns:a16="http://schemas.microsoft.com/office/drawing/2014/main" id="{C02BCBC3-5F7F-FF58-93D2-1620C50E30A4}"/>
+                    </a:ext>
+                  </a:extLst>
+                </p:cNvPr>
+                <p:cNvGrpSpPr/>
+                <p:nvPr/>
+              </p:nvGrpSpPr>
+              <p:grpSpPr>
+                <a:xfrm>
+                  <a:off x="7320664" y="2686834"/>
+                  <a:ext cx="968232" cy="1334974"/>
+                  <a:chOff x="9057533" y="3228888"/>
+                  <a:chExt cx="968232" cy="1334974"/>
                 </a:xfrm>
               </p:grpSpPr>
               <p:sp>
                 <p:nvSpPr>
-                  <p:cNvPr id="69" name="TextBox 68">
+                  <p:cNvPr id="70" name="TextBox 69">
                     <a:extLst>
                       <a:ext uri="{FF2B5EF4-FFF2-40B4-BE49-F238E27FC236}">
-                        <a16:creationId xmlns:a16="http://schemas.microsoft.com/office/drawing/2014/main" id="{79ADC2F2-9585-1557-969B-50EF45B4BF44}"/>
+                        <a16:creationId xmlns:a16="http://schemas.microsoft.com/office/drawing/2014/main" id="{C67527D3-4D7B-0E85-01A8-C1B98E756F8A}"/>
                       </a:ext>
                     </a:extLst>
                   </p:cNvPr>
@@ -4847,8 +5060,8 @@
                 </p:nvSpPr>
                 <p:spPr>
                   <a:xfrm>
-                    <a:off x="7968679" y="5560513"/>
-                    <a:ext cx="1209200" cy="415498"/>
+                    <a:off x="9101099" y="3986780"/>
+                    <a:ext cx="924666" cy="577081"/>
                   </a:xfrm>
                   <a:prstGeom prst="rect">
                     <a:avLst/>
@@ -4866,7 +5079,7 @@
                       <a:rPr lang="vi-VN" sz="1050" dirty="0">
                         <a:latin typeface="Aptos (Body)"/>
                       </a:rPr>
-                      <a:t>FastAPI/LitServe Endpoint</a:t>
+                      <a:t>Pytorch Transformer Model</a:t>
                     </a:r>
                     <a:endParaRPr lang="en-US" dirty="0"/>
                   </a:p>
@@ -4874,10 +5087,10 @@
               </p:sp>
               <p:pic>
                 <p:nvPicPr>
-                  <p:cNvPr id="74" name="Picture 73">
+                  <p:cNvPr id="72" name="Picture 71">
                     <a:extLst>
                       <a:ext uri="{FF2B5EF4-FFF2-40B4-BE49-F238E27FC236}">
-                        <a16:creationId xmlns:a16="http://schemas.microsoft.com/office/drawing/2014/main" id="{22A46D75-68CE-A4D3-5313-2871356FC8B4}"/>
+                        <a16:creationId xmlns:a16="http://schemas.microsoft.com/office/drawing/2014/main" id="{EDE0F3B2-ACE4-058B-F742-512A0F2C4F55}"/>
                       </a:ext>
                     </a:extLst>
                   </p:cNvPr>
@@ -4887,28 +5100,185 @@
                   <p:nvPr/>
                 </p:nvPicPr>
                 <p:blipFill>
-                  <a:blip r:embed="rId9"/>
+                  <a:blip r:embed="rId10"/>
                   <a:stretch>
                     <a:fillRect/>
                   </a:stretch>
                 </p:blipFill>
                 <p:spPr>
                   <a:xfrm>
-                    <a:off x="8183815" y="4795440"/>
-                    <a:ext cx="778928" cy="771715"/>
+                    <a:off x="9238597" y="3308314"/>
+                    <a:ext cx="657878" cy="662033"/>
                   </a:xfrm>
                   <a:prstGeom prst="rect">
                     <a:avLst/>
                   </a:prstGeom>
                 </p:spPr>
               </p:pic>
+              <p:sp>
+                <p:nvSpPr>
+                  <p:cNvPr id="77" name="Rectangle 76">
+                    <a:extLst>
+                      <a:ext uri="{FF2B5EF4-FFF2-40B4-BE49-F238E27FC236}">
+                        <a16:creationId xmlns:a16="http://schemas.microsoft.com/office/drawing/2014/main" id="{74166EF7-29D6-C0B8-0002-28D66F3BCCF6}"/>
+                      </a:ext>
+                    </a:extLst>
+                  </p:cNvPr>
+                  <p:cNvSpPr/>
+                  <p:nvPr/>
+                </p:nvSpPr>
+                <p:spPr>
+                  <a:xfrm>
+                    <a:off x="9057533" y="3228888"/>
+                    <a:ext cx="968232" cy="1334974"/>
+                  </a:xfrm>
+                  <a:prstGeom prst="rect">
+                    <a:avLst/>
+                  </a:prstGeom>
+                  <a:noFill/>
+                  <a:ln>
+                    <a:solidFill>
+                      <a:schemeClr val="accent6">
+                        <a:lumMod val="60000"/>
+                        <a:lumOff val="40000"/>
+                      </a:schemeClr>
+                    </a:solidFill>
+                    <a:prstDash val="dash"/>
+                  </a:ln>
+                </p:spPr>
+                <p:style>
+                  <a:lnRef idx="2">
+                    <a:schemeClr val="accent1">
+                      <a:shade val="15000"/>
+                    </a:schemeClr>
+                  </a:lnRef>
+                  <a:fillRef idx="1">
+                    <a:schemeClr val="accent1"/>
+                  </a:fillRef>
+                  <a:effectRef idx="0">
+                    <a:schemeClr val="accent1"/>
+                  </a:effectRef>
+                  <a:fontRef idx="minor">
+                    <a:schemeClr val="lt1"/>
+                  </a:fontRef>
+                </p:style>
+                <p:txBody>
+                  <a:bodyPr rtlCol="0" anchor="ctr"/>
+                  <a:lstStyle/>
+                  <a:p>
+                    <a:pPr algn="ctr"/>
+                    <a:endParaRPr lang="vi-VN"/>
+                  </a:p>
+                </p:txBody>
+              </p:sp>
             </p:grpSp>
             <p:sp>
               <p:nvSpPr>
-                <p:cNvPr id="76" name="Rectangle 75">
+                <p:cNvPr id="109" name="TextBox 108">
                   <a:extLst>
                     <a:ext uri="{FF2B5EF4-FFF2-40B4-BE49-F238E27FC236}">
-                      <a16:creationId xmlns:a16="http://schemas.microsoft.com/office/drawing/2014/main" id="{D87D8592-AB4D-1636-AED3-E30C80E90EDB}"/>
+                      <a16:creationId xmlns:a16="http://schemas.microsoft.com/office/drawing/2014/main" id="{8F3E6C48-62AD-1AEA-42A3-19AE218AA378}"/>
+                    </a:ext>
+                  </a:extLst>
+                </p:cNvPr>
+                <p:cNvSpPr txBox="1"/>
+                <p:nvPr/>
+              </p:nvSpPr>
+              <p:spPr>
+                <a:xfrm>
+                  <a:off x="7072190" y="4358059"/>
+                  <a:ext cx="1575723" cy="253916"/>
+                </a:xfrm>
+                <a:prstGeom prst="rect">
+                  <a:avLst/>
+                </a:prstGeom>
+                <a:noFill/>
+              </p:spPr>
+              <p:txBody>
+                <a:bodyPr wrap="square" rtlCol="0">
+                  <a:spAutoFit/>
+                </a:bodyPr>
+                <a:lstStyle/>
+                <a:p>
+                  <a:r>
+                    <a:rPr lang="vi-VN" sz="1050" dirty="0">
+                      <a:latin typeface="Aptos (Body)"/>
+                    </a:rPr>
+                    <a:t>(Hosted on Lightning.ai)  </a:t>
+                  </a:r>
+                </a:p>
+              </p:txBody>
+            </p:sp>
+            <p:cxnSp>
+              <p:nvCxnSpPr>
+                <p:cNvPr id="119" name="Straight Connector 118">
+                  <a:extLst>
+                    <a:ext uri="{FF2B5EF4-FFF2-40B4-BE49-F238E27FC236}">
+                      <a16:creationId xmlns:a16="http://schemas.microsoft.com/office/drawing/2014/main" id="{FA8A0752-25D2-EC29-FA65-F4857D4BE768}"/>
+                    </a:ext>
+                  </a:extLst>
+                </p:cNvPr>
+                <p:cNvCxnSpPr>
+                  <a:cxnSpLocks/>
+                </p:cNvCxnSpPr>
+                <p:nvPr/>
+              </p:nvCxnSpPr>
+              <p:spPr>
+                <a:xfrm flipH="1">
+                  <a:off x="7817459" y="2336463"/>
+                  <a:ext cx="1" cy="338164"/>
+                </a:xfrm>
+                <a:prstGeom prst="line">
+                  <a:avLst/>
+                </a:prstGeom>
+                <a:ln w="38100">
+                  <a:solidFill>
+                    <a:srgbClr val="FF0000"/>
+                  </a:solidFill>
+                </a:ln>
+              </p:spPr>
+              <p:style>
+                <a:lnRef idx="2">
+                  <a:schemeClr val="accent1"/>
+                </a:lnRef>
+                <a:fillRef idx="0">
+                  <a:schemeClr val="accent1"/>
+                </a:fillRef>
+                <a:effectRef idx="1">
+                  <a:schemeClr val="accent1"/>
+                </a:effectRef>
+                <a:fontRef idx="minor">
+                  <a:schemeClr val="tx1"/>
+                </a:fontRef>
+              </p:style>
+            </p:cxnSp>
+          </p:grpSp>
+          <p:grpSp>
+            <p:nvGrpSpPr>
+              <p:cNvPr id="11" name="Group 10">
+                <a:extLst>
+                  <a:ext uri="{FF2B5EF4-FFF2-40B4-BE49-F238E27FC236}">
+                    <a16:creationId xmlns:a16="http://schemas.microsoft.com/office/drawing/2014/main" id="{2C85AA91-FF88-0C31-8A1E-195FE62CD469}"/>
+                  </a:ext>
+                </a:extLst>
+              </p:cNvPr>
+              <p:cNvGrpSpPr/>
+              <p:nvPr/>
+            </p:nvGrpSpPr>
+            <p:grpSpPr>
+              <a:xfrm>
+                <a:off x="7115957" y="2259036"/>
+                <a:ext cx="1700538" cy="1273436"/>
+                <a:chOff x="9399827" y="2789568"/>
+                <a:chExt cx="1700538" cy="1273436"/>
+              </a:xfrm>
+            </p:grpSpPr>
+            <p:sp>
+              <p:nvSpPr>
+                <p:cNvPr id="2" name="Rectangle 1">
+                  <a:extLst>
+                    <a:ext uri="{FF2B5EF4-FFF2-40B4-BE49-F238E27FC236}">
+                      <a16:creationId xmlns:a16="http://schemas.microsoft.com/office/drawing/2014/main" id="{4F7C8471-4714-1960-47CE-0660B0D33F0B}"/>
                     </a:ext>
                   </a:extLst>
                 </p:cNvPr>
@@ -4917,21 +5287,17 @@
               </p:nvSpPr>
               <p:spPr>
                 <a:xfrm>
-                  <a:off x="8007069" y="4751054"/>
-                  <a:ext cx="1132419" cy="1237047"/>
+                  <a:off x="9399827" y="2789568"/>
+                  <a:ext cx="1700538" cy="1273436"/>
                 </a:xfrm>
                 <a:prstGeom prst="rect">
                   <a:avLst/>
                 </a:prstGeom>
                 <a:noFill/>
-                <a:ln>
+                <a:ln w="28575">
                   <a:solidFill>
-                    <a:schemeClr val="accent6">
-                      <a:lumMod val="60000"/>
-                      <a:lumOff val="40000"/>
-                    </a:schemeClr>
+                    <a:srgbClr val="EEB500"/>
                   </a:solidFill>
-                  <a:prstDash val="dash"/>
                 </a:ln>
               </p:spPr>
               <p:style>
@@ -4959,33 +5325,106 @@
                 </a:p>
               </p:txBody>
             </p:sp>
-          </p:grpSp>
-          <p:grpSp>
-            <p:nvGrpSpPr>
-              <p:cNvPr id="79" name="Group 78">
-                <a:extLst>
-                  <a:ext uri="{FF2B5EF4-FFF2-40B4-BE49-F238E27FC236}">
-                    <a16:creationId xmlns:a16="http://schemas.microsoft.com/office/drawing/2014/main" id="{C02BCBC3-5F7F-FF58-93D2-1620C50E30A4}"/>
-                  </a:ext>
-                </a:extLst>
-              </p:cNvPr>
-              <p:cNvGrpSpPr/>
-              <p:nvPr/>
-            </p:nvGrpSpPr>
-            <p:grpSpPr>
-              <a:xfrm>
-                <a:off x="8468021" y="3298179"/>
-                <a:ext cx="968232" cy="1334974"/>
-                <a:chOff x="9057533" y="3228888"/>
-                <a:chExt cx="968232" cy="1334974"/>
-              </a:xfrm>
-            </p:grpSpPr>
+            <p:grpSp>
+              <p:nvGrpSpPr>
+                <p:cNvPr id="9" name="Group 8">
+                  <a:extLst>
+                    <a:ext uri="{FF2B5EF4-FFF2-40B4-BE49-F238E27FC236}">
+                      <a16:creationId xmlns:a16="http://schemas.microsoft.com/office/drawing/2014/main" id="{1804EACE-58A9-CE3D-B6BB-AEB40F694CFD}"/>
+                    </a:ext>
+                  </a:extLst>
+                </p:cNvPr>
+                <p:cNvGrpSpPr/>
+                <p:nvPr/>
+              </p:nvGrpSpPr>
+              <p:grpSpPr>
+                <a:xfrm>
+                  <a:off x="9739908" y="3097276"/>
+                  <a:ext cx="1020374" cy="965727"/>
+                  <a:chOff x="9778867" y="1386603"/>
+                  <a:chExt cx="1020374" cy="965727"/>
+                </a:xfrm>
+              </p:grpSpPr>
+              <p:sp>
+                <p:nvSpPr>
+                  <p:cNvPr id="6" name="TextBox 5">
+                    <a:extLst>
+                      <a:ext uri="{FF2B5EF4-FFF2-40B4-BE49-F238E27FC236}">
+                        <a16:creationId xmlns:a16="http://schemas.microsoft.com/office/drawing/2014/main" id="{84F84F74-0D87-0E43-39E5-D48D95B8A7FA}"/>
+                      </a:ext>
+                    </a:extLst>
+                  </p:cNvPr>
+                  <p:cNvSpPr txBox="1"/>
+                  <p:nvPr/>
+                </p:nvSpPr>
+                <p:spPr>
+                  <a:xfrm>
+                    <a:off x="9778867" y="2098414"/>
+                    <a:ext cx="1020374" cy="253916"/>
+                  </a:xfrm>
+                  <a:prstGeom prst="rect">
+                    <a:avLst/>
+                  </a:prstGeom>
+                  <a:noFill/>
+                </p:spPr>
+                <p:txBody>
+                  <a:bodyPr wrap="square" rtlCol="0">
+                    <a:spAutoFit/>
+                  </a:bodyPr>
+                  <a:lstStyle/>
+                  <a:p>
+                    <a:r>
+                      <a:rPr lang="vi-VN" sz="1050" dirty="0" err="1">
+                        <a:latin typeface="Aptos (Body)"/>
+                      </a:rPr>
+                      <a:t>iNaturalist</a:t>
+                    </a:r>
+                    <a:r>
+                      <a:rPr lang="vi-VN" sz="1050" dirty="0">
+                        <a:latin typeface="Aptos (Body)"/>
+                      </a:rPr>
+                      <a:t> API</a:t>
+                    </a:r>
+                  </a:p>
+                </p:txBody>
+              </p:sp>
+              <p:pic>
+                <p:nvPicPr>
+                  <p:cNvPr id="10" name="Picture 9">
+                    <a:extLst>
+                      <a:ext uri="{FF2B5EF4-FFF2-40B4-BE49-F238E27FC236}">
+                        <a16:creationId xmlns:a16="http://schemas.microsoft.com/office/drawing/2014/main" id="{FF206516-E10E-EE8B-EC16-7E42D5030752}"/>
+                      </a:ext>
+                    </a:extLst>
+                  </p:cNvPr>
+                  <p:cNvPicPr>
+                    <a:picLocks noChangeAspect="1"/>
+                  </p:cNvPicPr>
+                  <p:nvPr/>
+                </p:nvPicPr>
+                <p:blipFill>
+                  <a:blip r:embed="rId11"/>
+                  <a:stretch>
+                    <a:fillRect/>
+                  </a:stretch>
+                </p:blipFill>
+                <p:spPr>
+                  <a:xfrm>
+                    <a:off x="9947961" y="1386603"/>
+                    <a:ext cx="682186" cy="676175"/>
+                  </a:xfrm>
+                  <a:prstGeom prst="rect">
+                    <a:avLst/>
+                  </a:prstGeom>
+                </p:spPr>
+              </p:pic>
+            </p:grpSp>
             <p:sp>
               <p:nvSpPr>
-                <p:cNvPr id="70" name="TextBox 69">
+                <p:cNvPr id="4" name="TextBox 3">
                   <a:extLst>
                     <a:ext uri="{FF2B5EF4-FFF2-40B4-BE49-F238E27FC236}">
-                      <a16:creationId xmlns:a16="http://schemas.microsoft.com/office/drawing/2014/main" id="{C67527D3-4D7B-0E85-01A8-C1B98E756F8A}"/>
+                      <a16:creationId xmlns:a16="http://schemas.microsoft.com/office/drawing/2014/main" id="{67065C2F-8A68-756E-6E2E-B9DF80258C73}"/>
                     </a:ext>
                   </a:extLst>
                 </p:cNvPr>
@@ -4994,8 +5433,8 @@
               </p:nvSpPr>
               <p:spPr>
                 <a:xfrm>
-                  <a:off x="9101099" y="3986780"/>
-                  <a:ext cx="924666" cy="577081"/>
+                  <a:off x="9399827" y="2840181"/>
+                  <a:ext cx="1700537" cy="292388"/>
                 </a:xfrm>
                 <a:prstGeom prst="rect">
                   <a:avLst/>
@@ -5008,230 +5447,115 @@
                 </a:bodyPr>
                 <a:lstStyle/>
                 <a:p>
-                  <a:pPr algn="ctr"/>
                   <a:r>
-                    <a:rPr lang="vi-VN" sz="1050" dirty="0">
-                      <a:latin typeface="Aptos (Body)"/>
+                    <a:rPr lang="en-US" sz="1300" b="1" dirty="0">
+                      <a:solidFill>
+                        <a:srgbClr val="F39D03"/>
+                      </a:solidFill>
                     </a:rPr>
-                    <a:t>Pytorch Transformer Model</a:t>
+                    <a:t>Third Party Services</a:t>
                   </a:r>
-                  <a:endParaRPr lang="en-US" dirty="0"/>
-                </a:p>
-              </p:txBody>
-            </p:sp>
-            <p:pic>
-              <p:nvPicPr>
-                <p:cNvPr id="72" name="Picture 71">
-                  <a:extLst>
-                    <a:ext uri="{FF2B5EF4-FFF2-40B4-BE49-F238E27FC236}">
-                      <a16:creationId xmlns:a16="http://schemas.microsoft.com/office/drawing/2014/main" id="{EDE0F3B2-ACE4-058B-F742-512A0F2C4F55}"/>
-                    </a:ext>
-                  </a:extLst>
-                </p:cNvPr>
-                <p:cNvPicPr>
-                  <a:picLocks noChangeAspect="1"/>
-                </p:cNvPicPr>
-                <p:nvPr/>
-              </p:nvPicPr>
-              <p:blipFill>
-                <a:blip r:embed="rId10"/>
-                <a:stretch>
-                  <a:fillRect/>
-                </a:stretch>
-              </p:blipFill>
-              <p:spPr>
-                <a:xfrm>
-                  <a:off x="9238597" y="3308314"/>
-                  <a:ext cx="657878" cy="662033"/>
-                </a:xfrm>
-                <a:prstGeom prst="rect">
-                  <a:avLst/>
-                </a:prstGeom>
-              </p:spPr>
-            </p:pic>
-            <p:sp>
-              <p:nvSpPr>
-                <p:cNvPr id="77" name="Rectangle 76">
-                  <a:extLst>
-                    <a:ext uri="{FF2B5EF4-FFF2-40B4-BE49-F238E27FC236}">
-                      <a16:creationId xmlns:a16="http://schemas.microsoft.com/office/drawing/2014/main" id="{74166EF7-29D6-C0B8-0002-28D66F3BCCF6}"/>
-                    </a:ext>
-                  </a:extLst>
-                </p:cNvPr>
-                <p:cNvSpPr/>
-                <p:nvPr/>
-              </p:nvSpPr>
-              <p:spPr>
-                <a:xfrm>
-                  <a:off x="9057533" y="3228888"/>
-                  <a:ext cx="968232" cy="1334974"/>
-                </a:xfrm>
-                <a:prstGeom prst="rect">
-                  <a:avLst/>
-                </a:prstGeom>
-                <a:noFill/>
-                <a:ln>
-                  <a:solidFill>
-                    <a:schemeClr val="accent6">
-                      <a:lumMod val="60000"/>
-                      <a:lumOff val="40000"/>
-                    </a:schemeClr>
-                  </a:solidFill>
-                  <a:prstDash val="dash"/>
-                </a:ln>
-              </p:spPr>
-              <p:style>
-                <a:lnRef idx="2">
-                  <a:schemeClr val="accent1">
-                    <a:shade val="15000"/>
-                  </a:schemeClr>
-                </a:lnRef>
-                <a:fillRef idx="1">
-                  <a:schemeClr val="accent1"/>
-                </a:fillRef>
-                <a:effectRef idx="0">
-                  <a:schemeClr val="accent1"/>
-                </a:effectRef>
-                <a:fontRef idx="minor">
-                  <a:schemeClr val="lt1"/>
-                </a:fontRef>
-              </p:style>
-              <p:txBody>
-                <a:bodyPr rtlCol="0" anchor="ctr"/>
-                <a:lstStyle/>
-                <a:p>
-                  <a:pPr algn="ctr"/>
-                  <a:endParaRPr lang="vi-VN"/>
                 </a:p>
               </p:txBody>
             </p:sp>
           </p:grpSp>
-          <p:sp>
-            <p:nvSpPr>
-              <p:cNvPr id="109" name="TextBox 108">
-                <a:extLst>
-                  <a:ext uri="{FF2B5EF4-FFF2-40B4-BE49-F238E27FC236}">
-                    <a16:creationId xmlns:a16="http://schemas.microsoft.com/office/drawing/2014/main" id="{8F3E6C48-62AD-1AEA-42A3-19AE218AA378}"/>
-                  </a:ext>
-                </a:extLst>
-              </p:cNvPr>
-              <p:cNvSpPr txBox="1"/>
-              <p:nvPr/>
-            </p:nvSpPr>
-            <p:spPr>
-              <a:xfrm>
-                <a:off x="8219547" y="4969404"/>
-                <a:ext cx="1575723" cy="253916"/>
-              </a:xfrm>
-              <a:prstGeom prst="rect">
-                <a:avLst/>
-              </a:prstGeom>
-              <a:noFill/>
-            </p:spPr>
-            <p:txBody>
-              <a:bodyPr wrap="square" rtlCol="0">
-                <a:spAutoFit/>
-              </a:bodyPr>
-              <a:lstStyle/>
-              <a:p>
-                <a:r>
-                  <a:rPr lang="vi-VN" sz="1050" dirty="0">
-                    <a:latin typeface="Aptos (Body)"/>
-                  </a:rPr>
-                  <a:t>(Hosted on Lightning.AI)  </a:t>
-                </a:r>
-              </a:p>
-            </p:txBody>
-          </p:sp>
         </p:grpSp>
-        <p:cxnSp>
-          <p:nvCxnSpPr>
-            <p:cNvPr id="112" name="Straight Connector 111">
+        <p:sp>
+          <p:nvSpPr>
+            <p:cNvPr id="13" name="Rectangle 12">
               <a:extLst>
                 <a:ext uri="{FF2B5EF4-FFF2-40B4-BE49-F238E27FC236}">
-                  <a16:creationId xmlns:a16="http://schemas.microsoft.com/office/drawing/2014/main" id="{2832DF1C-3DB4-0204-0F34-543E7173F539}"/>
+                  <a16:creationId xmlns:a16="http://schemas.microsoft.com/office/drawing/2014/main" id="{BC0C8E92-25D1-0D1F-E02B-41DD9B5948D6}"/>
                 </a:ext>
               </a:extLst>
             </p:cNvPr>
-            <p:cNvCxnSpPr>
-              <a:cxnSpLocks/>
-              <a:stCxn id="61" idx="3"/>
-            </p:cNvCxnSpPr>
+            <p:cNvSpPr/>
             <p:nvPr/>
-          </p:nvCxnSpPr>
+          </p:nvSpPr>
           <p:spPr>
             <a:xfrm>
-              <a:off x="5524748" y="2569852"/>
-              <a:ext cx="1277415" cy="0"/>
+              <a:off x="6934793" y="284482"/>
+              <a:ext cx="4230069" cy="4724397"/>
             </a:xfrm>
-            <a:prstGeom prst="line">
+            <a:prstGeom prst="rect">
               <a:avLst/>
             </a:prstGeom>
-            <a:ln w="38100">
+            <a:noFill/>
+            <a:ln w="28575">
               <a:solidFill>
-                <a:srgbClr val="FF0000"/>
+                <a:srgbClr val="EEB500"/>
               </a:solidFill>
             </a:ln>
           </p:spPr>
           <p:style>
             <a:lnRef idx="2">
-              <a:schemeClr val="accent1"/>
+              <a:schemeClr val="accent1">
+                <a:shade val="15000"/>
+              </a:schemeClr>
             </a:lnRef>
-            <a:fillRef idx="0">
+            <a:fillRef idx="1">
               <a:schemeClr val="accent1"/>
             </a:fillRef>
-            <a:effectRef idx="1">
+            <a:effectRef idx="0">
               <a:schemeClr val="accent1"/>
             </a:effectRef>
             <a:fontRef idx="minor">
-              <a:schemeClr val="tx1"/>
+              <a:schemeClr val="lt1"/>
             </a:fontRef>
           </p:style>
-        </p:cxnSp>
-        <p:cxnSp>
-          <p:nvCxnSpPr>
-            <p:cNvPr id="119" name="Straight Connector 118">
-              <a:extLst>
-                <a:ext uri="{FF2B5EF4-FFF2-40B4-BE49-F238E27FC236}">
-                  <a16:creationId xmlns:a16="http://schemas.microsoft.com/office/drawing/2014/main" id="{FA8A0752-25D2-EC29-FA65-F4857D4BE768}"/>
-                </a:ext>
-              </a:extLst>
-            </p:cNvPr>
-            <p:cNvCxnSpPr>
-              <a:cxnSpLocks/>
-            </p:cNvCxnSpPr>
-            <p:nvPr/>
-          </p:nvCxnSpPr>
-          <p:spPr>
-            <a:xfrm flipH="1">
-              <a:off x="7655534" y="2298363"/>
-              <a:ext cx="1" cy="338164"/>
-            </a:xfrm>
-            <a:prstGeom prst="line">
-              <a:avLst/>
-            </a:prstGeom>
-            <a:ln w="38100">
-              <a:solidFill>
-                <a:srgbClr val="FF0000"/>
-              </a:solidFill>
-            </a:ln>
-          </p:spPr>
-          <p:style>
-            <a:lnRef idx="2">
-              <a:schemeClr val="accent1"/>
-            </a:lnRef>
-            <a:fillRef idx="0">
-              <a:schemeClr val="accent1"/>
-            </a:fillRef>
-            <a:effectRef idx="1">
-              <a:schemeClr val="accent1"/>
-            </a:effectRef>
-            <a:fontRef idx="minor">
-              <a:schemeClr val="tx1"/>
-            </a:fontRef>
-          </p:style>
-        </p:cxnSp>
+          <p:txBody>
+            <a:bodyPr rtlCol="0" anchor="ctr"/>
+            <a:lstStyle/>
+            <a:p>
+              <a:pPr algn="ctr"/>
+              <a:endParaRPr lang="vi-VN"/>
+            </a:p>
+          </p:txBody>
+        </p:sp>
       </p:grpSp>
+      <p:cxnSp>
+        <p:nvCxnSpPr>
+          <p:cNvPr id="19" name="Straight Connector 18">
+            <a:extLst>
+              <a:ext uri="{FF2B5EF4-FFF2-40B4-BE49-F238E27FC236}">
+                <a16:creationId xmlns:a16="http://schemas.microsoft.com/office/drawing/2014/main" id="{55643A4D-F7E8-BD18-4D4A-5695C599F084}"/>
+              </a:ext>
+            </a:extLst>
+          </p:cNvPr>
+          <p:cNvCxnSpPr>
+            <a:cxnSpLocks/>
+          </p:cNvCxnSpPr>
+          <p:nvPr/>
+        </p:nvCxnSpPr>
+        <p:spPr>
+          <a:xfrm>
+            <a:off x="5686673" y="1921941"/>
+            <a:ext cx="3216159" cy="0"/>
+          </a:xfrm>
+          <a:prstGeom prst="line">
+            <a:avLst/>
+          </a:prstGeom>
+          <a:ln w="38100">
+            <a:solidFill>
+              <a:srgbClr val="FF0000"/>
+            </a:solidFill>
+          </a:ln>
+        </p:spPr>
+        <p:style>
+          <a:lnRef idx="2">
+            <a:schemeClr val="accent1"/>
+          </a:lnRef>
+          <a:fillRef idx="0">
+            <a:schemeClr val="accent1"/>
+          </a:fillRef>
+          <a:effectRef idx="1">
+            <a:schemeClr val="accent1"/>
+          </a:effectRef>
+          <a:fontRef idx="minor">
+            <a:schemeClr val="tx1"/>
+          </a:fontRef>
+        </p:style>
+      </p:cxnSp>
     </p:spTree>
     <p:extLst>
       <p:ext uri="{BB962C8B-B14F-4D97-AF65-F5344CB8AC3E}">
@@ -5631,7 +5955,7 @@
         </p:nvSpPr>
         <p:spPr>
           <a:xfrm>
-            <a:off x="4665054" y="3503316"/>
+            <a:off x="447952" y="3429000"/>
             <a:ext cx="2002446" cy="292388"/>
           </a:xfrm>
           <a:prstGeom prst="rect">
@@ -5708,6 +6032,86 @@
           </a:p>
         </p:txBody>
       </p:sp>
+      <p:sp>
+        <p:nvSpPr>
+          <p:cNvPr id="2" name="TextBox 1">
+            <a:extLst>
+              <a:ext uri="{FF2B5EF4-FFF2-40B4-BE49-F238E27FC236}">
+                <a16:creationId xmlns:a16="http://schemas.microsoft.com/office/drawing/2014/main" id="{40417276-05FB-3B25-B278-3F4D77D9B884}"/>
+              </a:ext>
+            </a:extLst>
+          </p:cNvPr>
+          <p:cNvSpPr txBox="1"/>
+          <p:nvPr/>
+        </p:nvSpPr>
+        <p:spPr>
+          <a:xfrm>
+            <a:off x="4817454" y="3655716"/>
+            <a:ext cx="2002446" cy="292388"/>
+          </a:xfrm>
+          <a:prstGeom prst="rect">
+            <a:avLst/>
+          </a:prstGeom>
+          <a:noFill/>
+        </p:spPr>
+        <p:txBody>
+          <a:bodyPr wrap="square" rtlCol="0">
+            <a:spAutoFit/>
+          </a:bodyPr>
+          <a:lstStyle/>
+          <a:p>
+            <a:r>
+              <a:rPr lang="en-US" sz="1300" b="1" dirty="0">
+                <a:solidFill>
+                  <a:srgbClr val="F39D03"/>
+                </a:solidFill>
+              </a:rPr>
+              <a:t>Internet access</a:t>
+            </a:r>
+          </a:p>
+        </p:txBody>
+      </p:sp>
+      <p:cxnSp>
+        <p:nvCxnSpPr>
+          <p:cNvPr id="91" name="Straight Connector 90">
+            <a:extLst>
+              <a:ext uri="{FF2B5EF4-FFF2-40B4-BE49-F238E27FC236}">
+                <a16:creationId xmlns:a16="http://schemas.microsoft.com/office/drawing/2014/main" id="{59F15CE6-8246-7B9C-8525-BD51E40338DA}"/>
+              </a:ext>
+            </a:extLst>
+          </p:cNvPr>
+          <p:cNvCxnSpPr/>
+          <p:nvPr/>
+        </p:nvCxnSpPr>
+        <p:spPr>
+          <a:xfrm>
+            <a:off x="11346872" y="1314770"/>
+            <a:ext cx="0" cy="2452303"/>
+          </a:xfrm>
+          <a:prstGeom prst="line">
+            <a:avLst/>
+          </a:prstGeom>
+          <a:ln w="38100">
+            <a:solidFill>
+              <a:srgbClr val="FF0000"/>
+            </a:solidFill>
+          </a:ln>
+        </p:spPr>
+        <p:style>
+          <a:lnRef idx="2">
+            <a:schemeClr val="accent1"/>
+          </a:lnRef>
+          <a:fillRef idx="0">
+            <a:schemeClr val="accent1"/>
+          </a:fillRef>
+          <a:effectRef idx="1">
+            <a:schemeClr val="accent1"/>
+          </a:effectRef>
+          <a:fontRef idx="minor">
+            <a:schemeClr val="tx1"/>
+          </a:fontRef>
+        </p:style>
+      </p:cxnSp>
     </p:spTree>
     <p:extLst>
       <p:ext uri="{BB962C8B-B14F-4D97-AF65-F5344CB8AC3E}">

</xml_diff>

<commit_message>
feat: some small updates and changes
</commit_message>
<xml_diff>
--- a/Báo cáo/Diagram/System architecture.pptx
+++ b/Báo cáo/Diagram/System architecture.pptx
@@ -263,7 +263,7 @@
           <a:p>
             <a:fld id="{7DFF92C5-6146-4B60-B7D1-75DB42B1D625}" type="datetimeFigureOut">
               <a:rPr lang="vi-VN" smtClean="0"/>
-              <a:t>28/11/2025</a:t>
+              <a:t>15/12/2025</a:t>
             </a:fld>
             <a:endParaRPr lang="vi-VN"/>
           </a:p>
@@ -463,7 +463,7 @@
           <a:p>
             <a:fld id="{7DFF92C5-6146-4B60-B7D1-75DB42B1D625}" type="datetimeFigureOut">
               <a:rPr lang="vi-VN" smtClean="0"/>
-              <a:t>28/11/2025</a:t>
+              <a:t>15/12/2025</a:t>
             </a:fld>
             <a:endParaRPr lang="vi-VN"/>
           </a:p>
@@ -673,7 +673,7 @@
           <a:p>
             <a:fld id="{7DFF92C5-6146-4B60-B7D1-75DB42B1D625}" type="datetimeFigureOut">
               <a:rPr lang="vi-VN" smtClean="0"/>
-              <a:t>28/11/2025</a:t>
+              <a:t>15/12/2025</a:t>
             </a:fld>
             <a:endParaRPr lang="vi-VN"/>
           </a:p>
@@ -873,7 +873,7 @@
           <a:p>
             <a:fld id="{7DFF92C5-6146-4B60-B7D1-75DB42B1D625}" type="datetimeFigureOut">
               <a:rPr lang="vi-VN" smtClean="0"/>
-              <a:t>28/11/2025</a:t>
+              <a:t>15/12/2025</a:t>
             </a:fld>
             <a:endParaRPr lang="vi-VN"/>
           </a:p>
@@ -1149,7 +1149,7 @@
           <a:p>
             <a:fld id="{7DFF92C5-6146-4B60-B7D1-75DB42B1D625}" type="datetimeFigureOut">
               <a:rPr lang="vi-VN" smtClean="0"/>
-              <a:t>28/11/2025</a:t>
+              <a:t>15/12/2025</a:t>
             </a:fld>
             <a:endParaRPr lang="vi-VN"/>
           </a:p>
@@ -1417,7 +1417,7 @@
           <a:p>
             <a:fld id="{7DFF92C5-6146-4B60-B7D1-75DB42B1D625}" type="datetimeFigureOut">
               <a:rPr lang="vi-VN" smtClean="0"/>
-              <a:t>28/11/2025</a:t>
+              <a:t>15/12/2025</a:t>
             </a:fld>
             <a:endParaRPr lang="vi-VN"/>
           </a:p>
@@ -1832,7 +1832,7 @@
           <a:p>
             <a:fld id="{7DFF92C5-6146-4B60-B7D1-75DB42B1D625}" type="datetimeFigureOut">
               <a:rPr lang="vi-VN" smtClean="0"/>
-              <a:t>28/11/2025</a:t>
+              <a:t>15/12/2025</a:t>
             </a:fld>
             <a:endParaRPr lang="vi-VN"/>
           </a:p>
@@ -1974,7 +1974,7 @@
           <a:p>
             <a:fld id="{7DFF92C5-6146-4B60-B7D1-75DB42B1D625}" type="datetimeFigureOut">
               <a:rPr lang="vi-VN" smtClean="0"/>
-              <a:t>28/11/2025</a:t>
+              <a:t>15/12/2025</a:t>
             </a:fld>
             <a:endParaRPr lang="vi-VN"/>
           </a:p>
@@ -2087,7 +2087,7 @@
           <a:p>
             <a:fld id="{7DFF92C5-6146-4B60-B7D1-75DB42B1D625}" type="datetimeFigureOut">
               <a:rPr lang="vi-VN" smtClean="0"/>
-              <a:t>28/11/2025</a:t>
+              <a:t>15/12/2025</a:t>
             </a:fld>
             <a:endParaRPr lang="vi-VN"/>
           </a:p>
@@ -2400,7 +2400,7 @@
           <a:p>
             <a:fld id="{7DFF92C5-6146-4B60-B7D1-75DB42B1D625}" type="datetimeFigureOut">
               <a:rPr lang="vi-VN" smtClean="0"/>
-              <a:t>28/11/2025</a:t>
+              <a:t>15/12/2025</a:t>
             </a:fld>
             <a:endParaRPr lang="vi-VN"/>
           </a:p>
@@ -2689,7 +2689,7 @@
           <a:p>
             <a:fld id="{7DFF92C5-6146-4B60-B7D1-75DB42B1D625}" type="datetimeFigureOut">
               <a:rPr lang="vi-VN" smtClean="0"/>
-              <a:t>28/11/2025</a:t>
+              <a:t>15/12/2025</a:t>
             </a:fld>
             <a:endParaRPr lang="vi-VN"/>
           </a:p>
@@ -2932,7 +2932,7 @@
           <a:p>
             <a:fld id="{7DFF92C5-6146-4B60-B7D1-75DB42B1D625}" type="datetimeFigureOut">
               <a:rPr lang="vi-VN" smtClean="0"/>
-              <a:t>28/11/2025</a:t>
+              <a:t>15/12/2025</a:t>
             </a:fld>
             <a:endParaRPr lang="vi-VN"/>
           </a:p>
@@ -4667,12 +4667,55 @@
           </a:fontRef>
         </p:style>
       </p:cxnSp>
+      <p:cxnSp>
+        <p:nvCxnSpPr>
+          <p:cNvPr id="19" name="Straight Connector 18">
+            <a:extLst>
+              <a:ext uri="{FF2B5EF4-FFF2-40B4-BE49-F238E27FC236}">
+                <a16:creationId xmlns:a16="http://schemas.microsoft.com/office/drawing/2014/main" id="{55643A4D-F7E8-BD18-4D4A-5695C599F084}"/>
+              </a:ext>
+            </a:extLst>
+          </p:cNvPr>
+          <p:cNvCxnSpPr>
+            <a:cxnSpLocks/>
+          </p:cNvCxnSpPr>
+          <p:nvPr/>
+        </p:nvCxnSpPr>
+        <p:spPr>
+          <a:xfrm>
+            <a:off x="5686673" y="1921941"/>
+            <a:ext cx="3216159" cy="0"/>
+          </a:xfrm>
+          <a:prstGeom prst="line">
+            <a:avLst/>
+          </a:prstGeom>
+          <a:ln w="38100">
+            <a:solidFill>
+              <a:srgbClr val="FF0000"/>
+            </a:solidFill>
+          </a:ln>
+        </p:spPr>
+        <p:style>
+          <a:lnRef idx="2">
+            <a:schemeClr val="accent1"/>
+          </a:lnRef>
+          <a:fillRef idx="0">
+            <a:schemeClr val="accent1"/>
+          </a:fillRef>
+          <a:effectRef idx="1">
+            <a:schemeClr val="accent1"/>
+          </a:effectRef>
+          <a:fontRef idx="minor">
+            <a:schemeClr val="tx1"/>
+          </a:fontRef>
+        </p:style>
+      </p:cxnSp>
       <p:grpSp>
         <p:nvGrpSpPr>
-          <p:cNvPr id="17" name="Group 16">
-            <a:extLst>
-              <a:ext uri="{FF2B5EF4-FFF2-40B4-BE49-F238E27FC236}">
-                <a16:creationId xmlns:a16="http://schemas.microsoft.com/office/drawing/2014/main" id="{F9DF59CB-AF5D-6C6A-7E46-0701027B22A8}"/>
+          <p:cNvPr id="37" name="Group 36">
+            <a:extLst>
+              <a:ext uri="{FF2B5EF4-FFF2-40B4-BE49-F238E27FC236}">
+                <a16:creationId xmlns:a16="http://schemas.microsoft.com/office/drawing/2014/main" id="{008C20FB-98A2-824A-DB8D-807069AF106D}"/>
               </a:ext>
             </a:extLst>
           </p:cNvPr>
@@ -4681,10 +4724,10 @@
         </p:nvGrpSpPr>
         <p:grpSpPr>
           <a:xfrm>
-            <a:off x="6740317" y="477982"/>
-            <a:ext cx="4230069" cy="4724397"/>
-            <a:chOff x="6934793" y="284482"/>
-            <a:chExt cx="4230069" cy="4724397"/>
+            <a:off x="6740317" y="522310"/>
+            <a:ext cx="4230069" cy="5009809"/>
+            <a:chOff x="6740317" y="522310"/>
+            <a:chExt cx="4230069" cy="5009809"/>
           </a:xfrm>
         </p:grpSpPr>
         <p:sp>
@@ -4701,7 +4744,7 @@
           </p:nvSpPr>
           <p:spPr>
             <a:xfrm>
-              <a:off x="8118426" y="338651"/>
+              <a:off x="7923950" y="635021"/>
               <a:ext cx="1873156" cy="292388"/>
             </a:xfrm>
             <a:prstGeom prst="rect">
@@ -4726,12 +4769,142 @@
             </a:p>
           </p:txBody>
         </p:sp>
+        <p:sp>
+          <p:nvSpPr>
+            <p:cNvPr id="63" name="Rectangle 62">
+              <a:extLst>
+                <a:ext uri="{FF2B5EF4-FFF2-40B4-BE49-F238E27FC236}">
+                  <a16:creationId xmlns:a16="http://schemas.microsoft.com/office/drawing/2014/main" id="{2B4EE253-D283-74B1-5F62-054CCEC6235E}"/>
+                </a:ext>
+              </a:extLst>
+            </p:cNvPr>
+            <p:cNvSpPr/>
+            <p:nvPr/>
+          </p:nvSpPr>
+          <p:spPr>
+            <a:xfrm>
+              <a:off x="8902926" y="1152248"/>
+              <a:ext cx="1831020" cy="4162113"/>
+            </a:xfrm>
+            <a:prstGeom prst="rect">
+              <a:avLst/>
+            </a:prstGeom>
+            <a:noFill/>
+            <a:ln w="28575">
+              <a:solidFill>
+                <a:srgbClr val="EEB500"/>
+              </a:solidFill>
+            </a:ln>
+          </p:spPr>
+          <p:style>
+            <a:lnRef idx="2">
+              <a:schemeClr val="accent1">
+                <a:shade val="15000"/>
+              </a:schemeClr>
+            </a:lnRef>
+            <a:fillRef idx="1">
+              <a:schemeClr val="accent1"/>
+            </a:fillRef>
+            <a:effectRef idx="0">
+              <a:schemeClr val="accent1"/>
+            </a:effectRef>
+            <a:fontRef idx="minor">
+              <a:schemeClr val="lt1"/>
+            </a:fontRef>
+          </p:style>
+          <p:txBody>
+            <a:bodyPr rtlCol="0" anchor="ctr"/>
+            <a:lstStyle/>
+            <a:p>
+              <a:r>
+                <a:rPr lang="vi-VN" dirty="0"/>
+                <a:t> (Hosted on Lightning.AI)  </a:t>
+              </a:r>
+            </a:p>
+          </p:txBody>
+        </p:sp>
+        <p:sp>
+          <p:nvSpPr>
+            <p:cNvPr id="64" name="TextBox 63">
+              <a:extLst>
+                <a:ext uri="{FF2B5EF4-FFF2-40B4-BE49-F238E27FC236}">
+                  <a16:creationId xmlns:a16="http://schemas.microsoft.com/office/drawing/2014/main" id="{D9F5CD14-DAB4-1535-6258-FB583D30ACD1}"/>
+                </a:ext>
+              </a:extLst>
+            </p:cNvPr>
+            <p:cNvSpPr txBox="1"/>
+            <p:nvPr/>
+          </p:nvSpPr>
+          <p:spPr>
+            <a:xfrm>
+              <a:off x="9097627" y="1227124"/>
+              <a:ext cx="1476375" cy="292388"/>
+            </a:xfrm>
+            <a:prstGeom prst="rect">
+              <a:avLst/>
+            </a:prstGeom>
+            <a:noFill/>
+          </p:spPr>
+          <p:txBody>
+            <a:bodyPr wrap="square" rtlCol="0">
+              <a:spAutoFit/>
+            </a:bodyPr>
+            <a:lstStyle/>
+            <a:p>
+              <a:r>
+                <a:rPr lang="en-US" sz="1300" b="1" dirty="0">
+                  <a:solidFill>
+                    <a:srgbClr val="F39D03"/>
+                  </a:solidFill>
+                </a:rPr>
+                <a:t>Remote AI server</a:t>
+              </a:r>
+            </a:p>
+          </p:txBody>
+        </p:sp>
+        <p:sp>
+          <p:nvSpPr>
+            <p:cNvPr id="109" name="TextBox 108">
+              <a:extLst>
+                <a:ext uri="{FF2B5EF4-FFF2-40B4-BE49-F238E27FC236}">
+                  <a16:creationId xmlns:a16="http://schemas.microsoft.com/office/drawing/2014/main" id="{8F3E6C48-62AD-1AEA-42A3-19AE218AA378}"/>
+                </a:ext>
+              </a:extLst>
+            </p:cNvPr>
+            <p:cNvSpPr txBox="1"/>
+            <p:nvPr/>
+          </p:nvSpPr>
+          <p:spPr>
+            <a:xfrm>
+              <a:off x="9040322" y="4979783"/>
+              <a:ext cx="1575723" cy="253916"/>
+            </a:xfrm>
+            <a:prstGeom prst="rect">
+              <a:avLst/>
+            </a:prstGeom>
+            <a:noFill/>
+          </p:spPr>
+          <p:txBody>
+            <a:bodyPr wrap="square" rtlCol="0">
+              <a:spAutoFit/>
+            </a:bodyPr>
+            <a:lstStyle/>
+            <a:p>
+              <a:r>
+                <a:rPr lang="vi-VN" sz="1050" dirty="0">
+                  <a:latin typeface="Aptos (Body)"/>
+                </a:rPr>
+                <a:t>(Hosted on Lightning.ai)  </a:t>
+              </a:r>
+            </a:p>
+          </p:txBody>
+        </p:sp>
         <p:grpSp>
           <p:nvGrpSpPr>
-            <p:cNvPr id="15" name="Group 14">
+            <p:cNvPr id="35" name="Group 34">
               <a:extLst>
                 <a:ext uri="{FF2B5EF4-FFF2-40B4-BE49-F238E27FC236}">
-                  <a16:creationId xmlns:a16="http://schemas.microsoft.com/office/drawing/2014/main" id="{1396C777-6070-F9CE-49F9-22B110918BB9}"/>
+                  <a16:creationId xmlns:a16="http://schemas.microsoft.com/office/drawing/2014/main" id="{7F645CC0-B7A1-F0EC-C907-5CC3D4337717}"/>
                 </a:ext>
               </a:extLst>
             </p:cNvPr>
@@ -4740,18 +4913,18 @@
           </p:nvGrpSpPr>
           <p:grpSpPr>
             <a:xfrm>
-              <a:off x="7158261" y="698179"/>
-              <a:ext cx="3770067" cy="4162113"/>
-              <a:chOff x="7115957" y="814698"/>
-              <a:chExt cx="3770067" cy="4162113"/>
+              <a:off x="9215282" y="1692565"/>
+              <a:ext cx="1209200" cy="2950967"/>
+              <a:chOff x="9180992" y="1692565"/>
+              <a:chExt cx="1209200" cy="2950967"/>
             </a:xfrm>
           </p:grpSpPr>
           <p:grpSp>
             <p:nvGrpSpPr>
-              <p:cNvPr id="12" name="Group 11">
+              <p:cNvPr id="75" name="Group 74">
                 <a:extLst>
                   <a:ext uri="{FF2B5EF4-FFF2-40B4-BE49-F238E27FC236}">
-                    <a16:creationId xmlns:a16="http://schemas.microsoft.com/office/drawing/2014/main" id="{3C273511-3FE0-D02D-44F8-0241A12E0AB9}"/>
+                    <a16:creationId xmlns:a16="http://schemas.microsoft.com/office/drawing/2014/main" id="{C5ABA5A5-D03D-83E9-6E80-35D80E96D7EB}"/>
                   </a:ext>
                 </a:extLst>
               </p:cNvPr>
@@ -4760,72 +4933,18 @@
             </p:nvGrpSpPr>
             <p:grpSpPr>
               <a:xfrm>
-                <a:off x="9055004" y="814698"/>
-                <a:ext cx="1831020" cy="4162113"/>
-                <a:chOff x="6934794" y="530524"/>
-                <a:chExt cx="1831020" cy="4162113"/>
+                <a:off x="9180992" y="1736951"/>
+                <a:ext cx="1209200" cy="1180571"/>
+                <a:chOff x="7968679" y="4795440"/>
+                <a:chExt cx="1209200" cy="1180571"/>
               </a:xfrm>
             </p:grpSpPr>
             <p:sp>
               <p:nvSpPr>
-                <p:cNvPr id="63" name="Rectangle 62">
+                <p:cNvPr id="69" name="TextBox 68">
                   <a:extLst>
                     <a:ext uri="{FF2B5EF4-FFF2-40B4-BE49-F238E27FC236}">
-                      <a16:creationId xmlns:a16="http://schemas.microsoft.com/office/drawing/2014/main" id="{2B4EE253-D283-74B1-5F62-054CCEC6235E}"/>
-                    </a:ext>
-                  </a:extLst>
-                </p:cNvPr>
-                <p:cNvSpPr/>
-                <p:nvPr/>
-              </p:nvSpPr>
-              <p:spPr>
-                <a:xfrm>
-                  <a:off x="6934794" y="530524"/>
-                  <a:ext cx="1831020" cy="4162113"/>
-                </a:xfrm>
-                <a:prstGeom prst="rect">
-                  <a:avLst/>
-                </a:prstGeom>
-                <a:noFill/>
-                <a:ln w="28575">
-                  <a:solidFill>
-                    <a:srgbClr val="EEB500"/>
-                  </a:solidFill>
-                </a:ln>
-              </p:spPr>
-              <p:style>
-                <a:lnRef idx="2">
-                  <a:schemeClr val="accent1">
-                    <a:shade val="15000"/>
-                  </a:schemeClr>
-                </a:lnRef>
-                <a:fillRef idx="1">
-                  <a:schemeClr val="accent1"/>
-                </a:fillRef>
-                <a:effectRef idx="0">
-                  <a:schemeClr val="accent1"/>
-                </a:effectRef>
-                <a:fontRef idx="minor">
-                  <a:schemeClr val="lt1"/>
-                </a:fontRef>
-              </p:style>
-              <p:txBody>
-                <a:bodyPr rtlCol="0" anchor="ctr"/>
-                <a:lstStyle/>
-                <a:p>
-                  <a:r>
-                    <a:rPr lang="vi-VN" dirty="0"/>
-                    <a:t> (Hosted on Lightning.AI)  </a:t>
-                  </a:r>
-                </a:p>
-              </p:txBody>
-            </p:sp>
-            <p:sp>
-              <p:nvSpPr>
-                <p:cNvPr id="64" name="TextBox 63">
-                  <a:extLst>
-                    <a:ext uri="{FF2B5EF4-FFF2-40B4-BE49-F238E27FC236}">
-                      <a16:creationId xmlns:a16="http://schemas.microsoft.com/office/drawing/2014/main" id="{D9F5CD14-DAB4-1535-6258-FB583D30ACD1}"/>
+                      <a16:creationId xmlns:a16="http://schemas.microsoft.com/office/drawing/2014/main" id="{79ADC2F2-9585-1557-969B-50EF45B4BF44}"/>
                     </a:ext>
                   </a:extLst>
                 </p:cNvPr>
@@ -4834,8 +4953,8 @@
               </p:nvSpPr>
               <p:spPr>
                 <a:xfrm>
-                  <a:off x="7083775" y="605400"/>
-                  <a:ext cx="1476375" cy="292388"/>
+                  <a:off x="7968679" y="5560513"/>
+                  <a:ext cx="1209200" cy="415498"/>
                 </a:xfrm>
                 <a:prstGeom prst="rect">
                   <a:avLst/>
@@ -4848,336 +4967,130 @@
                 </a:bodyPr>
                 <a:lstStyle/>
                 <a:p>
+                  <a:pPr algn="ctr"/>
                   <a:r>
-                    <a:rPr lang="en-US" sz="1300" b="1" dirty="0">
-                      <a:solidFill>
-                        <a:srgbClr val="F39D03"/>
-                      </a:solidFill>
+                    <a:rPr lang="vi-VN" sz="1050" dirty="0">
+                      <a:latin typeface="Aptos (Body)"/>
                     </a:rPr>
-                    <a:t>Remote AI server</a:t>
+                    <a:t>FastAPI/LitServe Endpoint</a:t>
                   </a:r>
+                  <a:endParaRPr lang="en-US" dirty="0"/>
                 </a:p>
               </p:txBody>
             </p:sp>
-            <p:grpSp>
-              <p:nvGrpSpPr>
-                <p:cNvPr id="78" name="Group 77">
+            <p:pic>
+              <p:nvPicPr>
+                <p:cNvPr id="74" name="Picture 73">
                   <a:extLst>
                     <a:ext uri="{FF2B5EF4-FFF2-40B4-BE49-F238E27FC236}">
-                      <a16:creationId xmlns:a16="http://schemas.microsoft.com/office/drawing/2014/main" id="{E0CBD325-5B84-414B-5B5F-E1955A17CAD2}"/>
+                      <a16:creationId xmlns:a16="http://schemas.microsoft.com/office/drawing/2014/main" id="{22A46D75-68CE-A4D3-5313-2871356FC8B4}"/>
                     </a:ext>
                   </a:extLst>
                 </p:cNvPr>
-                <p:cNvGrpSpPr/>
+                <p:cNvPicPr>
+                  <a:picLocks noChangeAspect="1"/>
+                </p:cNvPicPr>
                 <p:nvPr/>
-              </p:nvGrpSpPr>
-              <p:grpSpPr>
+              </p:nvPicPr>
+              <p:blipFill>
+                <a:blip r:embed="rId9"/>
+                <a:stretch>
+                  <a:fillRect/>
+                </a:stretch>
+              </p:blipFill>
+              <p:spPr>
                 <a:xfrm>
-                  <a:off x="7212860" y="1070841"/>
-                  <a:ext cx="1209200" cy="1237047"/>
-                  <a:chOff x="7968679" y="4751054"/>
-                  <a:chExt cx="1209200" cy="1237047"/>
+                  <a:off x="8183815" y="4795440"/>
+                  <a:ext cx="778928" cy="771715"/>
                 </a:xfrm>
-              </p:grpSpPr>
-              <p:grpSp>
-                <p:nvGrpSpPr>
-                  <p:cNvPr id="75" name="Group 74">
-                    <a:extLst>
-                      <a:ext uri="{FF2B5EF4-FFF2-40B4-BE49-F238E27FC236}">
-                        <a16:creationId xmlns:a16="http://schemas.microsoft.com/office/drawing/2014/main" id="{C5ABA5A5-D03D-83E9-6E80-35D80E96D7EB}"/>
-                      </a:ext>
-                    </a:extLst>
-                  </p:cNvPr>
-                  <p:cNvGrpSpPr/>
-                  <p:nvPr/>
-                </p:nvGrpSpPr>
-                <p:grpSpPr>
-                  <a:xfrm>
-                    <a:off x="7968679" y="4795440"/>
-                    <a:ext cx="1209200" cy="1180571"/>
-                    <a:chOff x="7968679" y="4795440"/>
-                    <a:chExt cx="1209200" cy="1180571"/>
-                  </a:xfrm>
-                </p:grpSpPr>
-                <p:sp>
-                  <p:nvSpPr>
-                    <p:cNvPr id="69" name="TextBox 68">
-                      <a:extLst>
-                        <a:ext uri="{FF2B5EF4-FFF2-40B4-BE49-F238E27FC236}">
-                          <a16:creationId xmlns:a16="http://schemas.microsoft.com/office/drawing/2014/main" id="{79ADC2F2-9585-1557-969B-50EF45B4BF44}"/>
-                        </a:ext>
-                      </a:extLst>
-                    </p:cNvPr>
-                    <p:cNvSpPr txBox="1"/>
-                    <p:nvPr/>
-                  </p:nvSpPr>
-                  <p:spPr>
-                    <a:xfrm>
-                      <a:off x="7968679" y="5560513"/>
-                      <a:ext cx="1209200" cy="415498"/>
-                    </a:xfrm>
-                    <a:prstGeom prst="rect">
-                      <a:avLst/>
-                    </a:prstGeom>
-                    <a:noFill/>
-                  </p:spPr>
-                  <p:txBody>
-                    <a:bodyPr wrap="square" rtlCol="0">
-                      <a:spAutoFit/>
-                    </a:bodyPr>
-                    <a:lstStyle/>
-                    <a:p>
-                      <a:pPr algn="ctr"/>
-                      <a:r>
-                        <a:rPr lang="vi-VN" sz="1050" dirty="0">
-                          <a:latin typeface="Aptos (Body)"/>
-                        </a:rPr>
-                        <a:t>FastAPI/LitServe Endpoint</a:t>
-                      </a:r>
-                      <a:endParaRPr lang="en-US" dirty="0"/>
-                    </a:p>
-                  </p:txBody>
-                </p:sp>
-                <p:pic>
-                  <p:nvPicPr>
-                    <p:cNvPr id="74" name="Picture 73">
-                      <a:extLst>
-                        <a:ext uri="{FF2B5EF4-FFF2-40B4-BE49-F238E27FC236}">
-                          <a16:creationId xmlns:a16="http://schemas.microsoft.com/office/drawing/2014/main" id="{22A46D75-68CE-A4D3-5313-2871356FC8B4}"/>
-                        </a:ext>
-                      </a:extLst>
-                    </p:cNvPr>
-                    <p:cNvPicPr>
-                      <a:picLocks noChangeAspect="1"/>
-                    </p:cNvPicPr>
-                    <p:nvPr/>
-                  </p:nvPicPr>
-                  <p:blipFill>
-                    <a:blip r:embed="rId9"/>
-                    <a:stretch>
-                      <a:fillRect/>
-                    </a:stretch>
-                  </p:blipFill>
-                  <p:spPr>
-                    <a:xfrm>
-                      <a:off x="8183815" y="4795440"/>
-                      <a:ext cx="778928" cy="771715"/>
-                    </a:xfrm>
-                    <a:prstGeom prst="rect">
-                      <a:avLst/>
-                    </a:prstGeom>
-                  </p:spPr>
-                </p:pic>
-              </p:grpSp>
-              <p:sp>
-                <p:nvSpPr>
-                  <p:cNvPr id="76" name="Rectangle 75">
-                    <a:extLst>
-                      <a:ext uri="{FF2B5EF4-FFF2-40B4-BE49-F238E27FC236}">
-                        <a16:creationId xmlns:a16="http://schemas.microsoft.com/office/drawing/2014/main" id="{D87D8592-AB4D-1636-AED3-E30C80E90EDB}"/>
-                      </a:ext>
-                    </a:extLst>
-                  </p:cNvPr>
-                  <p:cNvSpPr/>
-                  <p:nvPr/>
-                </p:nvSpPr>
-                <p:spPr>
-                  <a:xfrm>
-                    <a:off x="8007069" y="4751054"/>
-                    <a:ext cx="1132419" cy="1237047"/>
-                  </a:xfrm>
-                  <a:prstGeom prst="rect">
-                    <a:avLst/>
-                  </a:prstGeom>
-                  <a:noFill/>
-                  <a:ln>
-                    <a:solidFill>
-                      <a:schemeClr val="accent6">
-                        <a:lumMod val="60000"/>
-                        <a:lumOff val="40000"/>
-                      </a:schemeClr>
-                    </a:solidFill>
-                    <a:prstDash val="dash"/>
-                  </a:ln>
-                </p:spPr>
-                <p:style>
-                  <a:lnRef idx="2">
-                    <a:schemeClr val="accent1">
-                      <a:shade val="15000"/>
-                    </a:schemeClr>
-                  </a:lnRef>
-                  <a:fillRef idx="1">
-                    <a:schemeClr val="accent1"/>
-                  </a:fillRef>
-                  <a:effectRef idx="0">
-                    <a:schemeClr val="accent1"/>
-                  </a:effectRef>
-                  <a:fontRef idx="minor">
-                    <a:schemeClr val="lt1"/>
-                  </a:fontRef>
-                </p:style>
-                <p:txBody>
-                  <a:bodyPr rtlCol="0" anchor="ctr"/>
-                  <a:lstStyle/>
-                  <a:p>
-                    <a:pPr algn="ctr"/>
-                    <a:endParaRPr lang="vi-VN"/>
-                  </a:p>
-                </p:txBody>
-              </p:sp>
-            </p:grpSp>
-            <p:grpSp>
-              <p:nvGrpSpPr>
-                <p:cNvPr id="79" name="Group 78">
+                <a:prstGeom prst="rect">
+                  <a:avLst/>
+                </a:prstGeom>
+              </p:spPr>
+            </p:pic>
+          </p:grpSp>
+          <p:sp>
+            <p:nvSpPr>
+              <p:cNvPr id="76" name="Rectangle 75">
+                <a:extLst>
+                  <a:ext uri="{FF2B5EF4-FFF2-40B4-BE49-F238E27FC236}">
+                    <a16:creationId xmlns:a16="http://schemas.microsoft.com/office/drawing/2014/main" id="{D87D8592-AB4D-1636-AED3-E30C80E90EDB}"/>
+                  </a:ext>
+                </a:extLst>
+              </p:cNvPr>
+              <p:cNvSpPr/>
+              <p:nvPr/>
+            </p:nvSpPr>
+            <p:spPr>
+              <a:xfrm>
+                <a:off x="9219382" y="1692565"/>
+                <a:ext cx="1132419" cy="1237047"/>
+              </a:xfrm>
+              <a:prstGeom prst="rect">
+                <a:avLst/>
+              </a:prstGeom>
+              <a:noFill/>
+              <a:ln>
+                <a:solidFill>
+                  <a:schemeClr val="accent6">
+                    <a:lumMod val="60000"/>
+                    <a:lumOff val="40000"/>
+                  </a:schemeClr>
+                </a:solidFill>
+                <a:prstDash val="dash"/>
+              </a:ln>
+            </p:spPr>
+            <p:style>
+              <a:lnRef idx="2">
+                <a:schemeClr val="accent1">
+                  <a:shade val="15000"/>
+                </a:schemeClr>
+              </a:lnRef>
+              <a:fillRef idx="1">
+                <a:schemeClr val="accent1"/>
+              </a:fillRef>
+              <a:effectRef idx="0">
+                <a:schemeClr val="accent1"/>
+              </a:effectRef>
+              <a:fontRef idx="minor">
+                <a:schemeClr val="lt1"/>
+              </a:fontRef>
+            </p:style>
+            <p:txBody>
+              <a:bodyPr rtlCol="0" anchor="ctr"/>
+              <a:lstStyle/>
+              <a:p>
+                <a:pPr algn="ctr"/>
+                <a:endParaRPr lang="vi-VN"/>
+              </a:p>
+            </p:txBody>
+          </p:sp>
+          <p:grpSp>
+            <p:nvGrpSpPr>
+              <p:cNvPr id="79" name="Group 78">
+                <a:extLst>
+                  <a:ext uri="{FF2B5EF4-FFF2-40B4-BE49-F238E27FC236}">
+                    <a16:creationId xmlns:a16="http://schemas.microsoft.com/office/drawing/2014/main" id="{C02BCBC3-5F7F-FF58-93D2-1620C50E30A4}"/>
+                  </a:ext>
+                </a:extLst>
+              </p:cNvPr>
+              <p:cNvGrpSpPr/>
+              <p:nvPr/>
+            </p:nvGrpSpPr>
+            <p:grpSpPr>
+              <a:xfrm>
+                <a:off x="9288796" y="3308558"/>
+                <a:ext cx="968232" cy="1334974"/>
+                <a:chOff x="9057533" y="3228888"/>
+                <a:chExt cx="968232" cy="1334974"/>
+              </a:xfrm>
+            </p:grpSpPr>
+            <p:sp>
+              <p:nvSpPr>
+                <p:cNvPr id="70" name="TextBox 69">
                   <a:extLst>
                     <a:ext uri="{FF2B5EF4-FFF2-40B4-BE49-F238E27FC236}">
-                      <a16:creationId xmlns:a16="http://schemas.microsoft.com/office/drawing/2014/main" id="{C02BCBC3-5F7F-FF58-93D2-1620C50E30A4}"/>
-                    </a:ext>
-                  </a:extLst>
-                </p:cNvPr>
-                <p:cNvGrpSpPr/>
-                <p:nvPr/>
-              </p:nvGrpSpPr>
-              <p:grpSpPr>
-                <a:xfrm>
-                  <a:off x="7320664" y="2686834"/>
-                  <a:ext cx="968232" cy="1334974"/>
-                  <a:chOff x="9057533" y="3228888"/>
-                  <a:chExt cx="968232" cy="1334974"/>
-                </a:xfrm>
-              </p:grpSpPr>
-              <p:sp>
-                <p:nvSpPr>
-                  <p:cNvPr id="70" name="TextBox 69">
-                    <a:extLst>
-                      <a:ext uri="{FF2B5EF4-FFF2-40B4-BE49-F238E27FC236}">
-                        <a16:creationId xmlns:a16="http://schemas.microsoft.com/office/drawing/2014/main" id="{C67527D3-4D7B-0E85-01A8-C1B98E756F8A}"/>
-                      </a:ext>
-                    </a:extLst>
-                  </p:cNvPr>
-                  <p:cNvSpPr txBox="1"/>
-                  <p:nvPr/>
-                </p:nvSpPr>
-                <p:spPr>
-                  <a:xfrm>
-                    <a:off x="9101099" y="3986780"/>
-                    <a:ext cx="924666" cy="577081"/>
-                  </a:xfrm>
-                  <a:prstGeom prst="rect">
-                    <a:avLst/>
-                  </a:prstGeom>
-                  <a:noFill/>
-                </p:spPr>
-                <p:txBody>
-                  <a:bodyPr wrap="square" rtlCol="0">
-                    <a:spAutoFit/>
-                  </a:bodyPr>
-                  <a:lstStyle/>
-                  <a:p>
-                    <a:pPr algn="ctr"/>
-                    <a:r>
-                      <a:rPr lang="vi-VN" sz="1050" dirty="0">
-                        <a:latin typeface="Aptos (Body)"/>
-                      </a:rPr>
-                      <a:t>Pytorch Transformer Model</a:t>
-                    </a:r>
-                    <a:endParaRPr lang="en-US" dirty="0"/>
-                  </a:p>
-                </p:txBody>
-              </p:sp>
-              <p:pic>
-                <p:nvPicPr>
-                  <p:cNvPr id="72" name="Picture 71">
-                    <a:extLst>
-                      <a:ext uri="{FF2B5EF4-FFF2-40B4-BE49-F238E27FC236}">
-                        <a16:creationId xmlns:a16="http://schemas.microsoft.com/office/drawing/2014/main" id="{EDE0F3B2-ACE4-058B-F742-512A0F2C4F55}"/>
-                      </a:ext>
-                    </a:extLst>
-                  </p:cNvPr>
-                  <p:cNvPicPr>
-                    <a:picLocks noChangeAspect="1"/>
-                  </p:cNvPicPr>
-                  <p:nvPr/>
-                </p:nvPicPr>
-                <p:blipFill>
-                  <a:blip r:embed="rId10"/>
-                  <a:stretch>
-                    <a:fillRect/>
-                  </a:stretch>
-                </p:blipFill>
-                <p:spPr>
-                  <a:xfrm>
-                    <a:off x="9238597" y="3308314"/>
-                    <a:ext cx="657878" cy="662033"/>
-                  </a:xfrm>
-                  <a:prstGeom prst="rect">
-                    <a:avLst/>
-                  </a:prstGeom>
-                </p:spPr>
-              </p:pic>
-              <p:sp>
-                <p:nvSpPr>
-                  <p:cNvPr id="77" name="Rectangle 76">
-                    <a:extLst>
-                      <a:ext uri="{FF2B5EF4-FFF2-40B4-BE49-F238E27FC236}">
-                        <a16:creationId xmlns:a16="http://schemas.microsoft.com/office/drawing/2014/main" id="{74166EF7-29D6-C0B8-0002-28D66F3BCCF6}"/>
-                      </a:ext>
-                    </a:extLst>
-                  </p:cNvPr>
-                  <p:cNvSpPr/>
-                  <p:nvPr/>
-                </p:nvSpPr>
-                <p:spPr>
-                  <a:xfrm>
-                    <a:off x="9057533" y="3228888"/>
-                    <a:ext cx="968232" cy="1334974"/>
-                  </a:xfrm>
-                  <a:prstGeom prst="rect">
-                    <a:avLst/>
-                  </a:prstGeom>
-                  <a:noFill/>
-                  <a:ln>
-                    <a:solidFill>
-                      <a:schemeClr val="accent6">
-                        <a:lumMod val="60000"/>
-                        <a:lumOff val="40000"/>
-                      </a:schemeClr>
-                    </a:solidFill>
-                    <a:prstDash val="dash"/>
-                  </a:ln>
-                </p:spPr>
-                <p:style>
-                  <a:lnRef idx="2">
-                    <a:schemeClr val="accent1">
-                      <a:shade val="15000"/>
-                    </a:schemeClr>
-                  </a:lnRef>
-                  <a:fillRef idx="1">
-                    <a:schemeClr val="accent1"/>
-                  </a:fillRef>
-                  <a:effectRef idx="0">
-                    <a:schemeClr val="accent1"/>
-                  </a:effectRef>
-                  <a:fontRef idx="minor">
-                    <a:schemeClr val="lt1"/>
-                  </a:fontRef>
-                </p:style>
-                <p:txBody>
-                  <a:bodyPr rtlCol="0" anchor="ctr"/>
-                  <a:lstStyle/>
-                  <a:p>
-                    <a:pPr algn="ctr"/>
-                    <a:endParaRPr lang="vi-VN"/>
-                  </a:p>
-                </p:txBody>
-              </p:sp>
-            </p:grpSp>
-            <p:sp>
-              <p:nvSpPr>
-                <p:cNvPr id="109" name="TextBox 108">
-                  <a:extLst>
-                    <a:ext uri="{FF2B5EF4-FFF2-40B4-BE49-F238E27FC236}">
-                      <a16:creationId xmlns:a16="http://schemas.microsoft.com/office/drawing/2014/main" id="{8F3E6C48-62AD-1AEA-42A3-19AE218AA378}"/>
+                      <a16:creationId xmlns:a16="http://schemas.microsoft.com/office/drawing/2014/main" id="{C67527D3-4D7B-0E85-01A8-C1B98E756F8A}"/>
                     </a:ext>
                   </a:extLst>
                 </p:cNvPr>
@@ -5186,8 +5099,8 @@
               </p:nvSpPr>
               <p:spPr>
                 <a:xfrm>
-                  <a:off x="7072190" y="4358059"/>
-                  <a:ext cx="1575723" cy="253916"/>
+                  <a:off x="9101099" y="3986780"/>
+                  <a:ext cx="924666" cy="577081"/>
                 </a:xfrm>
                 <a:prstGeom prst="rect">
                   <a:avLst/>
@@ -5200,85 +5113,53 @@
                 </a:bodyPr>
                 <a:lstStyle/>
                 <a:p>
+                  <a:pPr algn="ctr"/>
                   <a:r>
                     <a:rPr lang="vi-VN" sz="1050" dirty="0">
                       <a:latin typeface="Aptos (Body)"/>
                     </a:rPr>
-                    <a:t>(Hosted on Lightning.ai)  </a:t>
+                    <a:t>Pytorch Transformer Model</a:t>
                   </a:r>
+                  <a:endParaRPr lang="en-US" dirty="0"/>
                 </a:p>
               </p:txBody>
             </p:sp>
-            <p:cxnSp>
-              <p:nvCxnSpPr>
-                <p:cNvPr id="119" name="Straight Connector 118">
+            <p:pic>
+              <p:nvPicPr>
+                <p:cNvPr id="72" name="Picture 71">
                   <a:extLst>
                     <a:ext uri="{FF2B5EF4-FFF2-40B4-BE49-F238E27FC236}">
-                      <a16:creationId xmlns:a16="http://schemas.microsoft.com/office/drawing/2014/main" id="{FA8A0752-25D2-EC29-FA65-F4857D4BE768}"/>
+                      <a16:creationId xmlns:a16="http://schemas.microsoft.com/office/drawing/2014/main" id="{EDE0F3B2-ACE4-058B-F742-512A0F2C4F55}"/>
                     </a:ext>
                   </a:extLst>
                 </p:cNvPr>
-                <p:cNvCxnSpPr>
-                  <a:cxnSpLocks/>
-                </p:cNvCxnSpPr>
+                <p:cNvPicPr>
+                  <a:picLocks noChangeAspect="1"/>
+                </p:cNvPicPr>
                 <p:nvPr/>
-              </p:nvCxnSpPr>
+              </p:nvPicPr>
+              <p:blipFill>
+                <a:blip r:embed="rId10"/>
+                <a:stretch>
+                  <a:fillRect/>
+                </a:stretch>
+              </p:blipFill>
               <p:spPr>
-                <a:xfrm flipH="1">
-                  <a:off x="7817459" y="2336463"/>
-                  <a:ext cx="1" cy="338164"/>
+                <a:xfrm>
+                  <a:off x="9238597" y="3308314"/>
+                  <a:ext cx="657878" cy="662033"/>
                 </a:xfrm>
-                <a:prstGeom prst="line">
+                <a:prstGeom prst="rect">
                   <a:avLst/>
                 </a:prstGeom>
-                <a:ln w="38100">
-                  <a:solidFill>
-                    <a:srgbClr val="FF0000"/>
-                  </a:solidFill>
-                </a:ln>
               </p:spPr>
-              <p:style>
-                <a:lnRef idx="2">
-                  <a:schemeClr val="accent1"/>
-                </a:lnRef>
-                <a:fillRef idx="0">
-                  <a:schemeClr val="accent1"/>
-                </a:fillRef>
-                <a:effectRef idx="1">
-                  <a:schemeClr val="accent1"/>
-                </a:effectRef>
-                <a:fontRef idx="minor">
-                  <a:schemeClr val="tx1"/>
-                </a:fontRef>
-              </p:style>
-            </p:cxnSp>
-          </p:grpSp>
-          <p:grpSp>
-            <p:nvGrpSpPr>
-              <p:cNvPr id="11" name="Group 10">
-                <a:extLst>
-                  <a:ext uri="{FF2B5EF4-FFF2-40B4-BE49-F238E27FC236}">
-                    <a16:creationId xmlns:a16="http://schemas.microsoft.com/office/drawing/2014/main" id="{2C85AA91-FF88-0C31-8A1E-195FE62CD469}"/>
-                  </a:ext>
-                </a:extLst>
-              </p:cNvPr>
-              <p:cNvGrpSpPr/>
-              <p:nvPr/>
-            </p:nvGrpSpPr>
-            <p:grpSpPr>
-              <a:xfrm>
-                <a:off x="7115957" y="2259036"/>
-                <a:ext cx="1700538" cy="1273436"/>
-                <a:chOff x="9399827" y="2789568"/>
-                <a:chExt cx="1700538" cy="1273436"/>
-              </a:xfrm>
-            </p:grpSpPr>
+            </p:pic>
             <p:sp>
               <p:nvSpPr>
-                <p:cNvPr id="2" name="Rectangle 1">
+                <p:cNvPr id="77" name="Rectangle 76">
                   <a:extLst>
                     <a:ext uri="{FF2B5EF4-FFF2-40B4-BE49-F238E27FC236}">
-                      <a16:creationId xmlns:a16="http://schemas.microsoft.com/office/drawing/2014/main" id="{4F7C8471-4714-1960-47CE-0660B0D33F0B}"/>
+                      <a16:creationId xmlns:a16="http://schemas.microsoft.com/office/drawing/2014/main" id="{74166EF7-29D6-C0B8-0002-28D66F3BCCF6}"/>
                     </a:ext>
                   </a:extLst>
                 </p:cNvPr>
@@ -5287,17 +5168,21 @@
               </p:nvSpPr>
               <p:spPr>
                 <a:xfrm>
-                  <a:off x="9399827" y="2789568"/>
-                  <a:ext cx="1700538" cy="1273436"/>
+                  <a:off x="9057533" y="3228888"/>
+                  <a:ext cx="968232" cy="1334974"/>
                 </a:xfrm>
                 <a:prstGeom prst="rect">
                   <a:avLst/>
                 </a:prstGeom>
                 <a:noFill/>
-                <a:ln w="28575">
+                <a:ln>
                   <a:solidFill>
-                    <a:srgbClr val="EEB500"/>
+                    <a:schemeClr val="accent6">
+                      <a:lumMod val="60000"/>
+                      <a:lumOff val="40000"/>
+                    </a:schemeClr>
                   </a:solidFill>
+                  <a:prstDash val="dash"/>
                 </a:ln>
               </p:spPr>
               <p:style>
@@ -5325,147 +5210,57 @@
                 </a:p>
               </p:txBody>
             </p:sp>
-            <p:grpSp>
-              <p:nvGrpSpPr>
-                <p:cNvPr id="9" name="Group 8">
-                  <a:extLst>
-                    <a:ext uri="{FF2B5EF4-FFF2-40B4-BE49-F238E27FC236}">
-                      <a16:creationId xmlns:a16="http://schemas.microsoft.com/office/drawing/2014/main" id="{1804EACE-58A9-CE3D-B6BB-AEB40F694CFD}"/>
-                    </a:ext>
-                  </a:extLst>
-                </p:cNvPr>
-                <p:cNvGrpSpPr/>
-                <p:nvPr/>
-              </p:nvGrpSpPr>
-              <p:grpSpPr>
-                <a:xfrm>
-                  <a:off x="9739908" y="3097276"/>
-                  <a:ext cx="1020374" cy="965727"/>
-                  <a:chOff x="9778867" y="1386603"/>
-                  <a:chExt cx="1020374" cy="965727"/>
-                </a:xfrm>
-              </p:grpSpPr>
-              <p:sp>
-                <p:nvSpPr>
-                  <p:cNvPr id="6" name="TextBox 5">
-                    <a:extLst>
-                      <a:ext uri="{FF2B5EF4-FFF2-40B4-BE49-F238E27FC236}">
-                        <a16:creationId xmlns:a16="http://schemas.microsoft.com/office/drawing/2014/main" id="{84F84F74-0D87-0E43-39E5-D48D95B8A7FA}"/>
-                      </a:ext>
-                    </a:extLst>
-                  </p:cNvPr>
-                  <p:cNvSpPr txBox="1"/>
-                  <p:nvPr/>
-                </p:nvSpPr>
-                <p:spPr>
-                  <a:xfrm>
-                    <a:off x="9778867" y="2098414"/>
-                    <a:ext cx="1020374" cy="253916"/>
-                  </a:xfrm>
-                  <a:prstGeom prst="rect">
-                    <a:avLst/>
-                  </a:prstGeom>
-                  <a:noFill/>
-                </p:spPr>
-                <p:txBody>
-                  <a:bodyPr wrap="square" rtlCol="0">
-                    <a:spAutoFit/>
-                  </a:bodyPr>
-                  <a:lstStyle/>
-                  <a:p>
-                    <a:r>
-                      <a:rPr lang="vi-VN" sz="1050" dirty="0" err="1">
-                        <a:latin typeface="Aptos (Body)"/>
-                      </a:rPr>
-                      <a:t>iNaturalist</a:t>
-                    </a:r>
-                    <a:r>
-                      <a:rPr lang="vi-VN" sz="1050" dirty="0">
-                        <a:latin typeface="Aptos (Body)"/>
-                      </a:rPr>
-                      <a:t> API</a:t>
-                    </a:r>
-                  </a:p>
-                </p:txBody>
-              </p:sp>
-              <p:pic>
-                <p:nvPicPr>
-                  <p:cNvPr id="10" name="Picture 9">
-                    <a:extLst>
-                      <a:ext uri="{FF2B5EF4-FFF2-40B4-BE49-F238E27FC236}">
-                        <a16:creationId xmlns:a16="http://schemas.microsoft.com/office/drawing/2014/main" id="{FF206516-E10E-EE8B-EC16-7E42D5030752}"/>
-                      </a:ext>
-                    </a:extLst>
-                  </p:cNvPr>
-                  <p:cNvPicPr>
-                    <a:picLocks noChangeAspect="1"/>
-                  </p:cNvPicPr>
-                  <p:nvPr/>
-                </p:nvPicPr>
-                <p:blipFill>
-                  <a:blip r:embed="rId11"/>
-                  <a:stretch>
-                    <a:fillRect/>
-                  </a:stretch>
-                </p:blipFill>
-                <p:spPr>
-                  <a:xfrm>
-                    <a:off x="9947961" y="1386603"/>
-                    <a:ext cx="682186" cy="676175"/>
-                  </a:xfrm>
-                  <a:prstGeom prst="rect">
-                    <a:avLst/>
-                  </a:prstGeom>
-                </p:spPr>
-              </p:pic>
-            </p:grpSp>
-            <p:sp>
-              <p:nvSpPr>
-                <p:cNvPr id="4" name="TextBox 3">
-                  <a:extLst>
-                    <a:ext uri="{FF2B5EF4-FFF2-40B4-BE49-F238E27FC236}">
-                      <a16:creationId xmlns:a16="http://schemas.microsoft.com/office/drawing/2014/main" id="{67065C2F-8A68-756E-6E2E-B9DF80258C73}"/>
-                    </a:ext>
-                  </a:extLst>
-                </p:cNvPr>
-                <p:cNvSpPr txBox="1"/>
-                <p:nvPr/>
-              </p:nvSpPr>
-              <p:spPr>
-                <a:xfrm>
-                  <a:off x="9399827" y="2840181"/>
-                  <a:ext cx="1700537" cy="292388"/>
-                </a:xfrm>
-                <a:prstGeom prst="rect">
-                  <a:avLst/>
-                </a:prstGeom>
-                <a:noFill/>
-              </p:spPr>
-              <p:txBody>
-                <a:bodyPr wrap="square" rtlCol="0">
-                  <a:spAutoFit/>
-                </a:bodyPr>
-                <a:lstStyle/>
-                <a:p>
-                  <a:r>
-                    <a:rPr lang="en-US" sz="1300" b="1" dirty="0">
-                      <a:solidFill>
-                        <a:srgbClr val="F39D03"/>
-                      </a:solidFill>
-                    </a:rPr>
-                    <a:t>Third Party Services</a:t>
-                  </a:r>
-                </a:p>
-              </p:txBody>
-            </p:sp>
           </p:grpSp>
+          <p:cxnSp>
+            <p:nvCxnSpPr>
+              <p:cNvPr id="119" name="Straight Connector 118">
+                <a:extLst>
+                  <a:ext uri="{FF2B5EF4-FFF2-40B4-BE49-F238E27FC236}">
+                    <a16:creationId xmlns:a16="http://schemas.microsoft.com/office/drawing/2014/main" id="{FA8A0752-25D2-EC29-FA65-F4857D4BE768}"/>
+                  </a:ext>
+                </a:extLst>
+              </p:cNvPr>
+              <p:cNvCxnSpPr>
+                <a:cxnSpLocks/>
+              </p:cNvCxnSpPr>
+              <p:nvPr/>
+            </p:nvCxnSpPr>
+            <p:spPr>
+              <a:xfrm flipH="1">
+                <a:off x="9785591" y="2958187"/>
+                <a:ext cx="1" cy="338164"/>
+              </a:xfrm>
+              <a:prstGeom prst="line">
+                <a:avLst/>
+              </a:prstGeom>
+              <a:ln w="38100">
+                <a:solidFill>
+                  <a:srgbClr val="FF0000"/>
+                </a:solidFill>
+              </a:ln>
+            </p:spPr>
+            <p:style>
+              <a:lnRef idx="2">
+                <a:schemeClr val="accent1"/>
+              </a:lnRef>
+              <a:fillRef idx="0">
+                <a:schemeClr val="accent1"/>
+              </a:fillRef>
+              <a:effectRef idx="1">
+                <a:schemeClr val="accent1"/>
+              </a:effectRef>
+              <a:fontRef idx="minor">
+                <a:schemeClr val="tx1"/>
+              </a:fontRef>
+            </p:style>
+          </p:cxnSp>
         </p:grpSp>
         <p:sp>
           <p:nvSpPr>
-            <p:cNvPr id="13" name="Rectangle 12">
+            <p:cNvPr id="2" name="Rectangle 1">
               <a:extLst>
                 <a:ext uri="{FF2B5EF4-FFF2-40B4-BE49-F238E27FC236}">
-                  <a16:creationId xmlns:a16="http://schemas.microsoft.com/office/drawing/2014/main" id="{BC0C8E92-25D1-0D1F-E02B-41DD9B5948D6}"/>
+                  <a16:creationId xmlns:a16="http://schemas.microsoft.com/office/drawing/2014/main" id="{4F7C8471-4714-1960-47CE-0660B0D33F0B}"/>
                 </a:ext>
               </a:extLst>
             </p:cNvPr>
@@ -5474,8 +5269,8 @@
           </p:nvSpPr>
           <p:spPr>
             <a:xfrm>
-              <a:off x="6934793" y="284482"/>
-              <a:ext cx="4230069" cy="4724397"/>
+              <a:off x="6963785" y="2336016"/>
+              <a:ext cx="1700538" cy="2960826"/>
             </a:xfrm>
             <a:prstGeom prst="rect">
               <a:avLst/>
@@ -5512,50 +5307,367 @@
             </a:p>
           </p:txBody>
         </p:sp>
+        <p:sp>
+          <p:nvSpPr>
+            <p:cNvPr id="4" name="TextBox 3">
+              <a:extLst>
+                <a:ext uri="{FF2B5EF4-FFF2-40B4-BE49-F238E27FC236}">
+                  <a16:creationId xmlns:a16="http://schemas.microsoft.com/office/drawing/2014/main" id="{67065C2F-8A68-756E-6E2E-B9DF80258C73}"/>
+                </a:ext>
+              </a:extLst>
+            </p:cNvPr>
+            <p:cNvSpPr txBox="1"/>
+            <p:nvPr/>
+          </p:nvSpPr>
+          <p:spPr>
+            <a:xfrm>
+              <a:off x="6963785" y="2386630"/>
+              <a:ext cx="1700537" cy="292388"/>
+            </a:xfrm>
+            <a:prstGeom prst="rect">
+              <a:avLst/>
+            </a:prstGeom>
+            <a:noFill/>
+          </p:spPr>
+          <p:txBody>
+            <a:bodyPr wrap="square" rtlCol="0">
+              <a:spAutoFit/>
+            </a:bodyPr>
+            <a:lstStyle/>
+            <a:p>
+              <a:r>
+                <a:rPr lang="en-US" sz="1300" b="1" dirty="0">
+                  <a:solidFill>
+                    <a:srgbClr val="F39D03"/>
+                  </a:solidFill>
+                </a:rPr>
+                <a:t>Third Party Services</a:t>
+              </a:r>
+            </a:p>
+          </p:txBody>
+        </p:sp>
+        <p:sp>
+          <p:nvSpPr>
+            <p:cNvPr id="13" name="Rectangle 12">
+              <a:extLst>
+                <a:ext uri="{FF2B5EF4-FFF2-40B4-BE49-F238E27FC236}">
+                  <a16:creationId xmlns:a16="http://schemas.microsoft.com/office/drawing/2014/main" id="{BC0C8E92-25D1-0D1F-E02B-41DD9B5948D6}"/>
+                </a:ext>
+              </a:extLst>
+            </p:cNvPr>
+            <p:cNvSpPr/>
+            <p:nvPr/>
+          </p:nvSpPr>
+          <p:spPr>
+            <a:xfrm>
+              <a:off x="6740317" y="522310"/>
+              <a:ext cx="4230069" cy="5009809"/>
+            </a:xfrm>
+            <a:prstGeom prst="rect">
+              <a:avLst/>
+            </a:prstGeom>
+            <a:noFill/>
+            <a:ln w="28575">
+              <a:solidFill>
+                <a:srgbClr val="EEB500"/>
+              </a:solidFill>
+            </a:ln>
+          </p:spPr>
+          <p:style>
+            <a:lnRef idx="2">
+              <a:schemeClr val="accent1">
+                <a:shade val="15000"/>
+              </a:schemeClr>
+            </a:lnRef>
+            <a:fillRef idx="1">
+              <a:schemeClr val="accent1"/>
+            </a:fillRef>
+            <a:effectRef idx="0">
+              <a:schemeClr val="accent1"/>
+            </a:effectRef>
+            <a:fontRef idx="minor">
+              <a:schemeClr val="lt1"/>
+            </a:fontRef>
+          </p:style>
+          <p:txBody>
+            <a:bodyPr rtlCol="0" anchor="ctr"/>
+            <a:lstStyle/>
+            <a:p>
+              <a:pPr algn="ctr"/>
+              <a:endParaRPr lang="vi-VN"/>
+            </a:p>
+          </p:txBody>
+        </p:sp>
+        <p:pic>
+          <p:nvPicPr>
+            <p:cNvPr id="23" name="Picture 22">
+              <a:extLst>
+                <a:ext uri="{FF2B5EF4-FFF2-40B4-BE49-F238E27FC236}">
+                  <a16:creationId xmlns:a16="http://schemas.microsoft.com/office/drawing/2014/main" id="{E4496D59-F1DF-C4A3-3595-015C26EF7CF7}"/>
+                </a:ext>
+              </a:extLst>
+            </p:cNvPr>
+            <p:cNvPicPr>
+              <a:picLocks noChangeAspect="1"/>
+            </p:cNvPicPr>
+            <p:nvPr/>
+          </p:nvPicPr>
+          <p:blipFill>
+            <a:blip r:embed="rId11"/>
+            <a:stretch>
+              <a:fillRect/>
+            </a:stretch>
+          </p:blipFill>
+          <p:spPr>
+            <a:xfrm>
+              <a:off x="7465671" y="4186876"/>
+              <a:ext cx="718206" cy="650592"/>
+            </a:xfrm>
+            <a:prstGeom prst="rect">
+              <a:avLst/>
+            </a:prstGeom>
+          </p:spPr>
+        </p:pic>
+        <p:grpSp>
+          <p:nvGrpSpPr>
+            <p:cNvPr id="9" name="Group 8">
+              <a:extLst>
+                <a:ext uri="{FF2B5EF4-FFF2-40B4-BE49-F238E27FC236}">
+                  <a16:creationId xmlns:a16="http://schemas.microsoft.com/office/drawing/2014/main" id="{1804EACE-58A9-CE3D-B6BB-AEB40F694CFD}"/>
+                </a:ext>
+              </a:extLst>
+            </p:cNvPr>
+            <p:cNvGrpSpPr/>
+            <p:nvPr/>
+          </p:nvGrpSpPr>
+          <p:grpSpPr>
+            <a:xfrm>
+              <a:off x="7313400" y="2895218"/>
+              <a:ext cx="1020374" cy="965727"/>
+              <a:chOff x="9778867" y="1386603"/>
+              <a:chExt cx="1020374" cy="965727"/>
+            </a:xfrm>
+          </p:grpSpPr>
+          <p:sp>
+            <p:nvSpPr>
+              <p:cNvPr id="6" name="TextBox 5">
+                <a:extLst>
+                  <a:ext uri="{FF2B5EF4-FFF2-40B4-BE49-F238E27FC236}">
+                    <a16:creationId xmlns:a16="http://schemas.microsoft.com/office/drawing/2014/main" id="{84F84F74-0D87-0E43-39E5-D48D95B8A7FA}"/>
+                  </a:ext>
+                </a:extLst>
+              </p:cNvPr>
+              <p:cNvSpPr txBox="1"/>
+              <p:nvPr/>
+            </p:nvSpPr>
+            <p:spPr>
+              <a:xfrm>
+                <a:off x="9778867" y="2098414"/>
+                <a:ext cx="1020374" cy="253916"/>
+              </a:xfrm>
+              <a:prstGeom prst="rect">
+                <a:avLst/>
+              </a:prstGeom>
+              <a:noFill/>
+            </p:spPr>
+            <p:txBody>
+              <a:bodyPr wrap="square" rtlCol="0">
+                <a:spAutoFit/>
+              </a:bodyPr>
+              <a:lstStyle/>
+              <a:p>
+                <a:r>
+                  <a:rPr lang="vi-VN" sz="1050" dirty="0">
+                    <a:latin typeface="Aptos (Body)"/>
+                  </a:rPr>
+                  <a:t>iNaturalist API</a:t>
+                </a:r>
+              </a:p>
+            </p:txBody>
+          </p:sp>
+          <p:pic>
+            <p:nvPicPr>
+              <p:cNvPr id="10" name="Picture 9">
+                <a:extLst>
+                  <a:ext uri="{FF2B5EF4-FFF2-40B4-BE49-F238E27FC236}">
+                    <a16:creationId xmlns:a16="http://schemas.microsoft.com/office/drawing/2014/main" id="{FF206516-E10E-EE8B-EC16-7E42D5030752}"/>
+                  </a:ext>
+                </a:extLst>
+              </p:cNvPr>
+              <p:cNvPicPr>
+                <a:picLocks noChangeAspect="1"/>
+              </p:cNvPicPr>
+              <p:nvPr/>
+            </p:nvPicPr>
+            <p:blipFill>
+              <a:blip r:embed="rId12"/>
+              <a:stretch>
+                <a:fillRect/>
+              </a:stretch>
+            </p:blipFill>
+            <p:spPr>
+              <a:xfrm>
+                <a:off x="9947961" y="1386603"/>
+                <a:ext cx="682186" cy="676175"/>
+              </a:xfrm>
+              <a:prstGeom prst="rect">
+                <a:avLst/>
+              </a:prstGeom>
+            </p:spPr>
+          </p:pic>
+        </p:grpSp>
+        <p:sp>
+          <p:nvSpPr>
+            <p:cNvPr id="28" name="Rectangle 27">
+              <a:extLst>
+                <a:ext uri="{FF2B5EF4-FFF2-40B4-BE49-F238E27FC236}">
+                  <a16:creationId xmlns:a16="http://schemas.microsoft.com/office/drawing/2014/main" id="{F9A50343-7EE0-1C49-CDF5-C78FA42AEFF8}"/>
+                </a:ext>
+              </a:extLst>
+            </p:cNvPr>
+            <p:cNvSpPr/>
+            <p:nvPr/>
+          </p:nvSpPr>
+          <p:spPr>
+            <a:xfrm>
+              <a:off x="7311619" y="2833082"/>
+              <a:ext cx="1022156" cy="1027863"/>
+            </a:xfrm>
+            <a:prstGeom prst="rect">
+              <a:avLst/>
+            </a:prstGeom>
+            <a:noFill/>
+            <a:ln>
+              <a:solidFill>
+                <a:schemeClr val="accent6">
+                  <a:lumMod val="60000"/>
+                  <a:lumOff val="40000"/>
+                </a:schemeClr>
+              </a:solidFill>
+              <a:prstDash val="dash"/>
+            </a:ln>
+          </p:spPr>
+          <p:style>
+            <a:lnRef idx="2">
+              <a:schemeClr val="accent1">
+                <a:shade val="15000"/>
+              </a:schemeClr>
+            </a:lnRef>
+            <a:fillRef idx="1">
+              <a:schemeClr val="accent1"/>
+            </a:fillRef>
+            <a:effectRef idx="0">
+              <a:schemeClr val="accent1"/>
+            </a:effectRef>
+            <a:fontRef idx="minor">
+              <a:schemeClr val="lt1"/>
+            </a:fontRef>
+          </p:style>
+          <p:txBody>
+            <a:bodyPr rtlCol="0" anchor="ctr"/>
+            <a:lstStyle/>
+            <a:p>
+              <a:pPr algn="ctr"/>
+              <a:endParaRPr lang="vi-VN"/>
+            </a:p>
+          </p:txBody>
+        </p:sp>
+        <p:sp>
+          <p:nvSpPr>
+            <p:cNvPr id="29" name="Rectangle 28">
+              <a:extLst>
+                <a:ext uri="{FF2B5EF4-FFF2-40B4-BE49-F238E27FC236}">
+                  <a16:creationId xmlns:a16="http://schemas.microsoft.com/office/drawing/2014/main" id="{6B594740-0342-759F-AAEF-308C57F9210F}"/>
+                </a:ext>
+              </a:extLst>
+            </p:cNvPr>
+            <p:cNvSpPr/>
+            <p:nvPr/>
+          </p:nvSpPr>
+          <p:spPr>
+            <a:xfrm>
+              <a:off x="7311618" y="4112826"/>
+              <a:ext cx="1022156" cy="1027863"/>
+            </a:xfrm>
+            <a:prstGeom prst="rect">
+              <a:avLst/>
+            </a:prstGeom>
+            <a:noFill/>
+            <a:ln>
+              <a:solidFill>
+                <a:schemeClr val="accent6">
+                  <a:lumMod val="60000"/>
+                  <a:lumOff val="40000"/>
+                </a:schemeClr>
+              </a:solidFill>
+              <a:prstDash val="dash"/>
+            </a:ln>
+          </p:spPr>
+          <p:style>
+            <a:lnRef idx="2">
+              <a:schemeClr val="accent1">
+                <a:shade val="15000"/>
+              </a:schemeClr>
+            </a:lnRef>
+            <a:fillRef idx="1">
+              <a:schemeClr val="accent1"/>
+            </a:fillRef>
+            <a:effectRef idx="0">
+              <a:schemeClr val="accent1"/>
+            </a:effectRef>
+            <a:fontRef idx="minor">
+              <a:schemeClr val="lt1"/>
+            </a:fontRef>
+          </p:style>
+          <p:txBody>
+            <a:bodyPr rtlCol="0" anchor="ctr"/>
+            <a:lstStyle/>
+            <a:p>
+              <a:pPr algn="ctr"/>
+              <a:endParaRPr lang="vi-VN"/>
+            </a:p>
+          </p:txBody>
+        </p:sp>
+        <p:sp>
+          <p:nvSpPr>
+            <p:cNvPr id="31" name="TextBox 30">
+              <a:extLst>
+                <a:ext uri="{FF2B5EF4-FFF2-40B4-BE49-F238E27FC236}">
+                  <a16:creationId xmlns:a16="http://schemas.microsoft.com/office/drawing/2014/main" id="{137250A4-DE6C-F420-1825-79605609002B}"/>
+                </a:ext>
+              </a:extLst>
+            </p:cNvPr>
+            <p:cNvSpPr txBox="1"/>
+            <p:nvPr/>
+          </p:nvSpPr>
+          <p:spPr>
+            <a:xfrm>
+              <a:off x="7311618" y="4851185"/>
+              <a:ext cx="1020374" cy="253916"/>
+            </a:xfrm>
+            <a:prstGeom prst="rect">
+              <a:avLst/>
+            </a:prstGeom>
+            <a:noFill/>
+          </p:spPr>
+          <p:txBody>
+            <a:bodyPr wrap="square" rtlCol="0">
+              <a:spAutoFit/>
+            </a:bodyPr>
+            <a:lstStyle/>
+            <a:p>
+              <a:pPr algn="ctr"/>
+              <a:r>
+                <a:rPr lang="en-US" sz="1050" dirty="0"/>
+                <a:t>OSM Data</a:t>
+              </a:r>
+              <a:endParaRPr lang="en-US" sz="1050" dirty="0">
+                <a:effectLst/>
+              </a:endParaRPr>
+            </a:p>
+          </p:txBody>
+        </p:sp>
       </p:grpSp>
-      <p:cxnSp>
-        <p:nvCxnSpPr>
-          <p:cNvPr id="19" name="Straight Connector 18">
-            <a:extLst>
-              <a:ext uri="{FF2B5EF4-FFF2-40B4-BE49-F238E27FC236}">
-                <a16:creationId xmlns:a16="http://schemas.microsoft.com/office/drawing/2014/main" id="{55643A4D-F7E8-BD18-4D4A-5695C599F084}"/>
-              </a:ext>
-            </a:extLst>
-          </p:cNvPr>
-          <p:cNvCxnSpPr>
-            <a:cxnSpLocks/>
-          </p:cNvCxnSpPr>
-          <p:nvPr/>
-        </p:nvCxnSpPr>
-        <p:spPr>
-          <a:xfrm>
-            <a:off x="5686673" y="1921941"/>
-            <a:ext cx="3216159" cy="0"/>
-          </a:xfrm>
-          <a:prstGeom prst="line">
-            <a:avLst/>
-          </a:prstGeom>
-          <a:ln w="38100">
-            <a:solidFill>
-              <a:srgbClr val="FF0000"/>
-            </a:solidFill>
-          </a:ln>
-        </p:spPr>
-        <p:style>
-          <a:lnRef idx="2">
-            <a:schemeClr val="accent1"/>
-          </a:lnRef>
-          <a:fillRef idx="0">
-            <a:schemeClr val="accent1"/>
-          </a:fillRef>
-          <a:effectRef idx="1">
-            <a:schemeClr val="accent1"/>
-          </a:effectRef>
-          <a:fontRef idx="minor">
-            <a:schemeClr val="tx1"/>
-          </a:fontRef>
-        </p:style>
-      </p:cxnSp>
     </p:spTree>
     <p:extLst>
       <p:ext uri="{BB962C8B-B14F-4D97-AF65-F5344CB8AC3E}">

</xml_diff>